<commit_message>
Validação da apresentação de slides
</commit_message>
<xml_diff>
--- a/Teste Unitário/Porque criar testes unitários.pptx
+++ b/Teste Unitário/Porque criar testes unitários.pptx
@@ -251,7 +251,7 @@
             <a:pPr rtl="0"/>
             <a:fld id="{8DC2C244-6829-4B52-AFD3-381E093F71A6}" type="datetime1">
               <a:rPr lang="pt-BR" smtClean="0"/>
-              <a:t>16/10/2019</a:t>
+              <a:t>18/10/2019</a:t>
             </a:fld>
             <a:endParaRPr lang="pt-BR" dirty="0"/>
           </a:p>
@@ -433,7 +433,7 @@
             <a:fld id="{AB10262D-E9DC-4045-91D2-115DECAEB60A}" type="datetime1">
               <a:rPr lang="pt-BR" smtClean="0"/>
               <a:pPr/>
-              <a:t>16/10/2019</a:t>
+              <a:t>18/10/2019</a:t>
             </a:fld>
             <a:endParaRPr lang="pt-BR" dirty="0"/>
           </a:p>
@@ -44430,14 +44430,25 @@
         </p:nvSpPr>
         <p:spPr/>
         <p:txBody>
-          <a:bodyPr rtlCol="0"/>
+          <a:bodyPr rtlCol="0">
+            <a:normAutofit lnSpcReduction="10000"/>
+          </a:bodyPr>
           <a:lstStyle/>
           <a:p>
             <a:pPr rtl="0"/>
             <a:r>
-              <a:rPr lang="pt-BR" dirty="0"/>
+              <a:rPr lang="pt-BR" sz="3200" dirty="0">
+                <a:solidFill>
+                  <a:schemeClr val="bg2"/>
+                </a:solidFill>
+              </a:rPr>
               <a:t>Por que criar?</a:t>
             </a:r>
+            <a:endParaRPr lang="pt-BR" dirty="0">
+              <a:solidFill>
+                <a:schemeClr val="bg2"/>
+              </a:solidFill>
+            </a:endParaRPr>
           </a:p>
         </p:txBody>
       </p:sp>
@@ -44603,17 +44614,15 @@
         </p:nvSpPr>
         <p:spPr>
           <a:xfrm>
-            <a:off x="5393343" y="1664567"/>
-            <a:ext cx="4509676" cy="950818"/>
+            <a:off x="5063320" y="1664567"/>
+            <a:ext cx="6720538" cy="950818"/>
           </a:xfrm>
           <a:prstGeom prst="rect">
             <a:avLst/>
           </a:prstGeom>
           <a:noFill/>
           <a:ln w="9525" cap="flat" cmpd="sng" algn="ctr">
-            <a:solidFill>
-              <a:schemeClr val="accent4"/>
-            </a:solidFill>
+            <a:noFill/>
             <a:prstDash val="solid"/>
             <a:round/>
             <a:headEnd type="none" w="med" len="med"/>
@@ -44643,12 +44652,8 @@
           </a:bodyPr>
           <a:lstStyle/>
           <a:p>
-            <a:pPr marL="285750" indent="-285750">
-              <a:buFont typeface="Wingdings" panose="05000000000000000000" pitchFamily="2" charset="2"/>
-              <a:buChar char="Ø"/>
-            </a:pPr>
             <a:r>
-              <a:rPr lang="pt-BR" dirty="0">
+              <a:rPr lang="pt-BR" sz="2800" b="1" dirty="0">
                 <a:solidFill>
                   <a:schemeClr val="bg2"/>
                 </a:solidFill>
@@ -44672,8 +44677,8 @@
         </p:nvSpPr>
         <p:spPr>
           <a:xfrm>
-            <a:off x="5798564" y="2988401"/>
-            <a:ext cx="4750167" cy="1754326"/>
+            <a:off x="5390422" y="2988400"/>
+            <a:ext cx="6393436" cy="3108543"/>
           </a:xfrm>
           <a:prstGeom prst="rect">
             <a:avLst/>
@@ -44686,14 +44691,27 @@
           </a:bodyPr>
           <a:lstStyle/>
           <a:p>
-            <a:pPr marL="285750" indent="-285750" algn="just">
+            <a:pPr marL="342900" indent="-342900">
               <a:buFont typeface="Wingdings" panose="05000000000000000000" pitchFamily="2" charset="2"/>
-              <a:buChar char="Ø"/>
+              <a:buChar char="ü"/>
             </a:pPr>
             <a:r>
-              <a:rPr lang="pt-BR" dirty="0"/>
-              <a:t>...</a:t>
+              <a:rPr lang="pt-BR" sz="2400" b="1" dirty="0">
+                <a:solidFill>
+                  <a:schemeClr val="bg2"/>
+                </a:solidFill>
+              </a:rPr>
+              <a:t>Desafio</a:t>
             </a:r>
+            <a:r>
+              <a:rPr lang="pt-BR" sz="2400" b="1" dirty="0"/>
+              <a:t>: </a:t>
+            </a:r>
+            <a:r>
+              <a:rPr lang="pt-BR" sz="2800" b="1" dirty="0"/>
+              <a:t>http://codingdojo.org/kata/FizzBuzz/</a:t>
+            </a:r>
+            <a:endParaRPr lang="pt-BR" b="1" dirty="0"/>
           </a:p>
           <a:p>
             <a:pPr marL="285750" indent="-285750" algn="just">
@@ -44703,30 +44721,72 @@
             <a:endParaRPr lang="pt-BR" dirty="0"/>
           </a:p>
           <a:p>
+            <a:pPr marL="342900" indent="-342900" algn="just">
+              <a:buFont typeface="Wingdings" panose="05000000000000000000" pitchFamily="2" charset="2"/>
+              <a:buChar char="ü"/>
+            </a:pPr>
+            <a:r>
+              <a:rPr lang="pt-BR" sz="2400" b="1" dirty="0">
+                <a:solidFill>
+                  <a:schemeClr val="bg2"/>
+                </a:solidFill>
+              </a:rPr>
+              <a:t>Escrever testes</a:t>
+            </a:r>
+          </a:p>
+          <a:p>
             <a:pPr marL="285750" indent="-285750" algn="just">
               <a:buFont typeface="Wingdings" panose="05000000000000000000" pitchFamily="2" charset="2"/>
               <a:buChar char="Ø"/>
             </a:pPr>
+            <a:endParaRPr lang="pt-BR" dirty="0">
+              <a:solidFill>
+                <a:schemeClr val="bg2"/>
+              </a:solidFill>
+            </a:endParaRPr>
+          </a:p>
+          <a:p>
+            <a:pPr marL="342900" indent="-342900" algn="just">
+              <a:buFont typeface="Wingdings" panose="05000000000000000000" pitchFamily="2" charset="2"/>
+              <a:buChar char="ü"/>
+            </a:pPr>
             <a:r>
-              <a:rPr lang="pt-BR" dirty="0"/>
-              <a:t>...</a:t>
+              <a:rPr lang="pt-BR" sz="2400" b="1" dirty="0" err="1">
+                <a:solidFill>
+                  <a:schemeClr val="bg2"/>
+                </a:solidFill>
+              </a:rPr>
+              <a:t>Refactoring</a:t>
             </a:r>
+            <a:endParaRPr lang="pt-BR" sz="2400" b="1" dirty="0">
+              <a:solidFill>
+                <a:schemeClr val="bg2"/>
+              </a:solidFill>
+            </a:endParaRPr>
           </a:p>
           <a:p>
             <a:pPr marL="285750" indent="-285750" algn="just">
               <a:buFont typeface="Wingdings" panose="05000000000000000000" pitchFamily="2" charset="2"/>
               <a:buChar char="Ø"/>
             </a:pPr>
-            <a:endParaRPr lang="pt-BR" dirty="0"/>
-          </a:p>
-          <a:p>
-            <a:pPr marL="285750" indent="-285750" algn="just">
+            <a:endParaRPr lang="pt-BR" dirty="0">
+              <a:solidFill>
+                <a:schemeClr val="bg2"/>
+              </a:solidFill>
+            </a:endParaRPr>
+          </a:p>
+          <a:p>
+            <a:pPr marL="342900" indent="-342900" algn="just">
               <a:buFont typeface="Wingdings" panose="05000000000000000000" pitchFamily="2" charset="2"/>
-              <a:buChar char="Ø"/>
+              <a:buChar char="ü"/>
             </a:pPr>
             <a:r>
-              <a:rPr lang="pt-BR" dirty="0"/>
-              <a:t>...</a:t>
+              <a:rPr lang="pt-BR" sz="2400" b="1" dirty="0">
+                <a:solidFill>
+                  <a:schemeClr val="bg2"/>
+                </a:solidFill>
+              </a:rPr>
+              <a:t>Teste passando</a:t>
             </a:r>
           </a:p>
           <a:p>
@@ -44942,7 +45002,7 @@
       </p:par>
     </p:tnLst>
     <p:bldLst>
-      <p:bldP spid="10" grpId="0" animBg="1"/>
+      <p:bldP spid="10" grpId="0"/>
       <p:bldP spid="11" grpId="0"/>
     </p:bldLst>
   </p:timing>
@@ -44982,7 +45042,12 @@
             <p:ph type="title"/>
           </p:nvPr>
         </p:nvSpPr>
-        <p:spPr/>
+        <p:spPr>
+          <a:xfrm>
+            <a:off x="830423" y="365126"/>
+            <a:ext cx="10515600" cy="652969"/>
+          </a:xfrm>
+        </p:spPr>
         <p:txBody>
           <a:bodyPr/>
           <a:lstStyle/>
@@ -45068,17 +45133,15 @@
         </p:nvSpPr>
         <p:spPr>
           <a:xfrm>
-            <a:off x="1133135" y="1664567"/>
-            <a:ext cx="4509676" cy="950818"/>
+            <a:off x="0" y="2518589"/>
+            <a:ext cx="12192000" cy="950818"/>
           </a:xfrm>
           <a:prstGeom prst="rect">
             <a:avLst/>
           </a:prstGeom>
           <a:noFill/>
           <a:ln w="9525" cap="flat" cmpd="sng" algn="ctr">
-            <a:solidFill>
-              <a:schemeClr val="accent4"/>
-            </a:solidFill>
+            <a:noFill/>
             <a:prstDash val="solid"/>
             <a:round/>
             <a:headEnd type="none" w="med" len="med"/>
@@ -45108,17 +45171,14 @@
           </a:bodyPr>
           <a:lstStyle/>
           <a:p>
-            <a:pPr marL="285750" indent="-285750">
-              <a:buFont typeface="Wingdings" panose="05000000000000000000" pitchFamily="2" charset="2"/>
-              <a:buChar char="Ø"/>
-            </a:pPr>
+            <a:pPr algn="ctr"/>
             <a:r>
-              <a:rPr lang="pt-BR" dirty="0">
+              <a:rPr lang="pt-BR" sz="4800" b="1" dirty="0">
                 <a:solidFill>
                   <a:schemeClr val="bg2"/>
                 </a:solidFill>
               </a:rPr>
-              <a:t>Você é aquilo que pratica</a:t>
+              <a:t>Você é aquilo que pratica.</a:t>
             </a:r>
           </a:p>
         </p:txBody>
@@ -45137,8 +45197,8 @@
         </p:nvSpPr>
         <p:spPr>
           <a:xfrm>
-            <a:off x="7110530" y="3836540"/>
-            <a:ext cx="4750167" cy="2031325"/>
+            <a:off x="7203232" y="5686200"/>
+            <a:ext cx="4820445" cy="954107"/>
           </a:xfrm>
           <a:prstGeom prst="rect">
             <a:avLst/>
@@ -45151,72 +45211,115 @@
           </a:bodyPr>
           <a:lstStyle/>
           <a:p>
-            <a:pPr marL="285750" indent="-285750" algn="just">
-              <a:buFont typeface="Wingdings" panose="05000000000000000000" pitchFamily="2" charset="2"/>
-              <a:buChar char="Ø"/>
+            <a:pPr marL="457200" indent="-457200" algn="just">
+              <a:buFont typeface="Arial" panose="020B0604020202020204" pitchFamily="34" charset="0"/>
+              <a:buChar char="•"/>
             </a:pPr>
             <a:r>
-              <a:rPr lang="pt-BR" dirty="0"/>
+              <a:rPr lang="pt-BR" sz="2800" b="1" dirty="0">
+                <a:solidFill>
+                  <a:schemeClr val="bg2"/>
+                </a:solidFill>
+              </a:rPr>
               <a:t>github.com/</a:t>
             </a:r>
             <a:r>
-              <a:rPr lang="pt-BR" dirty="0" err="1"/>
-              <a:t>gelsongilmar</a:t>
+              <a:rPr lang="pt-BR" sz="2800" b="1" dirty="0" err="1">
+                <a:solidFill>
+                  <a:schemeClr val="bg2"/>
+                </a:solidFill>
+              </a:rPr>
+              <a:t>marquesigor</a:t>
             </a:r>
-            <a:endParaRPr lang="pt-BR" dirty="0"/>
-          </a:p>
-          <a:p>
-            <a:pPr marL="285750" indent="-285750" algn="just">
-              <a:buFont typeface="Wingdings" panose="05000000000000000000" pitchFamily="2" charset="2"/>
-              <a:buChar char="Ø"/>
+            <a:endParaRPr lang="pt-BR" sz="2800" b="1" dirty="0">
+              <a:solidFill>
+                <a:schemeClr val="bg2"/>
+              </a:solidFill>
+            </a:endParaRPr>
+          </a:p>
+          <a:p>
+            <a:pPr marL="457200" indent="-457200" algn="just">
+              <a:buFont typeface="Arial" panose="020B0604020202020204" pitchFamily="34" charset="0"/>
+              <a:buChar char="•"/>
             </a:pPr>
             <a:r>
-              <a:rPr lang="pt-BR" dirty="0"/>
-              <a:t>gelsongilmar@gmail.com</a:t>
+              <a:rPr lang="pt-BR" sz="2800" b="1" dirty="0">
+                <a:solidFill>
+                  <a:schemeClr val="bg2"/>
+                </a:solidFill>
+              </a:rPr>
+              <a:t>marques.igor@outlook.com</a:t>
             </a:r>
           </a:p>
-          <a:p>
-            <a:pPr marL="285750" indent="-285750" algn="just">
-              <a:buFont typeface="Wingdings" panose="05000000000000000000" pitchFamily="2" charset="2"/>
-              <a:buChar char="Ø"/>
-            </a:pPr>
-            <a:endParaRPr lang="pt-BR" dirty="0"/>
-          </a:p>
-          <a:p>
-            <a:pPr marL="285750" indent="-285750" algn="just">
-              <a:buFont typeface="Wingdings" panose="05000000000000000000" pitchFamily="2" charset="2"/>
-              <a:buChar char="Ø"/>
+        </p:txBody>
+      </p:sp>
+      <p:sp>
+        <p:nvSpPr>
+          <p:cNvPr id="7" name="CaixaDeTexto 6">
+            <a:extLst>
+              <a:ext uri="{FF2B5EF4-FFF2-40B4-BE49-F238E27FC236}">
+                <a16:creationId xmlns:a16="http://schemas.microsoft.com/office/drawing/2014/main" id="{E74B4EEF-E9EB-44E2-A0C6-4EE86730A0BA}"/>
+              </a:ext>
+            </a:extLst>
+          </p:cNvPr>
+          <p:cNvSpPr txBox="1"/>
+          <p:nvPr/>
+        </p:nvSpPr>
+        <p:spPr>
+          <a:xfrm>
+            <a:off x="7185036" y="4517125"/>
+            <a:ext cx="4702628" cy="954107"/>
+          </a:xfrm>
+          <a:prstGeom prst="rect">
+            <a:avLst/>
+          </a:prstGeom>
+          <a:noFill/>
+        </p:spPr>
+        <p:txBody>
+          <a:bodyPr wrap="square" rtlCol="0">
+            <a:spAutoFit/>
+          </a:bodyPr>
+          <a:lstStyle/>
+          <a:p>
+            <a:pPr marL="457200" indent="-457200" algn="just">
+              <a:buFont typeface="Arial" panose="020B0604020202020204" pitchFamily="34" charset="0"/>
+              <a:buChar char="•"/>
             </a:pPr>
             <a:r>
-              <a:rPr lang="pt-BR" dirty="0"/>
+              <a:rPr lang="pt-BR" sz="2800" b="1" dirty="0">
+                <a:solidFill>
+                  <a:schemeClr val="bg2"/>
+                </a:solidFill>
+              </a:rPr>
               <a:t>github.com/</a:t>
             </a:r>
             <a:r>
-              <a:rPr lang="pt-BR" dirty="0" err="1"/>
-              <a:t>marquesigor</a:t>
+              <a:rPr lang="pt-BR" sz="2800" b="1" dirty="0" err="1">
+                <a:solidFill>
+                  <a:schemeClr val="bg2"/>
+                </a:solidFill>
+              </a:rPr>
+              <a:t>gelsongilmar</a:t>
             </a:r>
-            <a:endParaRPr lang="pt-BR" dirty="0"/>
-          </a:p>
-          <a:p>
-            <a:pPr marL="285750" indent="-285750" algn="just">
-              <a:buFont typeface="Wingdings" panose="05000000000000000000" pitchFamily="2" charset="2"/>
-              <a:buChar char="Ø"/>
+            <a:endParaRPr lang="pt-BR" sz="2800" b="1" dirty="0">
+              <a:solidFill>
+                <a:schemeClr val="bg2"/>
+              </a:solidFill>
+            </a:endParaRPr>
+          </a:p>
+          <a:p>
+            <a:pPr marL="457200" indent="-457200" algn="just">
+              <a:buFont typeface="Arial" panose="020B0604020202020204" pitchFamily="34" charset="0"/>
+              <a:buChar char="•"/>
             </a:pPr>
-            <a:endParaRPr lang="pt-BR" dirty="0"/>
-          </a:p>
-          <a:p>
-            <a:pPr marL="285750" indent="-285750" algn="just">
-              <a:buFont typeface="Wingdings" panose="05000000000000000000" pitchFamily="2" charset="2"/>
-              <a:buChar char="Ø"/>
-            </a:pPr>
-            <a:endParaRPr lang="pt-BR" dirty="0"/>
-          </a:p>
-          <a:p>
-            <a:pPr marL="285750" indent="-285750">
-              <a:buFont typeface="Wingdings" panose="05000000000000000000" pitchFamily="2" charset="2"/>
-              <a:buChar char="Ø"/>
-            </a:pPr>
-            <a:endParaRPr lang="pt-BR" dirty="0"/>
+            <a:r>
+              <a:rPr lang="pt-BR" sz="2800" b="1" dirty="0">
+                <a:solidFill>
+                  <a:schemeClr val="bg2"/>
+                </a:solidFill>
+              </a:rPr>
+              <a:t>gelsongilmar@gmail.com</a:t>
+            </a:r>
           </a:p>
         </p:txBody>
       </p:sp>
@@ -45351,8 +45454,8 @@
         </p:nvSpPr>
         <p:spPr>
           <a:xfrm>
-            <a:off x="955889" y="1312030"/>
-            <a:ext cx="2291012" cy="523220"/>
+            <a:off x="805207" y="1312030"/>
+            <a:ext cx="2592377" cy="584775"/>
           </a:xfrm>
           <a:prstGeom prst="rect">
             <a:avLst/>
@@ -45367,11 +45470,8 @@
           <a:p>
             <a:pPr algn="ctr"/>
             <a:r>
-              <a:rPr lang="pt-BR" sz="2800" b="0" cap="none" spc="0" dirty="0">
+              <a:rPr lang="pt-BR" sz="3200" b="1" cap="none" spc="0" dirty="0">
                 <a:ln w="0"/>
-                <a:solidFill>
-                  <a:schemeClr val="tx2"/>
-                </a:solidFill>
                 <a:effectLst>
                   <a:outerShdw blurRad="38100" dist="19050" dir="2700000" algn="tl" rotWithShape="0">
                     <a:schemeClr val="dk1">
@@ -45400,7 +45500,7 @@
         <p:spPr>
           <a:xfrm>
             <a:off x="974549" y="1835250"/>
-            <a:ext cx="4172937" cy="369332"/>
+            <a:ext cx="5505033" cy="461665"/>
           </a:xfrm>
           <a:prstGeom prst="rect">
             <a:avLst/>
@@ -45414,14 +45514,26 @@
           <a:lstStyle/>
           <a:p>
             <a:r>
-              <a:rPr lang="pt-BR" dirty="0"/>
+              <a:rPr lang="pt-BR" sz="2400" dirty="0">
+                <a:solidFill>
+                  <a:schemeClr val="bg2"/>
+                </a:solidFill>
+              </a:rPr>
               <a:t>Analista de Sistemas e Entusiasta </a:t>
             </a:r>
             <a:r>
-              <a:rPr lang="pt-BR" dirty="0" err="1"/>
+              <a:rPr lang="pt-BR" sz="2400" dirty="0" err="1">
+                <a:solidFill>
+                  <a:schemeClr val="bg2"/>
+                </a:solidFill>
+              </a:rPr>
               <a:t>DevOps</a:t>
             </a:r>
-            <a:endParaRPr lang="pt-BR" dirty="0"/>
+            <a:endParaRPr lang="pt-BR" sz="2400" dirty="0">
+              <a:solidFill>
+                <a:schemeClr val="bg2"/>
+              </a:solidFill>
+            </a:endParaRPr>
           </a:p>
         </p:txBody>
       </p:sp>
@@ -45440,7 +45552,7 @@
         <p:spPr>
           <a:xfrm>
             <a:off x="974549" y="2204582"/>
-            <a:ext cx="4563365" cy="2308324"/>
+            <a:ext cx="5919313" cy="3046988"/>
           </a:xfrm>
           <a:prstGeom prst="rect">
             <a:avLst/>
@@ -45458,15 +45570,27 @@
               <a:buChar char="•"/>
             </a:pPr>
             <a:r>
-              <a:rPr lang="pt-BR" dirty="0"/>
+              <a:rPr lang="pt-BR" sz="2400" dirty="0">
+                <a:solidFill>
+                  <a:schemeClr val="bg2"/>
+                </a:solidFill>
+              </a:rPr>
               <a:t>Certificado </a:t>
             </a:r>
             <a:r>
-              <a:rPr lang="pt-BR" dirty="0" err="1"/>
+              <a:rPr lang="pt-BR" sz="2400" dirty="0" err="1">
+                <a:solidFill>
+                  <a:schemeClr val="bg2"/>
+                </a:solidFill>
+              </a:rPr>
               <a:t>DevOps</a:t>
             </a:r>
             <a:r>
-              <a:rPr lang="pt-BR" dirty="0"/>
+              <a:rPr lang="pt-BR" sz="2400" dirty="0">
+                <a:solidFill>
+                  <a:schemeClr val="bg2"/>
+                </a:solidFill>
+              </a:rPr>
               <a:t> Professional</a:t>
             </a:r>
           </a:p>
@@ -45476,7 +45600,11 @@
               <a:buChar char="•"/>
             </a:pPr>
             <a:r>
-              <a:rPr lang="pt-BR" dirty="0"/>
+              <a:rPr lang="pt-BR" sz="2400" dirty="0">
+                <a:solidFill>
+                  <a:schemeClr val="bg2"/>
+                </a:solidFill>
+              </a:rPr>
               <a:t>Certificado Scrum Foundation Professional</a:t>
             </a:r>
           </a:p>
@@ -45486,21 +45614,24 @@
               <a:buChar char="•"/>
             </a:pPr>
             <a:r>
-              <a:rPr lang="pt-BR" dirty="0"/>
-              <a:t>PRINCE2 </a:t>
+              <a:rPr lang="pt-BR" sz="2400" dirty="0">
+                <a:solidFill>
+                  <a:schemeClr val="bg2"/>
+                </a:solidFill>
+              </a:rPr>
+              <a:t>PRINCE2 Foundation</a:t>
             </a:r>
-            <a:r>
-              <a:rPr lang="pt-BR" dirty="0" err="1"/>
-              <a:t>Foudation</a:t>
-            </a:r>
-            <a:endParaRPr lang="pt-BR" dirty="0"/>
           </a:p>
           <a:p>
             <a:pPr marL="742950" lvl="1" indent="-285750">
               <a:buFont typeface="Arial" panose="020B0604020202020204" pitchFamily="34" charset="0"/>
               <a:buChar char="•"/>
             </a:pPr>
-            <a:endParaRPr lang="pt-BR" dirty="0"/>
+            <a:endParaRPr lang="pt-BR" sz="2400" dirty="0">
+              <a:solidFill>
+                <a:schemeClr val="bg2"/>
+              </a:solidFill>
+            </a:endParaRPr>
           </a:p>
           <a:p>
             <a:pPr marL="285750" indent="-285750">
@@ -45508,35 +45639,59 @@
               <a:buChar char="•"/>
             </a:pPr>
             <a:r>
-              <a:rPr lang="pt-BR" dirty="0"/>
+              <a:rPr lang="pt-BR" sz="2400" dirty="0">
+                <a:solidFill>
+                  <a:schemeClr val="bg2"/>
+                </a:solidFill>
+              </a:rPr>
               <a:t>github.com/</a:t>
             </a:r>
             <a:r>
-              <a:rPr lang="pt-BR" dirty="0" err="1"/>
+              <a:rPr lang="pt-BR" sz="2400" dirty="0" err="1">
+                <a:solidFill>
+                  <a:schemeClr val="bg2"/>
+                </a:solidFill>
+              </a:rPr>
               <a:t>gelsongilmar</a:t>
             </a:r>
-            <a:endParaRPr lang="pt-BR" dirty="0"/>
+            <a:endParaRPr lang="pt-BR" sz="2400" dirty="0">
+              <a:solidFill>
+                <a:schemeClr val="bg2"/>
+              </a:solidFill>
+            </a:endParaRPr>
           </a:p>
           <a:p>
             <a:pPr marL="742950" lvl="1" indent="-285750">
               <a:buFont typeface="Arial" panose="020B0604020202020204" pitchFamily="34" charset="0"/>
               <a:buChar char="•"/>
             </a:pPr>
-            <a:endParaRPr lang="pt-BR" dirty="0"/>
+            <a:endParaRPr lang="pt-BR" sz="2400" dirty="0">
+              <a:solidFill>
+                <a:schemeClr val="bg2"/>
+              </a:solidFill>
+            </a:endParaRPr>
           </a:p>
           <a:p>
             <a:pPr marL="742950" lvl="1" indent="-285750">
               <a:buFont typeface="Arial" panose="020B0604020202020204" pitchFamily="34" charset="0"/>
               <a:buChar char="•"/>
             </a:pPr>
-            <a:endParaRPr lang="pt-BR" dirty="0"/>
+            <a:endParaRPr lang="pt-BR" sz="2400" dirty="0">
+              <a:solidFill>
+                <a:schemeClr val="bg2"/>
+              </a:solidFill>
+            </a:endParaRPr>
           </a:p>
           <a:p>
             <a:pPr marL="742950" lvl="1" indent="-285750">
               <a:buFont typeface="Arial" panose="020B0604020202020204" pitchFamily="34" charset="0"/>
               <a:buChar char="•"/>
             </a:pPr>
-            <a:endParaRPr lang="pt-BR" dirty="0"/>
+            <a:endParaRPr lang="pt-BR" sz="2400" dirty="0">
+              <a:solidFill>
+                <a:schemeClr val="bg2"/>
+              </a:solidFill>
+            </a:endParaRPr>
           </a:p>
         </p:txBody>
       </p:sp>
@@ -45554,8 +45709,8 @@
         </p:nvSpPr>
         <p:spPr>
           <a:xfrm>
-            <a:off x="6282045" y="1312030"/>
-            <a:ext cx="2187650" cy="523220"/>
+            <a:off x="7586334" y="1312030"/>
+            <a:ext cx="2473562" cy="584775"/>
           </a:xfrm>
           <a:prstGeom prst="rect">
             <a:avLst/>
@@ -45570,11 +45725,8 @@
           <a:p>
             <a:pPr algn="ctr"/>
             <a:r>
-              <a:rPr lang="pt-BR" sz="2800" b="0" cap="none" spc="0" dirty="0">
+              <a:rPr lang="pt-BR" sz="3200" b="1" cap="none" spc="0" dirty="0">
                 <a:ln w="0"/>
-                <a:solidFill>
-                  <a:schemeClr val="tx2"/>
-                </a:solidFill>
                 <a:effectLst>
                   <a:outerShdw blurRad="38100" dist="19050" dir="2700000" algn="tl" rotWithShape="0">
                     <a:schemeClr val="dk1">
@@ -45602,8 +45754,8 @@
         </p:nvSpPr>
         <p:spPr>
           <a:xfrm>
-            <a:off x="6282045" y="1835250"/>
-            <a:ext cx="484428" cy="369332"/>
+            <a:off x="7893063" y="1850743"/>
+            <a:ext cx="2704843" cy="461665"/>
           </a:xfrm>
           <a:prstGeom prst="rect">
             <a:avLst/>
@@ -45617,9 +45769,26 @@
           <a:lstStyle/>
           <a:p>
             <a:r>
-              <a:rPr lang="pt-BR" dirty="0"/>
-              <a:t>A...</a:t>
+              <a:rPr lang="pt-BR" sz="2400" dirty="0">
+                <a:solidFill>
+                  <a:schemeClr val="bg2"/>
+                </a:solidFill>
+              </a:rPr>
+              <a:t>Software </a:t>
             </a:r>
+            <a:r>
+              <a:rPr lang="pt-BR" sz="2400" dirty="0" err="1">
+                <a:solidFill>
+                  <a:schemeClr val="bg2"/>
+                </a:solidFill>
+              </a:rPr>
+              <a:t>Developer</a:t>
+            </a:r>
+            <a:endParaRPr lang="pt-BR" sz="2400" dirty="0">
+              <a:solidFill>
+                <a:schemeClr val="bg2"/>
+              </a:solidFill>
+            </a:endParaRPr>
           </a:p>
         </p:txBody>
       </p:sp>
@@ -45637,8 +45806,8 @@
         </p:nvSpPr>
         <p:spPr>
           <a:xfrm>
-            <a:off x="6282045" y="2204582"/>
-            <a:ext cx="2937214" cy="2308324"/>
+            <a:off x="7893063" y="2220075"/>
+            <a:ext cx="3756413" cy="461665"/>
           </a:xfrm>
           <a:prstGeom prst="rect">
             <a:avLst/>
@@ -45656,75 +45825,29 @@
               <a:buChar char="•"/>
             </a:pPr>
             <a:r>
-              <a:rPr lang="pt-BR" dirty="0"/>
-              <a:t>...</a:t>
-            </a:r>
-          </a:p>
-          <a:p>
-            <a:pPr marL="285750" indent="-285750">
-              <a:buFont typeface="Arial" panose="020B0604020202020204" pitchFamily="34" charset="0"/>
-              <a:buChar char="•"/>
-            </a:pPr>
-            <a:r>
-              <a:rPr lang="pt-BR" dirty="0"/>
-              <a:t>..</a:t>
-            </a:r>
-          </a:p>
-          <a:p>
-            <a:pPr marL="285750" indent="-285750">
-              <a:buFont typeface="Arial" panose="020B0604020202020204" pitchFamily="34" charset="0"/>
-              <a:buChar char="•"/>
-            </a:pPr>
-            <a:r>
-              <a:rPr lang="pt-BR" dirty="0"/>
-              <a:t>..</a:t>
-            </a:r>
-          </a:p>
-          <a:p>
-            <a:pPr marL="742950" lvl="1" indent="-285750">
-              <a:buFont typeface="Arial" panose="020B0604020202020204" pitchFamily="34" charset="0"/>
-              <a:buChar char="•"/>
-            </a:pPr>
-            <a:endParaRPr lang="pt-BR" dirty="0"/>
-          </a:p>
-          <a:p>
-            <a:pPr marL="285750" indent="-285750">
-              <a:buFont typeface="Arial" panose="020B0604020202020204" pitchFamily="34" charset="0"/>
-              <a:buChar char="•"/>
-            </a:pPr>
-            <a:r>
-              <a:rPr lang="pt-BR" dirty="0"/>
+              <a:rPr lang="pt-BR" sz="2400" dirty="0">
+                <a:solidFill>
+                  <a:schemeClr val="bg2"/>
+                </a:solidFill>
+              </a:rPr>
               <a:t>github.com/</a:t>
             </a:r>
             <a:r>
-              <a:rPr lang="pt-BR" dirty="0" err="1"/>
+              <a:rPr lang="pt-BR" sz="2400" dirty="0" err="1">
+                <a:solidFill>
+                  <a:schemeClr val="bg2"/>
+                </a:solidFill>
+              </a:rPr>
               <a:t>marquesigor</a:t>
             </a:r>
             <a:r>
-              <a:rPr lang="pt-BR" dirty="0"/>
+              <a:rPr lang="pt-BR" sz="2400" dirty="0">
+                <a:solidFill>
+                  <a:schemeClr val="bg2"/>
+                </a:solidFill>
+              </a:rPr>
               <a:t> </a:t>
             </a:r>
-          </a:p>
-          <a:p>
-            <a:pPr marL="742950" lvl="1" indent="-285750">
-              <a:buFont typeface="Arial" panose="020B0604020202020204" pitchFamily="34" charset="0"/>
-              <a:buChar char="•"/>
-            </a:pPr>
-            <a:endParaRPr lang="pt-BR" dirty="0"/>
-          </a:p>
-          <a:p>
-            <a:pPr marL="742950" lvl="1" indent="-285750">
-              <a:buFont typeface="Arial" panose="020B0604020202020204" pitchFamily="34" charset="0"/>
-              <a:buChar char="•"/>
-            </a:pPr>
-            <a:endParaRPr lang="pt-BR" dirty="0"/>
-          </a:p>
-          <a:p>
-            <a:pPr marL="742950" lvl="1" indent="-285750">
-              <a:buFont typeface="Arial" panose="020B0604020202020204" pitchFamily="34" charset="0"/>
-              <a:buChar char="•"/>
-            </a:pPr>
-            <a:endParaRPr lang="pt-BR" dirty="0"/>
           </a:p>
         </p:txBody>
       </p:sp>
@@ -45860,7 +45983,7 @@
         <p:spPr>
           <a:xfrm>
             <a:off x="1133135" y="1680210"/>
-            <a:ext cx="2252924" cy="923330"/>
+            <a:ext cx="2757999" cy="1200329"/>
           </a:xfrm>
           <a:prstGeom prst="rect">
             <a:avLst/>
@@ -45878,7 +46001,11 @@
               <a:buChar char="•"/>
             </a:pPr>
             <a:r>
-              <a:rPr lang="pt-BR" dirty="0"/>
+              <a:rPr lang="pt-BR" sz="2400" dirty="0">
+                <a:solidFill>
+                  <a:schemeClr val="bg2"/>
+                </a:solidFill>
+              </a:rPr>
               <a:t>Entregar Software</a:t>
             </a:r>
           </a:p>
@@ -45887,7 +46014,11 @@
               <a:buFont typeface="Arial" panose="020B0604020202020204" pitchFamily="34" charset="0"/>
               <a:buChar char="•"/>
             </a:pPr>
-            <a:endParaRPr lang="pt-BR" dirty="0"/>
+            <a:endParaRPr lang="pt-BR" sz="2400" dirty="0">
+              <a:solidFill>
+                <a:schemeClr val="bg2"/>
+              </a:solidFill>
+            </a:endParaRPr>
           </a:p>
           <a:p>
             <a:pPr marL="285750" indent="-285750">
@@ -45895,7 +46026,11 @@
               <a:buChar char="•"/>
             </a:pPr>
             <a:r>
-              <a:rPr lang="pt-BR" dirty="0"/>
+              <a:rPr lang="pt-BR" sz="2400" dirty="0">
+                <a:solidFill>
+                  <a:schemeClr val="bg2"/>
+                </a:solidFill>
+              </a:rPr>
               <a:t>Testes unitários</a:t>
             </a:r>
           </a:p>
@@ -46033,7 +46168,7 @@
         <p:spPr>
           <a:xfrm>
             <a:off x="1133135" y="1508566"/>
-            <a:ext cx="8208912" cy="646331"/>
+            <a:ext cx="8208912" cy="830997"/>
           </a:xfrm>
           <a:prstGeom prst="rect">
             <a:avLst/>
@@ -46046,12 +46181,12 @@
           </a:bodyPr>
           <a:lstStyle/>
           <a:p>
-            <a:pPr marL="285750" indent="-285750" algn="just">
+            <a:pPr marL="342900" indent="-342900" algn="just">
               <a:buFont typeface="Wingdings" panose="05000000000000000000" pitchFamily="2" charset="2"/>
-              <a:buChar char="Ø"/>
+              <a:buChar char="§"/>
             </a:pPr>
             <a:r>
-              <a:rPr lang="pt-BR" dirty="0">
+              <a:rPr lang="pt-BR" sz="2400" dirty="0">
                 <a:solidFill>
                   <a:schemeClr val="bg2"/>
                 </a:solidFill>
@@ -46064,7 +46199,7 @@
               <a:buFont typeface="Wingdings" panose="05000000000000000000" pitchFamily="2" charset="2"/>
               <a:buChar char="Ø"/>
             </a:pPr>
-            <a:endParaRPr lang="pt-BR" dirty="0">
+            <a:endParaRPr lang="pt-BR" sz="2400" dirty="0">
               <a:solidFill>
                 <a:schemeClr val="bg2"/>
               </a:solidFill>
@@ -46087,7 +46222,7 @@
         <p:spPr>
           <a:xfrm>
             <a:off x="1544615" y="2154897"/>
-            <a:ext cx="8208912" cy="1754326"/>
+            <a:ext cx="8208912" cy="2308324"/>
           </a:xfrm>
           <a:prstGeom prst="rect">
             <a:avLst/>
@@ -46100,13 +46235,38 @@
           </a:bodyPr>
           <a:lstStyle/>
           <a:p>
+            <a:pPr marL="342900" indent="-342900" algn="just">
+              <a:buFont typeface="Arial" panose="020B0604020202020204" pitchFamily="34" charset="0"/>
+              <a:buChar char="•"/>
+            </a:pPr>
+            <a:r>
+              <a:rPr lang="pt-BR" sz="2400" dirty="0">
+                <a:solidFill>
+                  <a:schemeClr val="bg2"/>
+                </a:solidFill>
+              </a:rPr>
+              <a:t>Inovação</a:t>
+            </a:r>
+          </a:p>
+          <a:p>
             <a:pPr marL="285750" indent="-285750" algn="just">
               <a:buFont typeface="Wingdings" panose="05000000000000000000" pitchFamily="2" charset="2"/>
               <a:buChar char="Ø"/>
             </a:pPr>
+            <a:endParaRPr lang="pt-BR" sz="2400" dirty="0"/>
+          </a:p>
+          <a:p>
+            <a:pPr marL="342900" indent="-342900" algn="just">
+              <a:buFont typeface="Arial" panose="020B0604020202020204" pitchFamily="34" charset="0"/>
+              <a:buChar char="•"/>
+            </a:pPr>
             <a:r>
-              <a:rPr lang="pt-BR" dirty="0"/>
-              <a:t>Inovação</a:t>
+              <a:rPr lang="pt-BR" sz="2400" dirty="0">
+                <a:solidFill>
+                  <a:schemeClr val="bg2"/>
+                </a:solidFill>
+              </a:rPr>
+              <a:t>Velocidade</a:t>
             </a:r>
           </a:p>
           <a:p>
@@ -46114,32 +46274,19 @@
               <a:buFont typeface="Wingdings" panose="05000000000000000000" pitchFamily="2" charset="2"/>
               <a:buChar char="Ø"/>
             </a:pPr>
-            <a:endParaRPr lang="pt-BR" dirty="0"/>
-          </a:p>
-          <a:p>
-            <a:pPr marL="285750" indent="-285750" algn="just">
-              <a:buFont typeface="Wingdings" panose="05000000000000000000" pitchFamily="2" charset="2"/>
-              <a:buChar char="Ø"/>
+            <a:endParaRPr lang="pt-BR" sz="2400" dirty="0"/>
+          </a:p>
+          <a:p>
+            <a:pPr marL="342900" indent="-342900" algn="just">
+              <a:buFont typeface="Arial" panose="020B0604020202020204" pitchFamily="34" charset="0"/>
+              <a:buChar char="•"/>
             </a:pPr>
             <a:r>
-              <a:rPr lang="pt-BR" dirty="0"/>
-              <a:t>Velocidade</a:t>
-            </a:r>
-          </a:p>
-          <a:p>
-            <a:pPr marL="285750" indent="-285750" algn="just">
-              <a:buFont typeface="Wingdings" panose="05000000000000000000" pitchFamily="2" charset="2"/>
-              <a:buChar char="Ø"/>
-            </a:pPr>
-            <a:endParaRPr lang="pt-BR" dirty="0"/>
-          </a:p>
-          <a:p>
-            <a:pPr marL="285750" indent="-285750" algn="just">
-              <a:buFont typeface="Wingdings" panose="05000000000000000000" pitchFamily="2" charset="2"/>
-              <a:buChar char="Ø"/>
-            </a:pPr>
-            <a:r>
-              <a:rPr lang="pt-BR" dirty="0"/>
+              <a:rPr lang="pt-BR" sz="2400" dirty="0">
+                <a:solidFill>
+                  <a:schemeClr val="bg2"/>
+                </a:solidFill>
+              </a:rPr>
               <a:t>Qualidade</a:t>
             </a:r>
           </a:p>
@@ -46148,7 +46295,7 @@
               <a:buFont typeface="Wingdings" panose="05000000000000000000" pitchFamily="2" charset="2"/>
               <a:buChar char="Ø"/>
             </a:pPr>
-            <a:endParaRPr lang="pt-BR" dirty="0"/>
+            <a:endParaRPr lang="pt-BR" sz="2400" dirty="0"/>
           </a:p>
         </p:txBody>
       </p:sp>
@@ -46166,7 +46313,7 @@
         </p:nvSpPr>
         <p:spPr>
           <a:xfrm>
-            <a:off x="1139395" y="4095207"/>
+            <a:off x="1139395" y="4586900"/>
             <a:ext cx="4509676" cy="950818"/>
           </a:xfrm>
           <a:prstGeom prst="rect">
@@ -46206,18 +46353,23 @@
           </a:bodyPr>
           <a:lstStyle/>
           <a:p>
-            <a:pPr marL="285750" indent="-285750">
+            <a:pPr marL="342900" indent="-342900">
               <a:buFont typeface="Wingdings" panose="05000000000000000000" pitchFamily="2" charset="2"/>
-              <a:buChar char="Ø"/>
+              <a:buChar char="§"/>
             </a:pPr>
             <a:r>
-              <a:rPr lang="pt-BR" dirty="0">
+              <a:rPr lang="pt-BR" sz="2400" dirty="0">
                 <a:solidFill>
                   <a:schemeClr val="bg2"/>
                 </a:solidFill>
               </a:rPr>
               <a:t>Automação</a:t>
             </a:r>
+            <a:endParaRPr lang="pt-BR" dirty="0">
+              <a:solidFill>
+                <a:schemeClr val="bg2"/>
+              </a:solidFill>
+            </a:endParaRPr>
           </a:p>
         </p:txBody>
       </p:sp>
@@ -46639,8 +46791,8 @@
         </p:blipFill>
         <p:spPr>
           <a:xfrm>
-            <a:off x="1133135" y="2040417"/>
-            <a:ext cx="4653852" cy="1977887"/>
+            <a:off x="778643" y="1236444"/>
+            <a:ext cx="3783405" cy="1607947"/>
           </a:xfrm>
           <a:prstGeom prst="rect">
             <a:avLst/>
@@ -46661,7 +46813,7 @@
         </p:nvSpPr>
         <p:spPr>
           <a:xfrm>
-            <a:off x="1133135" y="4210066"/>
+            <a:off x="343419" y="3062740"/>
             <a:ext cx="4653852" cy="646331"/>
           </a:xfrm>
           <a:prstGeom prst="rect">
@@ -46706,8 +46858,8 @@
         </p:nvSpPr>
         <p:spPr>
           <a:xfrm>
-            <a:off x="6643626" y="2368755"/>
-            <a:ext cx="905760" cy="720080"/>
+            <a:off x="382123" y="4314938"/>
+            <a:ext cx="1017403" cy="720080"/>
           </a:xfrm>
           <a:prstGeom prst="rect">
             <a:avLst/>
@@ -46738,7 +46890,7 @@
                   <a:schemeClr val="bg2"/>
                 </a:solidFill>
               </a:rPr>
-              <a:t>Setup</a:t>
+              <a:t>Cenário</a:t>
             </a:r>
           </a:p>
         </p:txBody>
@@ -46757,7 +46909,7 @@
         </p:nvSpPr>
         <p:spPr>
           <a:xfrm>
-            <a:off x="7778821" y="2584778"/>
+            <a:off x="1628961" y="4530961"/>
             <a:ext cx="259361" cy="288032"/>
           </a:xfrm>
           <a:prstGeom prst="rightArrow">
@@ -46805,7 +46957,7 @@
         </p:nvSpPr>
         <p:spPr>
           <a:xfrm>
-            <a:off x="8267617" y="2368755"/>
+            <a:off x="2117757" y="4314938"/>
             <a:ext cx="1329332" cy="720080"/>
           </a:xfrm>
           <a:prstGeom prst="rect">
@@ -46832,18 +46984,13 @@
           <a:p>
             <a:pPr algn="ctr"/>
             <a:r>
-              <a:rPr lang="pt-BR" b="1" dirty="0" err="1">
+              <a:rPr lang="pt-BR" b="1" dirty="0">
                 <a:solidFill>
                   <a:schemeClr val="bg2"/>
                 </a:solidFill>
               </a:rPr>
-              <a:t>assert</a:t>
+              <a:t>Ação</a:t>
             </a:r>
-            <a:endParaRPr lang="pt-BR" b="1" dirty="0">
-              <a:solidFill>
-                <a:schemeClr val="bg2"/>
-              </a:solidFill>
-            </a:endParaRPr>
           </a:p>
         </p:txBody>
       </p:sp>
@@ -46861,7 +47008,7 @@
         </p:nvSpPr>
         <p:spPr>
           <a:xfrm>
-            <a:off x="9739295" y="2584778"/>
+            <a:off x="3589435" y="4530961"/>
             <a:ext cx="244695" cy="288032"/>
           </a:xfrm>
           <a:prstGeom prst="rightArrow">
@@ -46909,7 +47056,7 @@
         </p:nvSpPr>
         <p:spPr>
           <a:xfrm>
-            <a:off x="10126337" y="2372948"/>
+            <a:off x="3976477" y="4319131"/>
             <a:ext cx="1171141" cy="715887"/>
           </a:xfrm>
           <a:prstGeom prst="rect">
@@ -46936,27 +47083,22 @@
           <a:p>
             <a:pPr algn="ctr"/>
             <a:r>
-              <a:rPr lang="pt-BR" b="1" dirty="0" err="1">
+              <a:rPr lang="pt-BR" b="1" dirty="0">
                 <a:solidFill>
                   <a:schemeClr val="bg2"/>
                 </a:solidFill>
               </a:rPr>
-              <a:t>cleanup</a:t>
+              <a:t>Validação</a:t>
             </a:r>
-            <a:endParaRPr lang="pt-BR" b="1" dirty="0">
-              <a:solidFill>
-                <a:schemeClr val="bg2"/>
-              </a:solidFill>
-            </a:endParaRPr>
           </a:p>
         </p:txBody>
       </p:sp>
       <p:pic>
         <p:nvPicPr>
-          <p:cNvPr id="16" name="Imagem 15">
-            <a:extLst>
-              <a:ext uri="{FF2B5EF4-FFF2-40B4-BE49-F238E27FC236}">
-                <a16:creationId xmlns:a16="http://schemas.microsoft.com/office/drawing/2014/main" id="{0BC2E4F8-1A64-4DD7-A68E-726739843ACF}"/>
+          <p:cNvPr id="3" name="Imagem 2">
+            <a:extLst>
+              <a:ext uri="{FF2B5EF4-FFF2-40B4-BE49-F238E27FC236}">
+                <a16:creationId xmlns:a16="http://schemas.microsoft.com/office/drawing/2014/main" id="{522AA4E2-3CC3-4CDD-9174-CFF6A5128F87}"/>
               </a:ext>
             </a:extLst>
           </p:cNvPr>
@@ -46973,8 +47115,8 @@
         </p:blipFill>
         <p:spPr>
           <a:xfrm>
-            <a:off x="6405015" y="1154592"/>
-            <a:ext cx="5105400" cy="885825"/>
+            <a:off x="4997271" y="1018095"/>
+            <a:ext cx="6998136" cy="1438778"/>
           </a:xfrm>
           <a:prstGeom prst="rect">
             <a:avLst/>
@@ -46983,10 +47125,10 @@
       </p:pic>
       <p:pic>
         <p:nvPicPr>
-          <p:cNvPr id="19" name="Imagem 18">
-            <a:extLst>
-              <a:ext uri="{FF2B5EF4-FFF2-40B4-BE49-F238E27FC236}">
-                <a16:creationId xmlns:a16="http://schemas.microsoft.com/office/drawing/2014/main" id="{FDBF5B86-213F-4878-A294-A63F1AB3207B}"/>
+          <p:cNvPr id="6" name="Imagem 5">
+            <a:extLst>
+              <a:ext uri="{FF2B5EF4-FFF2-40B4-BE49-F238E27FC236}">
+                <a16:creationId xmlns:a16="http://schemas.microsoft.com/office/drawing/2014/main" id="{69937550-7873-410F-8659-B72F4B6E0039}"/>
               </a:ext>
             </a:extLst>
           </p:cNvPr>
@@ -47003,8 +47145,8 @@
         </p:blipFill>
         <p:spPr>
           <a:xfrm>
-            <a:off x="6531983" y="3595018"/>
-            <a:ext cx="4800600" cy="1876425"/>
+            <a:off x="6232782" y="2844391"/>
+            <a:ext cx="5762625" cy="3638550"/>
           </a:xfrm>
           <a:prstGeom prst="rect">
             <a:avLst/>
@@ -47042,7 +47184,7 @@
                             </p:stCondLst>
                             <p:childTnLst>
                               <p:par>
-                                <p:cTn id="5" presetID="42" presetClass="entr" presetSubtype="0" fill="hold" nodeType="clickEffect">
+                                <p:cTn id="5" presetID="47" presetClass="entr" presetSubtype="0" fill="hold" nodeType="clickEffect">
                                   <p:stCondLst>
                                     <p:cond delay="0"/>
                                   </p:stCondLst>
@@ -47055,7 +47197,7 @@
                                           </p:stCondLst>
                                         </p:cTn>
                                         <p:tgtEl>
-                                          <p:spTgt spid="16"/>
+                                          <p:spTgt spid="3"/>
                                         </p:tgtEl>
                                         <p:attrNameLst>
                                           <p:attrName>style.visibility</p:attrName>
@@ -47069,7 +47211,7 @@
                                       <p:cBhvr>
                                         <p:cTn id="7" dur="1000"/>
                                         <p:tgtEl>
-                                          <p:spTgt spid="16"/>
+                                          <p:spTgt spid="3"/>
                                         </p:tgtEl>
                                       </p:cBhvr>
                                     </p:animEffect>
@@ -47077,7 +47219,7 @@
                                       <p:cBhvr>
                                         <p:cTn id="8" dur="1000" fill="hold"/>
                                         <p:tgtEl>
-                                          <p:spTgt spid="16"/>
+                                          <p:spTgt spid="3"/>
                                         </p:tgtEl>
                                         <p:attrNameLst>
                                           <p:attrName>ppt_x</p:attrName>
@@ -47100,7 +47242,7 @@
                                       <p:cBhvr>
                                         <p:cTn id="9" dur="1000" fill="hold"/>
                                         <p:tgtEl>
-                                          <p:spTgt spid="16"/>
+                                          <p:spTgt spid="3"/>
                                         </p:tgtEl>
                                         <p:attrNameLst>
                                           <p:attrName>ppt_y</p:attrName>
@@ -47109,7 +47251,7 @@
                                       <p:tavLst>
                                         <p:tav tm="0">
                                           <p:val>
-                                            <p:strVal val="#ppt_y+.1"/>
+                                            <p:strVal val="#ppt_y-.1"/>
                                           </p:val>
                                         </p:tav>
                                         <p:tav tm="100000">
@@ -47141,7 +47283,7 @@
                             </p:stCondLst>
                             <p:childTnLst>
                               <p:par>
-                                <p:cTn id="12" presetID="42" presetClass="entr" presetSubtype="0" fill="hold" grpId="0" nodeType="clickEffect">
+                                <p:cTn id="12" presetID="47" presetClass="entr" presetSubtype="0" fill="hold" nodeType="clickEffect">
                                   <p:stCondLst>
                                     <p:cond delay="0"/>
                                   </p:stCondLst>
@@ -47154,7 +47296,7 @@
                                           </p:stCondLst>
                                         </p:cTn>
                                         <p:tgtEl>
-                                          <p:spTgt spid="11"/>
+                                          <p:spTgt spid="6"/>
                                         </p:tgtEl>
                                         <p:attrNameLst>
                                           <p:attrName>style.visibility</p:attrName>
@@ -47168,7 +47310,7 @@
                                       <p:cBhvr>
                                         <p:cTn id="14" dur="1000"/>
                                         <p:tgtEl>
-                                          <p:spTgt spid="11"/>
+                                          <p:spTgt spid="6"/>
                                         </p:tgtEl>
                                       </p:cBhvr>
                                     </p:animEffect>
@@ -47176,7 +47318,7 @@
                                       <p:cBhvr>
                                         <p:cTn id="15" dur="1000" fill="hold"/>
                                         <p:tgtEl>
-                                          <p:spTgt spid="11"/>
+                                          <p:spTgt spid="6"/>
                                         </p:tgtEl>
                                         <p:attrNameLst>
                                           <p:attrName>ppt_x</p:attrName>
@@ -47199,7 +47341,7 @@
                                       <p:cBhvr>
                                         <p:cTn id="16" dur="1000" fill="hold"/>
                                         <p:tgtEl>
-                                          <p:spTgt spid="11"/>
+                                          <p:spTgt spid="6"/>
                                         </p:tgtEl>
                                         <p:attrNameLst>
                                           <p:attrName>ppt_y</p:attrName>
@@ -47208,331 +47350,7 @@
                                       <p:tavLst>
                                         <p:tav tm="0">
                                           <p:val>
-                                            <p:strVal val="#ppt_y+.1"/>
-                                          </p:val>
-                                        </p:tav>
-                                        <p:tav tm="100000">
-                                          <p:val>
-                                            <p:strVal val="#ppt_y"/>
-                                          </p:val>
-                                        </p:tav>
-                                      </p:tavLst>
-                                    </p:anim>
-                                  </p:childTnLst>
-                                </p:cTn>
-                              </p:par>
-                              <p:par>
-                                <p:cTn id="17" presetID="42" presetClass="entr" presetSubtype="0" fill="hold" grpId="0" nodeType="withEffect">
-                                  <p:stCondLst>
-                                    <p:cond delay="0"/>
-                                  </p:stCondLst>
-                                  <p:childTnLst>
-                                    <p:set>
-                                      <p:cBhvr>
-                                        <p:cTn id="18" dur="1" fill="hold">
-                                          <p:stCondLst>
-                                            <p:cond delay="0"/>
-                                          </p:stCondLst>
-                                        </p:cTn>
-                                        <p:tgtEl>
-                                          <p:spTgt spid="12"/>
-                                        </p:tgtEl>
-                                        <p:attrNameLst>
-                                          <p:attrName>style.visibility</p:attrName>
-                                        </p:attrNameLst>
-                                      </p:cBhvr>
-                                      <p:to>
-                                        <p:strVal val="visible"/>
-                                      </p:to>
-                                    </p:set>
-                                    <p:animEffect transition="in" filter="fade">
-                                      <p:cBhvr>
-                                        <p:cTn id="19" dur="1000"/>
-                                        <p:tgtEl>
-                                          <p:spTgt spid="12"/>
-                                        </p:tgtEl>
-                                      </p:cBhvr>
-                                    </p:animEffect>
-                                    <p:anim calcmode="lin" valueType="num">
-                                      <p:cBhvr>
-                                        <p:cTn id="20" dur="1000" fill="hold"/>
-                                        <p:tgtEl>
-                                          <p:spTgt spid="12"/>
-                                        </p:tgtEl>
-                                        <p:attrNameLst>
-                                          <p:attrName>ppt_x</p:attrName>
-                                        </p:attrNameLst>
-                                      </p:cBhvr>
-                                      <p:tavLst>
-                                        <p:tav tm="0">
-                                          <p:val>
-                                            <p:strVal val="#ppt_x"/>
-                                          </p:val>
-                                        </p:tav>
-                                        <p:tav tm="100000">
-                                          <p:val>
-                                            <p:strVal val="#ppt_x"/>
-                                          </p:val>
-                                        </p:tav>
-                                      </p:tavLst>
-                                    </p:anim>
-                                    <p:anim calcmode="lin" valueType="num">
-                                      <p:cBhvr>
-                                        <p:cTn id="21" dur="1000" fill="hold"/>
-                                        <p:tgtEl>
-                                          <p:spTgt spid="12"/>
-                                        </p:tgtEl>
-                                        <p:attrNameLst>
-                                          <p:attrName>ppt_y</p:attrName>
-                                        </p:attrNameLst>
-                                      </p:cBhvr>
-                                      <p:tavLst>
-                                        <p:tav tm="0">
-                                          <p:val>
-                                            <p:strVal val="#ppt_y+.1"/>
-                                          </p:val>
-                                        </p:tav>
-                                        <p:tav tm="100000">
-                                          <p:val>
-                                            <p:strVal val="#ppt_y"/>
-                                          </p:val>
-                                        </p:tav>
-                                      </p:tavLst>
-                                    </p:anim>
-                                  </p:childTnLst>
-                                </p:cTn>
-                              </p:par>
-                              <p:par>
-                                <p:cTn id="22" presetID="42" presetClass="entr" presetSubtype="0" fill="hold" grpId="0" nodeType="withEffect">
-                                  <p:stCondLst>
-                                    <p:cond delay="0"/>
-                                  </p:stCondLst>
-                                  <p:childTnLst>
-                                    <p:set>
-                                      <p:cBhvr>
-                                        <p:cTn id="23" dur="1" fill="hold">
-                                          <p:stCondLst>
-                                            <p:cond delay="0"/>
-                                          </p:stCondLst>
-                                        </p:cTn>
-                                        <p:tgtEl>
-                                          <p:spTgt spid="13"/>
-                                        </p:tgtEl>
-                                        <p:attrNameLst>
-                                          <p:attrName>style.visibility</p:attrName>
-                                        </p:attrNameLst>
-                                      </p:cBhvr>
-                                      <p:to>
-                                        <p:strVal val="visible"/>
-                                      </p:to>
-                                    </p:set>
-                                    <p:animEffect transition="in" filter="fade">
-                                      <p:cBhvr>
-                                        <p:cTn id="24" dur="1000"/>
-                                        <p:tgtEl>
-                                          <p:spTgt spid="13"/>
-                                        </p:tgtEl>
-                                      </p:cBhvr>
-                                    </p:animEffect>
-                                    <p:anim calcmode="lin" valueType="num">
-                                      <p:cBhvr>
-                                        <p:cTn id="25" dur="1000" fill="hold"/>
-                                        <p:tgtEl>
-                                          <p:spTgt spid="13"/>
-                                        </p:tgtEl>
-                                        <p:attrNameLst>
-                                          <p:attrName>ppt_x</p:attrName>
-                                        </p:attrNameLst>
-                                      </p:cBhvr>
-                                      <p:tavLst>
-                                        <p:tav tm="0">
-                                          <p:val>
-                                            <p:strVal val="#ppt_x"/>
-                                          </p:val>
-                                        </p:tav>
-                                        <p:tav tm="100000">
-                                          <p:val>
-                                            <p:strVal val="#ppt_x"/>
-                                          </p:val>
-                                        </p:tav>
-                                      </p:tavLst>
-                                    </p:anim>
-                                    <p:anim calcmode="lin" valueType="num">
-                                      <p:cBhvr>
-                                        <p:cTn id="26" dur="1000" fill="hold"/>
-                                        <p:tgtEl>
-                                          <p:spTgt spid="13"/>
-                                        </p:tgtEl>
-                                        <p:attrNameLst>
-                                          <p:attrName>ppt_y</p:attrName>
-                                        </p:attrNameLst>
-                                      </p:cBhvr>
-                                      <p:tavLst>
-                                        <p:tav tm="0">
-                                          <p:val>
-                                            <p:strVal val="#ppt_y+.1"/>
-                                          </p:val>
-                                        </p:tav>
-                                        <p:tav tm="100000">
-                                          <p:val>
-                                            <p:strVal val="#ppt_y"/>
-                                          </p:val>
-                                        </p:tav>
-                                      </p:tavLst>
-                                    </p:anim>
-                                  </p:childTnLst>
-                                </p:cTn>
-                              </p:par>
-                              <p:par>
-                                <p:cTn id="27" presetID="42" presetClass="entr" presetSubtype="0" fill="hold" grpId="0" nodeType="withEffect">
-                                  <p:stCondLst>
-                                    <p:cond delay="0"/>
-                                  </p:stCondLst>
-                                  <p:childTnLst>
-                                    <p:set>
-                                      <p:cBhvr>
-                                        <p:cTn id="28" dur="1" fill="hold">
-                                          <p:stCondLst>
-                                            <p:cond delay="0"/>
-                                          </p:stCondLst>
-                                        </p:cTn>
-                                        <p:tgtEl>
-                                          <p:spTgt spid="14"/>
-                                        </p:tgtEl>
-                                        <p:attrNameLst>
-                                          <p:attrName>style.visibility</p:attrName>
-                                        </p:attrNameLst>
-                                      </p:cBhvr>
-                                      <p:to>
-                                        <p:strVal val="visible"/>
-                                      </p:to>
-                                    </p:set>
-                                    <p:animEffect transition="in" filter="fade">
-                                      <p:cBhvr>
-                                        <p:cTn id="29" dur="1000"/>
-                                        <p:tgtEl>
-                                          <p:spTgt spid="14"/>
-                                        </p:tgtEl>
-                                      </p:cBhvr>
-                                    </p:animEffect>
-                                    <p:anim calcmode="lin" valueType="num">
-                                      <p:cBhvr>
-                                        <p:cTn id="30" dur="1000" fill="hold"/>
-                                        <p:tgtEl>
-                                          <p:spTgt spid="14"/>
-                                        </p:tgtEl>
-                                        <p:attrNameLst>
-                                          <p:attrName>ppt_x</p:attrName>
-                                        </p:attrNameLst>
-                                      </p:cBhvr>
-                                      <p:tavLst>
-                                        <p:tav tm="0">
-                                          <p:val>
-                                            <p:strVal val="#ppt_x"/>
-                                          </p:val>
-                                        </p:tav>
-                                        <p:tav tm="100000">
-                                          <p:val>
-                                            <p:strVal val="#ppt_x"/>
-                                          </p:val>
-                                        </p:tav>
-                                      </p:tavLst>
-                                    </p:anim>
-                                    <p:anim calcmode="lin" valueType="num">
-                                      <p:cBhvr>
-                                        <p:cTn id="31" dur="1000" fill="hold"/>
-                                        <p:tgtEl>
-                                          <p:spTgt spid="14"/>
-                                        </p:tgtEl>
-                                        <p:attrNameLst>
-                                          <p:attrName>ppt_y</p:attrName>
-                                        </p:attrNameLst>
-                                      </p:cBhvr>
-                                      <p:tavLst>
-                                        <p:tav tm="0">
-                                          <p:val>
-                                            <p:strVal val="#ppt_y+.1"/>
-                                          </p:val>
-                                        </p:tav>
-                                        <p:tav tm="100000">
-                                          <p:val>
-                                            <p:strVal val="#ppt_y"/>
-                                          </p:val>
-                                        </p:tav>
-                                      </p:tavLst>
-                                    </p:anim>
-                                  </p:childTnLst>
-                                </p:cTn>
-                              </p:par>
-                              <p:par>
-                                <p:cTn id="32" presetID="42" presetClass="entr" presetSubtype="0" fill="hold" grpId="0" nodeType="withEffect">
-                                  <p:stCondLst>
-                                    <p:cond delay="0"/>
-                                  </p:stCondLst>
-                                  <p:childTnLst>
-                                    <p:set>
-                                      <p:cBhvr>
-                                        <p:cTn id="33" dur="1" fill="hold">
-                                          <p:stCondLst>
-                                            <p:cond delay="0"/>
-                                          </p:stCondLst>
-                                        </p:cTn>
-                                        <p:tgtEl>
-                                          <p:spTgt spid="15"/>
-                                        </p:tgtEl>
-                                        <p:attrNameLst>
-                                          <p:attrName>style.visibility</p:attrName>
-                                        </p:attrNameLst>
-                                      </p:cBhvr>
-                                      <p:to>
-                                        <p:strVal val="visible"/>
-                                      </p:to>
-                                    </p:set>
-                                    <p:animEffect transition="in" filter="fade">
-                                      <p:cBhvr>
-                                        <p:cTn id="34" dur="1000"/>
-                                        <p:tgtEl>
-                                          <p:spTgt spid="15"/>
-                                        </p:tgtEl>
-                                      </p:cBhvr>
-                                    </p:animEffect>
-                                    <p:anim calcmode="lin" valueType="num">
-                                      <p:cBhvr>
-                                        <p:cTn id="35" dur="1000" fill="hold"/>
-                                        <p:tgtEl>
-                                          <p:spTgt spid="15"/>
-                                        </p:tgtEl>
-                                        <p:attrNameLst>
-                                          <p:attrName>ppt_x</p:attrName>
-                                        </p:attrNameLst>
-                                      </p:cBhvr>
-                                      <p:tavLst>
-                                        <p:tav tm="0">
-                                          <p:val>
-                                            <p:strVal val="#ppt_x"/>
-                                          </p:val>
-                                        </p:tav>
-                                        <p:tav tm="100000">
-                                          <p:val>
-                                            <p:strVal val="#ppt_x"/>
-                                          </p:val>
-                                        </p:tav>
-                                      </p:tavLst>
-                                    </p:anim>
-                                    <p:anim calcmode="lin" valueType="num">
-                                      <p:cBhvr>
-                                        <p:cTn id="36" dur="1000" fill="hold"/>
-                                        <p:tgtEl>
-                                          <p:spTgt spid="15"/>
-                                        </p:tgtEl>
-                                        <p:attrNameLst>
-                                          <p:attrName>ppt_y</p:attrName>
-                                        </p:attrNameLst>
-                                      </p:cBhvr>
-                                      <p:tavLst>
-                                        <p:tav tm="0">
-                                          <p:val>
-                                            <p:strVal val="#ppt_y+.1"/>
+                                            <p:strVal val="#ppt_y-.1"/>
                                           </p:val>
                                         </p:tav>
                                         <p:tav tm="100000">
@@ -47552,32 +47370,32 @@
                     </p:cTn>
                   </p:par>
                   <p:par>
-                    <p:cTn id="37" fill="hold">
+                    <p:cTn id="17" fill="hold">
                       <p:stCondLst>
                         <p:cond delay="indefinite"/>
                       </p:stCondLst>
                       <p:childTnLst>
                         <p:par>
-                          <p:cTn id="38" fill="hold">
+                          <p:cTn id="18" fill="hold">
                             <p:stCondLst>
                               <p:cond delay="0"/>
                             </p:stCondLst>
                             <p:childTnLst>
                               <p:par>
-                                <p:cTn id="39" presetID="16" presetClass="entr" presetSubtype="21" fill="hold" nodeType="clickEffect">
+                                <p:cTn id="19" presetID="53" presetClass="entr" presetSubtype="16" fill="hold" grpId="0" nodeType="clickEffect">
                                   <p:stCondLst>
                                     <p:cond delay="0"/>
                                   </p:stCondLst>
                                   <p:childTnLst>
                                     <p:set>
                                       <p:cBhvr>
-                                        <p:cTn id="40" dur="1" fill="hold">
+                                        <p:cTn id="20" dur="1" fill="hold">
                                           <p:stCondLst>
                                             <p:cond delay="0"/>
                                           </p:stCondLst>
                                         </p:cTn>
                                         <p:tgtEl>
-                                          <p:spTgt spid="19"/>
+                                          <p:spTgt spid="11"/>
                                         </p:tgtEl>
                                         <p:attrNameLst>
                                           <p:attrName>style.visibility</p:attrName>
@@ -47587,11 +47405,417 @@
                                         <p:strVal val="visible"/>
                                       </p:to>
                                     </p:set>
-                                    <p:animEffect transition="in" filter="barn(inVertical)">
+                                    <p:anim calcmode="lin" valueType="num">
                                       <p:cBhvr>
-                                        <p:cTn id="41" dur="500"/>
+                                        <p:cTn id="21" dur="500" fill="hold"/>
                                         <p:tgtEl>
-                                          <p:spTgt spid="19"/>
+                                          <p:spTgt spid="11"/>
+                                        </p:tgtEl>
+                                        <p:attrNameLst>
+                                          <p:attrName>ppt_w</p:attrName>
+                                        </p:attrNameLst>
+                                      </p:cBhvr>
+                                      <p:tavLst>
+                                        <p:tav tm="0">
+                                          <p:val>
+                                            <p:fltVal val="0"/>
+                                          </p:val>
+                                        </p:tav>
+                                        <p:tav tm="100000">
+                                          <p:val>
+                                            <p:strVal val="#ppt_w"/>
+                                          </p:val>
+                                        </p:tav>
+                                      </p:tavLst>
+                                    </p:anim>
+                                    <p:anim calcmode="lin" valueType="num">
+                                      <p:cBhvr>
+                                        <p:cTn id="22" dur="500" fill="hold"/>
+                                        <p:tgtEl>
+                                          <p:spTgt spid="11"/>
+                                        </p:tgtEl>
+                                        <p:attrNameLst>
+                                          <p:attrName>ppt_h</p:attrName>
+                                        </p:attrNameLst>
+                                      </p:cBhvr>
+                                      <p:tavLst>
+                                        <p:tav tm="0">
+                                          <p:val>
+                                            <p:fltVal val="0"/>
+                                          </p:val>
+                                        </p:tav>
+                                        <p:tav tm="100000">
+                                          <p:val>
+                                            <p:strVal val="#ppt_h"/>
+                                          </p:val>
+                                        </p:tav>
+                                      </p:tavLst>
+                                    </p:anim>
+                                    <p:animEffect transition="in" filter="fade">
+                                      <p:cBhvr>
+                                        <p:cTn id="23" dur="500"/>
+                                        <p:tgtEl>
+                                          <p:spTgt spid="11"/>
+                                        </p:tgtEl>
+                                      </p:cBhvr>
+                                    </p:animEffect>
+                                  </p:childTnLst>
+                                </p:cTn>
+                              </p:par>
+                            </p:childTnLst>
+                          </p:cTn>
+                        </p:par>
+                      </p:childTnLst>
+                    </p:cTn>
+                  </p:par>
+                  <p:par>
+                    <p:cTn id="24" fill="hold">
+                      <p:stCondLst>
+                        <p:cond delay="indefinite"/>
+                      </p:stCondLst>
+                      <p:childTnLst>
+                        <p:par>
+                          <p:cTn id="25" fill="hold">
+                            <p:stCondLst>
+                              <p:cond delay="0"/>
+                            </p:stCondLst>
+                            <p:childTnLst>
+                              <p:par>
+                                <p:cTn id="26" presetID="53" presetClass="entr" presetSubtype="16" fill="hold" grpId="0" nodeType="clickEffect">
+                                  <p:stCondLst>
+                                    <p:cond delay="0"/>
+                                  </p:stCondLst>
+                                  <p:childTnLst>
+                                    <p:set>
+                                      <p:cBhvr>
+                                        <p:cTn id="27" dur="1" fill="hold">
+                                          <p:stCondLst>
+                                            <p:cond delay="0"/>
+                                          </p:stCondLst>
+                                        </p:cTn>
+                                        <p:tgtEl>
+                                          <p:spTgt spid="12"/>
+                                        </p:tgtEl>
+                                        <p:attrNameLst>
+                                          <p:attrName>style.visibility</p:attrName>
+                                        </p:attrNameLst>
+                                      </p:cBhvr>
+                                      <p:to>
+                                        <p:strVal val="visible"/>
+                                      </p:to>
+                                    </p:set>
+                                    <p:anim calcmode="lin" valueType="num">
+                                      <p:cBhvr>
+                                        <p:cTn id="28" dur="500" fill="hold"/>
+                                        <p:tgtEl>
+                                          <p:spTgt spid="12"/>
+                                        </p:tgtEl>
+                                        <p:attrNameLst>
+                                          <p:attrName>ppt_w</p:attrName>
+                                        </p:attrNameLst>
+                                      </p:cBhvr>
+                                      <p:tavLst>
+                                        <p:tav tm="0">
+                                          <p:val>
+                                            <p:fltVal val="0"/>
+                                          </p:val>
+                                        </p:tav>
+                                        <p:tav tm="100000">
+                                          <p:val>
+                                            <p:strVal val="#ppt_w"/>
+                                          </p:val>
+                                        </p:tav>
+                                      </p:tavLst>
+                                    </p:anim>
+                                    <p:anim calcmode="lin" valueType="num">
+                                      <p:cBhvr>
+                                        <p:cTn id="29" dur="500" fill="hold"/>
+                                        <p:tgtEl>
+                                          <p:spTgt spid="12"/>
+                                        </p:tgtEl>
+                                        <p:attrNameLst>
+                                          <p:attrName>ppt_h</p:attrName>
+                                        </p:attrNameLst>
+                                      </p:cBhvr>
+                                      <p:tavLst>
+                                        <p:tav tm="0">
+                                          <p:val>
+                                            <p:fltVal val="0"/>
+                                          </p:val>
+                                        </p:tav>
+                                        <p:tav tm="100000">
+                                          <p:val>
+                                            <p:strVal val="#ppt_h"/>
+                                          </p:val>
+                                        </p:tav>
+                                      </p:tavLst>
+                                    </p:anim>
+                                    <p:animEffect transition="in" filter="fade">
+                                      <p:cBhvr>
+                                        <p:cTn id="30" dur="500"/>
+                                        <p:tgtEl>
+                                          <p:spTgt spid="12"/>
+                                        </p:tgtEl>
+                                      </p:cBhvr>
+                                    </p:animEffect>
+                                  </p:childTnLst>
+                                </p:cTn>
+                              </p:par>
+                              <p:par>
+                                <p:cTn id="31" presetID="53" presetClass="entr" presetSubtype="16" fill="hold" grpId="0" nodeType="withEffect">
+                                  <p:stCondLst>
+                                    <p:cond delay="0"/>
+                                  </p:stCondLst>
+                                  <p:childTnLst>
+                                    <p:set>
+                                      <p:cBhvr>
+                                        <p:cTn id="32" dur="1" fill="hold">
+                                          <p:stCondLst>
+                                            <p:cond delay="0"/>
+                                          </p:stCondLst>
+                                        </p:cTn>
+                                        <p:tgtEl>
+                                          <p:spTgt spid="13"/>
+                                        </p:tgtEl>
+                                        <p:attrNameLst>
+                                          <p:attrName>style.visibility</p:attrName>
+                                        </p:attrNameLst>
+                                      </p:cBhvr>
+                                      <p:to>
+                                        <p:strVal val="visible"/>
+                                      </p:to>
+                                    </p:set>
+                                    <p:anim calcmode="lin" valueType="num">
+                                      <p:cBhvr>
+                                        <p:cTn id="33" dur="500" fill="hold"/>
+                                        <p:tgtEl>
+                                          <p:spTgt spid="13"/>
+                                        </p:tgtEl>
+                                        <p:attrNameLst>
+                                          <p:attrName>ppt_w</p:attrName>
+                                        </p:attrNameLst>
+                                      </p:cBhvr>
+                                      <p:tavLst>
+                                        <p:tav tm="0">
+                                          <p:val>
+                                            <p:fltVal val="0"/>
+                                          </p:val>
+                                        </p:tav>
+                                        <p:tav tm="100000">
+                                          <p:val>
+                                            <p:strVal val="#ppt_w"/>
+                                          </p:val>
+                                        </p:tav>
+                                      </p:tavLst>
+                                    </p:anim>
+                                    <p:anim calcmode="lin" valueType="num">
+                                      <p:cBhvr>
+                                        <p:cTn id="34" dur="500" fill="hold"/>
+                                        <p:tgtEl>
+                                          <p:spTgt spid="13"/>
+                                        </p:tgtEl>
+                                        <p:attrNameLst>
+                                          <p:attrName>ppt_h</p:attrName>
+                                        </p:attrNameLst>
+                                      </p:cBhvr>
+                                      <p:tavLst>
+                                        <p:tav tm="0">
+                                          <p:val>
+                                            <p:fltVal val="0"/>
+                                          </p:val>
+                                        </p:tav>
+                                        <p:tav tm="100000">
+                                          <p:val>
+                                            <p:strVal val="#ppt_h"/>
+                                          </p:val>
+                                        </p:tav>
+                                      </p:tavLst>
+                                    </p:anim>
+                                    <p:animEffect transition="in" filter="fade">
+                                      <p:cBhvr>
+                                        <p:cTn id="35" dur="500"/>
+                                        <p:tgtEl>
+                                          <p:spTgt spid="13"/>
+                                        </p:tgtEl>
+                                      </p:cBhvr>
+                                    </p:animEffect>
+                                  </p:childTnLst>
+                                </p:cTn>
+                              </p:par>
+                            </p:childTnLst>
+                          </p:cTn>
+                        </p:par>
+                      </p:childTnLst>
+                    </p:cTn>
+                  </p:par>
+                  <p:par>
+                    <p:cTn id="36" fill="hold">
+                      <p:stCondLst>
+                        <p:cond delay="indefinite"/>
+                      </p:stCondLst>
+                      <p:childTnLst>
+                        <p:par>
+                          <p:cTn id="37" fill="hold">
+                            <p:stCondLst>
+                              <p:cond delay="0"/>
+                            </p:stCondLst>
+                            <p:childTnLst>
+                              <p:par>
+                                <p:cTn id="38" presetID="53" presetClass="entr" presetSubtype="16" fill="hold" grpId="0" nodeType="clickEffect">
+                                  <p:stCondLst>
+                                    <p:cond delay="0"/>
+                                  </p:stCondLst>
+                                  <p:childTnLst>
+                                    <p:set>
+                                      <p:cBhvr>
+                                        <p:cTn id="39" dur="1" fill="hold">
+                                          <p:stCondLst>
+                                            <p:cond delay="0"/>
+                                          </p:stCondLst>
+                                        </p:cTn>
+                                        <p:tgtEl>
+                                          <p:spTgt spid="14"/>
+                                        </p:tgtEl>
+                                        <p:attrNameLst>
+                                          <p:attrName>style.visibility</p:attrName>
+                                        </p:attrNameLst>
+                                      </p:cBhvr>
+                                      <p:to>
+                                        <p:strVal val="visible"/>
+                                      </p:to>
+                                    </p:set>
+                                    <p:anim calcmode="lin" valueType="num">
+                                      <p:cBhvr>
+                                        <p:cTn id="40" dur="500" fill="hold"/>
+                                        <p:tgtEl>
+                                          <p:spTgt spid="14"/>
+                                        </p:tgtEl>
+                                        <p:attrNameLst>
+                                          <p:attrName>ppt_w</p:attrName>
+                                        </p:attrNameLst>
+                                      </p:cBhvr>
+                                      <p:tavLst>
+                                        <p:tav tm="0">
+                                          <p:val>
+                                            <p:fltVal val="0"/>
+                                          </p:val>
+                                        </p:tav>
+                                        <p:tav tm="100000">
+                                          <p:val>
+                                            <p:strVal val="#ppt_w"/>
+                                          </p:val>
+                                        </p:tav>
+                                      </p:tavLst>
+                                    </p:anim>
+                                    <p:anim calcmode="lin" valueType="num">
+                                      <p:cBhvr>
+                                        <p:cTn id="41" dur="500" fill="hold"/>
+                                        <p:tgtEl>
+                                          <p:spTgt spid="14"/>
+                                        </p:tgtEl>
+                                        <p:attrNameLst>
+                                          <p:attrName>ppt_h</p:attrName>
+                                        </p:attrNameLst>
+                                      </p:cBhvr>
+                                      <p:tavLst>
+                                        <p:tav tm="0">
+                                          <p:val>
+                                            <p:fltVal val="0"/>
+                                          </p:val>
+                                        </p:tav>
+                                        <p:tav tm="100000">
+                                          <p:val>
+                                            <p:strVal val="#ppt_h"/>
+                                          </p:val>
+                                        </p:tav>
+                                      </p:tavLst>
+                                    </p:anim>
+                                    <p:animEffect transition="in" filter="fade">
+                                      <p:cBhvr>
+                                        <p:cTn id="42" dur="500"/>
+                                        <p:tgtEl>
+                                          <p:spTgt spid="14"/>
+                                        </p:tgtEl>
+                                      </p:cBhvr>
+                                    </p:animEffect>
+                                  </p:childTnLst>
+                                </p:cTn>
+                              </p:par>
+                              <p:par>
+                                <p:cTn id="43" presetID="53" presetClass="entr" presetSubtype="16" fill="hold" grpId="0" nodeType="withEffect">
+                                  <p:stCondLst>
+                                    <p:cond delay="0"/>
+                                  </p:stCondLst>
+                                  <p:childTnLst>
+                                    <p:set>
+                                      <p:cBhvr>
+                                        <p:cTn id="44" dur="1" fill="hold">
+                                          <p:stCondLst>
+                                            <p:cond delay="0"/>
+                                          </p:stCondLst>
+                                        </p:cTn>
+                                        <p:tgtEl>
+                                          <p:spTgt spid="15"/>
+                                        </p:tgtEl>
+                                        <p:attrNameLst>
+                                          <p:attrName>style.visibility</p:attrName>
+                                        </p:attrNameLst>
+                                      </p:cBhvr>
+                                      <p:to>
+                                        <p:strVal val="visible"/>
+                                      </p:to>
+                                    </p:set>
+                                    <p:anim calcmode="lin" valueType="num">
+                                      <p:cBhvr>
+                                        <p:cTn id="45" dur="500" fill="hold"/>
+                                        <p:tgtEl>
+                                          <p:spTgt spid="15"/>
+                                        </p:tgtEl>
+                                        <p:attrNameLst>
+                                          <p:attrName>ppt_w</p:attrName>
+                                        </p:attrNameLst>
+                                      </p:cBhvr>
+                                      <p:tavLst>
+                                        <p:tav tm="0">
+                                          <p:val>
+                                            <p:fltVal val="0"/>
+                                          </p:val>
+                                        </p:tav>
+                                        <p:tav tm="100000">
+                                          <p:val>
+                                            <p:strVal val="#ppt_w"/>
+                                          </p:val>
+                                        </p:tav>
+                                      </p:tavLst>
+                                    </p:anim>
+                                    <p:anim calcmode="lin" valueType="num">
+                                      <p:cBhvr>
+                                        <p:cTn id="46" dur="500" fill="hold"/>
+                                        <p:tgtEl>
+                                          <p:spTgt spid="15"/>
+                                        </p:tgtEl>
+                                        <p:attrNameLst>
+                                          <p:attrName>ppt_h</p:attrName>
+                                        </p:attrNameLst>
+                                      </p:cBhvr>
+                                      <p:tavLst>
+                                        <p:tav tm="0">
+                                          <p:val>
+                                            <p:fltVal val="0"/>
+                                          </p:val>
+                                        </p:tav>
+                                        <p:tav tm="100000">
+                                          <p:val>
+                                            <p:strVal val="#ppt_h"/>
+                                          </p:val>
+                                        </p:tav>
+                                      </p:tavLst>
+                                    </p:anim>
+                                    <p:animEffect transition="in" filter="fade">
+                                      <p:cBhvr>
+                                        <p:cTn id="47" dur="500"/>
+                                        <p:tgtEl>
+                                          <p:spTgt spid="15"/>
                                         </p:tgtEl>
                                       </p:cBhvr>
                                     </p:animEffect>

</xml_diff>

<commit_message>
Ajuste na apresentação de teste unitário
</commit_message>
<xml_diff>
--- a/Teste Unitário/Porque criar testes unitários.pptx
+++ b/Teste Unitário/Porque criar testes unitários.pptx
@@ -5,10 +5,10 @@
     <p:sldMasterId id="2147483648" r:id="rId1"/>
   </p:sldMasterIdLst>
   <p:notesMasterIdLst>
-    <p:notesMasterId r:id="rId13"/>
+    <p:notesMasterId r:id="rId15"/>
   </p:notesMasterIdLst>
   <p:handoutMasterIdLst>
-    <p:handoutMasterId r:id="rId14"/>
+    <p:handoutMasterId r:id="rId16"/>
   </p:handoutMasterIdLst>
   <p:sldIdLst>
     <p:sldId id="256" r:id="rId2"/>
@@ -16,12 +16,14 @@
     <p:sldId id="259" r:id="rId4"/>
     <p:sldId id="283" r:id="rId5"/>
     <p:sldId id="293" r:id="rId6"/>
-    <p:sldId id="290" r:id="rId7"/>
+    <p:sldId id="292" r:id="rId7"/>
     <p:sldId id="289" r:id="rId8"/>
     <p:sldId id="291" r:id="rId9"/>
-    <p:sldId id="292" r:id="rId10"/>
-    <p:sldId id="282" r:id="rId11"/>
-    <p:sldId id="294" r:id="rId12"/>
+    <p:sldId id="290" r:id="rId10"/>
+    <p:sldId id="295" r:id="rId11"/>
+    <p:sldId id="296" r:id="rId12"/>
+    <p:sldId id="282" r:id="rId13"/>
+    <p:sldId id="294" r:id="rId14"/>
   </p:sldIdLst>
   <p:sldSz cx="12192000" cy="6858000"/>
   <p:notesSz cx="6858000" cy="9144000"/>
@@ -251,7 +253,7 @@
             <a:pPr rtl="0"/>
             <a:fld id="{8DC2C244-6829-4B52-AFD3-381E093F71A6}" type="datetime1">
               <a:rPr lang="pt-BR" smtClean="0"/>
-              <a:t>18/10/2019</a:t>
+              <a:t>19/10/2019</a:t>
             </a:fld>
             <a:endParaRPr lang="pt-BR" dirty="0"/>
           </a:p>
@@ -433,7 +435,7 @@
             <a:fld id="{AB10262D-E9DC-4045-91D2-115DECAEB60A}" type="datetime1">
               <a:rPr lang="pt-BR" smtClean="0"/>
               <a:pPr/>
-              <a:t>18/10/2019</a:t>
+              <a:t>19/10/2019</a:t>
             </a:fld>
             <a:endParaRPr lang="pt-BR" dirty="0"/>
           </a:p>
@@ -1126,7 +1128,7 @@
             <a:pPr rtl="0"/>
             <a:fld id="{6FC40A10-6036-4879-816D-55C01FC94846}" type="slidenum">
               <a:rPr lang="pt-BR" noProof="0" smtClean="0"/>
-              <a:t>10</a:t>
+              <a:t>12</a:t>
             </a:fld>
             <a:endParaRPr lang="pt-BR" noProof="0" dirty="0"/>
           </a:p>
@@ -1214,7 +1216,7 @@
             <a:pPr rtl="0"/>
             <a:fld id="{6FC40A10-6036-4879-816D-55C01FC94846}" type="slidenum">
               <a:rPr lang="pt-BR" noProof="0" smtClean="0"/>
-              <a:t>11</a:t>
+              <a:t>13</a:t>
             </a:fld>
             <a:endParaRPr lang="pt-BR" noProof="0" dirty="0"/>
           </a:p>
@@ -44435,23 +44437,64 @@
           </a:bodyPr>
           <a:lstStyle/>
           <a:p>
-            <a:pPr rtl="0"/>
             <a:r>
               <a:rPr lang="pt-BR" sz="3200" dirty="0">
                 <a:solidFill>
                   <a:schemeClr val="bg2"/>
                 </a:solidFill>
               </a:rPr>
-              <a:t>Por que criar?</a:t>
+              <a:t>O que são e por que criar testes unitários?</a:t>
             </a:r>
-            <a:endParaRPr lang="pt-BR" dirty="0">
-              <a:solidFill>
-                <a:schemeClr val="bg2"/>
-              </a:solidFill>
-            </a:endParaRPr>
-          </a:p>
-        </p:txBody>
-      </p:sp>
+          </a:p>
+        </p:txBody>
+      </p:sp>
+      <p:pic>
+        <p:nvPicPr>
+          <p:cNvPr id="6" name="Picture 2" descr="Resultado de imagem para amaggi png">
+            <a:extLst>
+              <a:ext uri="{FF2B5EF4-FFF2-40B4-BE49-F238E27FC236}">
+                <a16:creationId xmlns:a16="http://schemas.microsoft.com/office/drawing/2014/main" id="{60413CB6-BFBC-4202-A3BF-1788D4A9312F}"/>
+              </a:ext>
+            </a:extLst>
+          </p:cNvPr>
+          <p:cNvPicPr>
+            <a:picLocks noChangeAspect="1" noChangeArrowheads="1"/>
+          </p:cNvPicPr>
+          <p:nvPr/>
+        </p:nvPicPr>
+        <p:blipFill>
+          <a:blip r:embed="rId3">
+            <a:extLst>
+              <a:ext uri="{28A0092B-C50C-407E-A947-70E740481C1C}">
+                <a14:useLocalDpi xmlns:a14="http://schemas.microsoft.com/office/drawing/2010/main" val="0"/>
+              </a:ext>
+            </a:extLst>
+          </a:blip>
+          <a:srcRect/>
+          <a:stretch>
+            <a:fillRect/>
+          </a:stretch>
+        </p:blipFill>
+        <p:spPr bwMode="auto">
+          <a:xfrm>
+            <a:off x="141403" y="6339434"/>
+            <a:ext cx="4056667" cy="386651"/>
+          </a:xfrm>
+          <a:prstGeom prst="rect">
+            <a:avLst/>
+          </a:prstGeom>
+          <a:noFill/>
+          <a:extLst>
+            <a:ext uri="{909E8E84-426E-40DD-AFC4-6F175D3DCCD1}">
+              <a14:hiddenFill xmlns:a14="http://schemas.microsoft.com/office/drawing/2010/main">
+                <a:solidFill>
+                  <a:srgbClr val="FFFFFF"/>
+                </a:solidFill>
+              </a14:hiddenFill>
+            </a:ext>
+          </a:extLst>
+        </p:spPr>
+      </p:pic>
     </p:spTree>
     <p:extLst>
       <p:ext uri="{BB962C8B-B14F-4D97-AF65-F5344CB8AC3E}">
@@ -44500,12 +44543,14 @@
         </p:nvSpPr>
         <p:spPr/>
         <p:txBody>
-          <a:bodyPr/>
+          <a:bodyPr>
+            <a:normAutofit/>
+          </a:bodyPr>
           <a:lstStyle/>
           <a:p>
             <a:r>
               <a:rPr lang="pt-BR" dirty="0"/>
-              <a:t>E agora, José?</a:t>
+              <a:t>Mas, afinal, o que são testes unitários?</a:t>
             </a:r>
           </a:p>
         </p:txBody>
@@ -44535,7 +44580,6 @@
               <a:rPr lang="pt-BR" dirty="0"/>
               <a:t>Testes Unitários</a:t>
             </a:r>
-            <a:endParaRPr lang="pt-BR" noProof="0" dirty="0"/>
           </a:p>
         </p:txBody>
       </p:sp>
@@ -44565,6 +44609,627 @@
               <a:rPr lang="pt-BR" noProof="0" smtClean="0"/>
               <a:pPr rtl="0"/>
               <a:t>10</a:t>
+            </a:fld>
+            <a:endParaRPr lang="pt-BR" noProof="0" dirty="0"/>
+          </a:p>
+        </p:txBody>
+      </p:sp>
+      <p:pic>
+        <p:nvPicPr>
+          <p:cNvPr id="1028" name="Picture 4" descr="ClassCalcular">
+            <a:extLst>
+              <a:ext uri="{FF2B5EF4-FFF2-40B4-BE49-F238E27FC236}">
+                <a16:creationId xmlns:a16="http://schemas.microsoft.com/office/drawing/2014/main" id="{05EC44CD-27D6-4E97-9297-5C3D92E3FB1E}"/>
+              </a:ext>
+            </a:extLst>
+          </p:cNvPr>
+          <p:cNvPicPr>
+            <a:picLocks noChangeAspect="1" noChangeArrowheads="1"/>
+          </p:cNvPicPr>
+          <p:nvPr/>
+        </p:nvPicPr>
+        <p:blipFill>
+          <a:blip r:embed="rId2">
+            <a:extLst>
+              <a:ext uri="{28A0092B-C50C-407E-A947-70E740481C1C}">
+                <a14:useLocalDpi xmlns:a14="http://schemas.microsoft.com/office/drawing/2010/main" val="0"/>
+              </a:ext>
+            </a:extLst>
+          </a:blip>
+          <a:srcRect/>
+          <a:stretch>
+            <a:fillRect/>
+          </a:stretch>
+        </p:blipFill>
+        <p:spPr bwMode="auto">
+          <a:xfrm>
+            <a:off x="2316151" y="1263191"/>
+            <a:ext cx="7062633" cy="5163029"/>
+          </a:xfrm>
+          <a:prstGeom prst="rect">
+            <a:avLst/>
+          </a:prstGeom>
+          <a:noFill/>
+          <a:extLst>
+            <a:ext uri="{909E8E84-426E-40DD-AFC4-6F175D3DCCD1}">
+              <a14:hiddenFill xmlns:a14="http://schemas.microsoft.com/office/drawing/2010/main">
+                <a:solidFill>
+                  <a:srgbClr val="FFFFFF"/>
+                </a:solidFill>
+              </a14:hiddenFill>
+            </a:ext>
+          </a:extLst>
+        </p:spPr>
+      </p:pic>
+    </p:spTree>
+    <p:extLst>
+      <p:ext uri="{BB962C8B-B14F-4D97-AF65-F5344CB8AC3E}">
+        <p14:creationId xmlns:p14="http://schemas.microsoft.com/office/powerpoint/2010/main" val="3027833832"/>
+      </p:ext>
+    </p:extLst>
+  </p:cSld>
+  <p:clrMapOvr>
+    <a:masterClrMapping/>
+  </p:clrMapOvr>
+</p:sld>
+</file>
+
+<file path=ppt/slides/slide11.xml><?xml version="1.0" encoding="utf-8"?>
+<p:sld xmlns:a="http://schemas.openxmlformats.org/drawingml/2006/main" xmlns:r="http://schemas.openxmlformats.org/officeDocument/2006/relationships" xmlns:p="http://schemas.openxmlformats.org/presentationml/2006/main">
+  <p:cSld>
+    <p:spTree>
+      <p:nvGrpSpPr>
+        <p:cNvPr id="1" name=""/>
+        <p:cNvGrpSpPr/>
+        <p:nvPr/>
+      </p:nvGrpSpPr>
+      <p:grpSpPr>
+        <a:xfrm>
+          <a:off x="0" y="0"/>
+          <a:ext cx="0" cy="0"/>
+          <a:chOff x="0" y="0"/>
+          <a:chExt cx="0" cy="0"/>
+        </a:xfrm>
+      </p:grpSpPr>
+      <p:sp>
+        <p:nvSpPr>
+          <p:cNvPr id="4" name="Espaço Reservado para Rodapé 3">
+            <a:extLst>
+              <a:ext uri="{FF2B5EF4-FFF2-40B4-BE49-F238E27FC236}">
+                <a16:creationId xmlns:a16="http://schemas.microsoft.com/office/drawing/2014/main" id="{106876FF-28E0-4A72-8C87-9EEB941DA9D3}"/>
+              </a:ext>
+            </a:extLst>
+          </p:cNvPr>
+          <p:cNvSpPr>
+            <a:spLocks noGrp="1"/>
+          </p:cNvSpPr>
+          <p:nvPr>
+            <p:ph type="ftr" sz="quarter" idx="11"/>
+          </p:nvPr>
+        </p:nvSpPr>
+        <p:spPr/>
+        <p:txBody>
+          <a:bodyPr/>
+          <a:lstStyle/>
+          <a:p>
+            <a:r>
+              <a:rPr lang="pt-BR" dirty="0"/>
+              <a:t>Testes Unitários</a:t>
+            </a:r>
+          </a:p>
+        </p:txBody>
+      </p:sp>
+      <p:sp>
+        <p:nvSpPr>
+          <p:cNvPr id="5" name="Espaço Reservado para Número de Slide 4">
+            <a:extLst>
+              <a:ext uri="{FF2B5EF4-FFF2-40B4-BE49-F238E27FC236}">
+                <a16:creationId xmlns:a16="http://schemas.microsoft.com/office/drawing/2014/main" id="{3B8D016B-C5B6-45DB-9D25-63814C34EA5E}"/>
+              </a:ext>
+            </a:extLst>
+          </p:cNvPr>
+          <p:cNvSpPr>
+            <a:spLocks noGrp="1"/>
+          </p:cNvSpPr>
+          <p:nvPr>
+            <p:ph type="sldNum" sz="quarter" idx="12"/>
+          </p:nvPr>
+        </p:nvSpPr>
+        <p:spPr/>
+        <p:txBody>
+          <a:bodyPr/>
+          <a:lstStyle/>
+          <a:p>
+            <a:pPr rtl="0"/>
+            <a:fld id="{8D581BC7-E183-40DB-AC97-C19EA4EB8894}" type="slidenum">
+              <a:rPr lang="pt-BR" noProof="0" smtClean="0"/>
+              <a:pPr rtl="0"/>
+              <a:t>11</a:t>
+            </a:fld>
+            <a:endParaRPr lang="pt-BR" noProof="0" dirty="0"/>
+          </a:p>
+        </p:txBody>
+      </p:sp>
+      <p:sp>
+        <p:nvSpPr>
+          <p:cNvPr id="8" name="Retângulo 7">
+            <a:extLst>
+              <a:ext uri="{FF2B5EF4-FFF2-40B4-BE49-F238E27FC236}">
+                <a16:creationId xmlns:a16="http://schemas.microsoft.com/office/drawing/2014/main" id="{875FED46-4E0E-42DC-BCFC-48EA263AEC12}"/>
+              </a:ext>
+            </a:extLst>
+          </p:cNvPr>
+          <p:cNvSpPr/>
+          <p:nvPr/>
+        </p:nvSpPr>
+        <p:spPr>
+          <a:xfrm>
+            <a:off x="10553210" y="1882634"/>
+            <a:ext cx="1011308" cy="720080"/>
+          </a:xfrm>
+          <a:prstGeom prst="rect">
+            <a:avLst/>
+          </a:prstGeom>
+          <a:solidFill>
+            <a:srgbClr val="7030A0"/>
+          </a:solidFill>
+        </p:spPr>
+        <p:style>
+          <a:lnRef idx="0">
+            <a:schemeClr val="accent4"/>
+          </a:lnRef>
+          <a:fillRef idx="3">
+            <a:schemeClr val="accent4"/>
+          </a:fillRef>
+          <a:effectRef idx="3">
+            <a:schemeClr val="accent4"/>
+          </a:effectRef>
+          <a:fontRef idx="minor">
+            <a:schemeClr val="lt1"/>
+          </a:fontRef>
+        </p:style>
+        <p:txBody>
+          <a:bodyPr rtlCol="0" anchor="ctr"/>
+          <a:lstStyle/>
+          <a:p>
+            <a:pPr algn="ctr"/>
+            <a:r>
+              <a:rPr lang="pt-BR" b="1" dirty="0" err="1">
+                <a:solidFill>
+                  <a:schemeClr val="bg2"/>
+                </a:solidFill>
+              </a:rPr>
+              <a:t>Arrange</a:t>
+            </a:r>
+            <a:endParaRPr lang="pt-BR" b="1" dirty="0">
+              <a:solidFill>
+                <a:schemeClr val="bg2"/>
+              </a:solidFill>
+            </a:endParaRPr>
+          </a:p>
+        </p:txBody>
+      </p:sp>
+      <p:sp>
+        <p:nvSpPr>
+          <p:cNvPr id="9" name="Seta: para a Direita 8">
+            <a:extLst>
+              <a:ext uri="{FF2B5EF4-FFF2-40B4-BE49-F238E27FC236}">
+                <a16:creationId xmlns:a16="http://schemas.microsoft.com/office/drawing/2014/main" id="{C237C30F-840B-4C68-A4F6-9ED3897AA972}"/>
+              </a:ext>
+            </a:extLst>
+          </p:cNvPr>
+          <p:cNvSpPr/>
+          <p:nvPr/>
+        </p:nvSpPr>
+        <p:spPr>
+          <a:xfrm rot="5400000">
+            <a:off x="10876409" y="2860757"/>
+            <a:ext cx="259361" cy="288032"/>
+          </a:xfrm>
+          <a:prstGeom prst="rightArrow">
+            <a:avLst/>
+          </a:prstGeom>
+          <a:solidFill>
+            <a:schemeClr val="bg1">
+              <a:lumMod val="50000"/>
+              <a:lumOff val="50000"/>
+            </a:schemeClr>
+          </a:solidFill>
+        </p:spPr>
+        <p:style>
+          <a:lnRef idx="0">
+            <a:schemeClr val="accent4"/>
+          </a:lnRef>
+          <a:fillRef idx="3">
+            <a:schemeClr val="accent4"/>
+          </a:fillRef>
+          <a:effectRef idx="3">
+            <a:schemeClr val="accent4"/>
+          </a:effectRef>
+          <a:fontRef idx="minor">
+            <a:schemeClr val="lt1"/>
+          </a:fontRef>
+        </p:style>
+        <p:txBody>
+          <a:bodyPr rtlCol="0" anchor="ctr"/>
+          <a:lstStyle/>
+          <a:p>
+            <a:pPr algn="ctr"/>
+            <a:endParaRPr lang="pt-BR" b="1">
+              <a:solidFill>
+                <a:schemeClr val="bg2"/>
+              </a:solidFill>
+            </a:endParaRPr>
+          </a:p>
+        </p:txBody>
+      </p:sp>
+      <p:pic>
+        <p:nvPicPr>
+          <p:cNvPr id="2050" name="Picture 2" descr="MetodoTestCalcularSomarAAA">
+            <a:extLst>
+              <a:ext uri="{FF2B5EF4-FFF2-40B4-BE49-F238E27FC236}">
+                <a16:creationId xmlns:a16="http://schemas.microsoft.com/office/drawing/2014/main" id="{0E1F7D4D-463D-4836-98AE-6C5699C6D3E7}"/>
+              </a:ext>
+            </a:extLst>
+          </p:cNvPr>
+          <p:cNvPicPr>
+            <a:picLocks noChangeAspect="1" noChangeArrowheads="1"/>
+          </p:cNvPicPr>
+          <p:nvPr/>
+        </p:nvPicPr>
+        <p:blipFill>
+          <a:blip r:embed="rId2">
+            <a:extLst>
+              <a:ext uri="{28A0092B-C50C-407E-A947-70E740481C1C}">
+                <a14:useLocalDpi xmlns:a14="http://schemas.microsoft.com/office/drawing/2010/main" val="0"/>
+              </a:ext>
+            </a:extLst>
+          </a:blip>
+          <a:srcRect/>
+          <a:stretch>
+            <a:fillRect/>
+          </a:stretch>
+        </p:blipFill>
+        <p:spPr bwMode="auto">
+          <a:xfrm>
+            <a:off x="2488676" y="1263487"/>
+            <a:ext cx="7074545" cy="5085663"/>
+          </a:xfrm>
+          <a:prstGeom prst="rect">
+            <a:avLst/>
+          </a:prstGeom>
+          <a:noFill/>
+          <a:extLst>
+            <a:ext uri="{909E8E84-426E-40DD-AFC4-6F175D3DCCD1}">
+              <a14:hiddenFill xmlns:a14="http://schemas.microsoft.com/office/drawing/2010/main">
+                <a:solidFill>
+                  <a:srgbClr val="FFFFFF"/>
+                </a:solidFill>
+              </a14:hiddenFill>
+            </a:ext>
+          </a:extLst>
+        </p:spPr>
+      </p:pic>
+      <p:sp>
+        <p:nvSpPr>
+          <p:cNvPr id="13" name="Retângulo 12">
+            <a:extLst>
+              <a:ext uri="{FF2B5EF4-FFF2-40B4-BE49-F238E27FC236}">
+                <a16:creationId xmlns:a16="http://schemas.microsoft.com/office/drawing/2014/main" id="{DE68B70B-9A9E-4C2F-A154-107F1232E369}"/>
+              </a:ext>
+            </a:extLst>
+          </p:cNvPr>
+          <p:cNvSpPr/>
+          <p:nvPr/>
+        </p:nvSpPr>
+        <p:spPr>
+          <a:xfrm>
+            <a:off x="10553209" y="3471914"/>
+            <a:ext cx="1011307" cy="720080"/>
+          </a:xfrm>
+          <a:prstGeom prst="rect">
+            <a:avLst/>
+          </a:prstGeom>
+          <a:solidFill>
+            <a:srgbClr val="7030A0"/>
+          </a:solidFill>
+        </p:spPr>
+        <p:style>
+          <a:lnRef idx="0">
+            <a:schemeClr val="accent4"/>
+          </a:lnRef>
+          <a:fillRef idx="3">
+            <a:schemeClr val="accent4"/>
+          </a:fillRef>
+          <a:effectRef idx="3">
+            <a:schemeClr val="accent4"/>
+          </a:effectRef>
+          <a:fontRef idx="minor">
+            <a:schemeClr val="lt1"/>
+          </a:fontRef>
+        </p:style>
+        <p:txBody>
+          <a:bodyPr rtlCol="0" anchor="ctr"/>
+          <a:lstStyle/>
+          <a:p>
+            <a:pPr algn="ctr"/>
+            <a:r>
+              <a:rPr lang="pt-BR" b="1" dirty="0" err="1">
+                <a:solidFill>
+                  <a:schemeClr val="bg2"/>
+                </a:solidFill>
+              </a:rPr>
+              <a:t>Act</a:t>
+            </a:r>
+            <a:endParaRPr lang="pt-BR" b="1" dirty="0">
+              <a:solidFill>
+                <a:schemeClr val="bg2"/>
+              </a:solidFill>
+            </a:endParaRPr>
+          </a:p>
+        </p:txBody>
+      </p:sp>
+      <p:sp>
+        <p:nvSpPr>
+          <p:cNvPr id="14" name="Retângulo 13">
+            <a:extLst>
+              <a:ext uri="{FF2B5EF4-FFF2-40B4-BE49-F238E27FC236}">
+                <a16:creationId xmlns:a16="http://schemas.microsoft.com/office/drawing/2014/main" id="{B1B39E0B-4E2A-4178-9868-E11322B39C42}"/>
+              </a:ext>
+            </a:extLst>
+          </p:cNvPr>
+          <p:cNvSpPr/>
+          <p:nvPr/>
+        </p:nvSpPr>
+        <p:spPr>
+          <a:xfrm>
+            <a:off x="10553209" y="5061194"/>
+            <a:ext cx="1011307" cy="720080"/>
+          </a:xfrm>
+          <a:prstGeom prst="rect">
+            <a:avLst/>
+          </a:prstGeom>
+          <a:solidFill>
+            <a:srgbClr val="7030A0"/>
+          </a:solidFill>
+        </p:spPr>
+        <p:style>
+          <a:lnRef idx="0">
+            <a:schemeClr val="accent4"/>
+          </a:lnRef>
+          <a:fillRef idx="3">
+            <a:schemeClr val="accent4"/>
+          </a:fillRef>
+          <a:effectRef idx="3">
+            <a:schemeClr val="accent4"/>
+          </a:effectRef>
+          <a:fontRef idx="minor">
+            <a:schemeClr val="lt1"/>
+          </a:fontRef>
+        </p:style>
+        <p:txBody>
+          <a:bodyPr rtlCol="0" anchor="ctr"/>
+          <a:lstStyle/>
+          <a:p>
+            <a:pPr algn="ctr"/>
+            <a:r>
+              <a:rPr lang="pt-BR" b="1" dirty="0" err="1">
+                <a:solidFill>
+                  <a:schemeClr val="bg2"/>
+                </a:solidFill>
+              </a:rPr>
+              <a:t>Assert</a:t>
+            </a:r>
+            <a:endParaRPr lang="pt-BR" b="1" dirty="0">
+              <a:solidFill>
+                <a:schemeClr val="bg2"/>
+              </a:solidFill>
+            </a:endParaRPr>
+          </a:p>
+        </p:txBody>
+      </p:sp>
+      <p:sp>
+        <p:nvSpPr>
+          <p:cNvPr id="15" name="Seta: para a Direita 14">
+            <a:extLst>
+              <a:ext uri="{FF2B5EF4-FFF2-40B4-BE49-F238E27FC236}">
+                <a16:creationId xmlns:a16="http://schemas.microsoft.com/office/drawing/2014/main" id="{1BD5AA0F-37CC-44FA-9B70-5C3D639DAF92}"/>
+              </a:ext>
+            </a:extLst>
+          </p:cNvPr>
+          <p:cNvSpPr/>
+          <p:nvPr/>
+        </p:nvSpPr>
+        <p:spPr>
+          <a:xfrm rot="5400000">
+            <a:off x="10876409" y="4502982"/>
+            <a:ext cx="259361" cy="288032"/>
+          </a:xfrm>
+          <a:prstGeom prst="rightArrow">
+            <a:avLst/>
+          </a:prstGeom>
+          <a:solidFill>
+            <a:schemeClr val="bg1">
+              <a:lumMod val="50000"/>
+              <a:lumOff val="50000"/>
+            </a:schemeClr>
+          </a:solidFill>
+        </p:spPr>
+        <p:style>
+          <a:lnRef idx="0">
+            <a:schemeClr val="accent4"/>
+          </a:lnRef>
+          <a:fillRef idx="3">
+            <a:schemeClr val="accent4"/>
+          </a:fillRef>
+          <a:effectRef idx="3">
+            <a:schemeClr val="accent4"/>
+          </a:effectRef>
+          <a:fontRef idx="minor">
+            <a:schemeClr val="lt1"/>
+          </a:fontRef>
+        </p:style>
+        <p:txBody>
+          <a:bodyPr rtlCol="0" anchor="ctr"/>
+          <a:lstStyle/>
+          <a:p>
+            <a:pPr algn="ctr"/>
+            <a:endParaRPr lang="pt-BR" b="1">
+              <a:solidFill>
+                <a:schemeClr val="bg2"/>
+              </a:solidFill>
+            </a:endParaRPr>
+          </a:p>
+        </p:txBody>
+      </p:sp>
+      <p:sp>
+        <p:nvSpPr>
+          <p:cNvPr id="16" name="Título 1">
+            <a:extLst>
+              <a:ext uri="{FF2B5EF4-FFF2-40B4-BE49-F238E27FC236}">
+                <a16:creationId xmlns:a16="http://schemas.microsoft.com/office/drawing/2014/main" id="{CE42E552-A855-47AB-8C5A-6E9F45A5C5AC}"/>
+              </a:ext>
+            </a:extLst>
+          </p:cNvPr>
+          <p:cNvSpPr>
+            <a:spLocks noGrp="1"/>
+          </p:cNvSpPr>
+          <p:nvPr>
+            <p:ph type="title"/>
+          </p:nvPr>
+        </p:nvSpPr>
+        <p:spPr>
+          <a:xfrm>
+            <a:off x="838200" y="365126"/>
+            <a:ext cx="10515600" cy="652969"/>
+          </a:xfrm>
+        </p:spPr>
+        <p:txBody>
+          <a:bodyPr>
+            <a:normAutofit/>
+          </a:bodyPr>
+          <a:lstStyle/>
+          <a:p>
+            <a:r>
+              <a:rPr lang="pt-BR" dirty="0"/>
+              <a:t>Mas, afinal, o que são testes unitários?</a:t>
+            </a:r>
+          </a:p>
+        </p:txBody>
+      </p:sp>
+    </p:spTree>
+    <p:extLst>
+      <p:ext uri="{BB962C8B-B14F-4D97-AF65-F5344CB8AC3E}">
+        <p14:creationId xmlns:p14="http://schemas.microsoft.com/office/powerpoint/2010/main" val="1892908750"/>
+      </p:ext>
+    </p:extLst>
+  </p:cSld>
+  <p:clrMapOvr>
+    <a:masterClrMapping/>
+  </p:clrMapOvr>
+</p:sld>
+</file>
+
+<file path=ppt/slides/slide12.xml><?xml version="1.0" encoding="utf-8"?>
+<p:sld xmlns:a="http://schemas.openxmlformats.org/drawingml/2006/main" xmlns:r="http://schemas.openxmlformats.org/officeDocument/2006/relationships" xmlns:p="http://schemas.openxmlformats.org/presentationml/2006/main">
+  <p:cSld>
+    <p:spTree>
+      <p:nvGrpSpPr>
+        <p:cNvPr id="1" name=""/>
+        <p:cNvGrpSpPr/>
+        <p:nvPr/>
+      </p:nvGrpSpPr>
+      <p:grpSpPr>
+        <a:xfrm>
+          <a:off x="0" y="0"/>
+          <a:ext cx="0" cy="0"/>
+          <a:chOff x="0" y="0"/>
+          <a:chExt cx="0" cy="0"/>
+        </a:xfrm>
+      </p:grpSpPr>
+      <p:sp>
+        <p:nvSpPr>
+          <p:cNvPr id="2" name="Título 1">
+            <a:extLst>
+              <a:ext uri="{FF2B5EF4-FFF2-40B4-BE49-F238E27FC236}">
+                <a16:creationId xmlns:a16="http://schemas.microsoft.com/office/drawing/2014/main" id="{19230EE8-7593-4D66-BABE-A624F9107347}"/>
+              </a:ext>
+            </a:extLst>
+          </p:cNvPr>
+          <p:cNvSpPr>
+            <a:spLocks noGrp="1"/>
+          </p:cNvSpPr>
+          <p:nvPr>
+            <p:ph type="title"/>
+          </p:nvPr>
+        </p:nvSpPr>
+        <p:spPr/>
+        <p:txBody>
+          <a:bodyPr/>
+          <a:lstStyle/>
+          <a:p>
+            <a:r>
+              <a:rPr lang="pt-BR" dirty="0"/>
+              <a:t>E agora, José?</a:t>
+            </a:r>
+          </a:p>
+        </p:txBody>
+      </p:sp>
+      <p:sp>
+        <p:nvSpPr>
+          <p:cNvPr id="4" name="Espaço Reservado para Rodapé 3">
+            <a:extLst>
+              <a:ext uri="{FF2B5EF4-FFF2-40B4-BE49-F238E27FC236}">
+                <a16:creationId xmlns:a16="http://schemas.microsoft.com/office/drawing/2014/main" id="{106876FF-28E0-4A72-8C87-9EEB941DA9D3}"/>
+              </a:ext>
+            </a:extLst>
+          </p:cNvPr>
+          <p:cNvSpPr>
+            <a:spLocks noGrp="1"/>
+          </p:cNvSpPr>
+          <p:nvPr>
+            <p:ph type="ftr" sz="quarter" idx="11"/>
+          </p:nvPr>
+        </p:nvSpPr>
+        <p:spPr/>
+        <p:txBody>
+          <a:bodyPr/>
+          <a:lstStyle/>
+          <a:p>
+            <a:r>
+              <a:rPr lang="pt-BR" dirty="0"/>
+              <a:t>Testes Unitários</a:t>
+            </a:r>
+            <a:endParaRPr lang="pt-BR" noProof="0" dirty="0"/>
+          </a:p>
+        </p:txBody>
+      </p:sp>
+      <p:sp>
+        <p:nvSpPr>
+          <p:cNvPr id="5" name="Espaço Reservado para Número de Slide 4">
+            <a:extLst>
+              <a:ext uri="{FF2B5EF4-FFF2-40B4-BE49-F238E27FC236}">
+                <a16:creationId xmlns:a16="http://schemas.microsoft.com/office/drawing/2014/main" id="{3B8D016B-C5B6-45DB-9D25-63814C34EA5E}"/>
+              </a:ext>
+            </a:extLst>
+          </p:cNvPr>
+          <p:cNvSpPr>
+            <a:spLocks noGrp="1"/>
+          </p:cNvSpPr>
+          <p:nvPr>
+            <p:ph type="sldNum" sz="quarter" idx="12"/>
+          </p:nvPr>
+        </p:nvSpPr>
+        <p:spPr/>
+        <p:txBody>
+          <a:bodyPr/>
+          <a:lstStyle/>
+          <a:p>
+            <a:pPr rtl="0"/>
+            <a:fld id="{8D581BC7-E183-40DB-AC97-C19EA4EB8894}" type="slidenum">
+              <a:rPr lang="pt-BR" noProof="0" smtClean="0"/>
+              <a:pPr rtl="0"/>
+              <a:t>12</a:t>
             </a:fld>
             <a:endParaRPr lang="pt-BR" noProof="0" dirty="0"/>
           </a:p>
@@ -45009,7 +45674,7 @@
 </p:sld>
 </file>
 
-<file path=ppt/slides/slide11.xml><?xml version="1.0" encoding="utf-8"?>
+<file path=ppt/slides/slide13.xml><?xml version="1.0" encoding="utf-8"?>
 <p:sld xmlns:a="http://schemas.openxmlformats.org/drawingml/2006/main" xmlns:r="http://schemas.openxmlformats.org/officeDocument/2006/relationships" xmlns:p="http://schemas.openxmlformats.org/presentationml/2006/main">
   <p:cSld>
     <p:spTree>
@@ -45113,7 +45778,7 @@
             <a:fld id="{8D581BC7-E183-40DB-AC97-C19EA4EB8894}" type="slidenum">
               <a:rPr lang="pt-BR" noProof="0" smtClean="0"/>
               <a:pPr rtl="0"/>
-              <a:t>11</a:t>
+              <a:t>13</a:t>
             </a:fld>
             <a:endParaRPr lang="pt-BR" noProof="0" dirty="0"/>
           </a:p>
@@ -45552,7 +46217,7 @@
         <p:spPr>
           <a:xfrm>
             <a:off x="974549" y="2204582"/>
-            <a:ext cx="5919313" cy="3046988"/>
+            <a:ext cx="4437433" cy="3046988"/>
           </a:xfrm>
           <a:prstGeom prst="rect">
             <a:avLst/>
@@ -45564,6 +46229,28 @@
             <a:spAutoFit/>
           </a:bodyPr>
           <a:lstStyle/>
+          <a:p>
+            <a:pPr marL="285750" indent="-285750">
+              <a:buFont typeface="Arial" panose="020B0604020202020204" pitchFamily="34" charset="0"/>
+              <a:buChar char="•"/>
+            </a:pPr>
+            <a:r>
+              <a:rPr lang="pt-BR" sz="2400" dirty="0" err="1">
+                <a:solidFill>
+                  <a:schemeClr val="bg2"/>
+                </a:solidFill>
+              </a:rPr>
+              <a:t>DevOps</a:t>
+            </a:r>
+            <a:r>
+              <a:rPr lang="pt-BR" sz="2400" dirty="0">
+                <a:solidFill>
+                  <a:schemeClr val="bg2"/>
+                </a:solidFill>
+              </a:rPr>
+              <a:t> Professional</a:t>
+            </a:r>
+          </a:p>
           <a:p>
             <a:pPr marL="285750" indent="-285750">
               <a:buFont typeface="Arial" panose="020B0604020202020204" pitchFamily="34" charset="0"/>
@@ -45575,37 +46262,7 @@
                   <a:schemeClr val="bg2"/>
                 </a:solidFill>
               </a:rPr>
-              <a:t>Certificado </a:t>
-            </a:r>
-            <a:r>
-              <a:rPr lang="pt-BR" sz="2400" dirty="0" err="1">
-                <a:solidFill>
-                  <a:schemeClr val="bg2"/>
-                </a:solidFill>
-              </a:rPr>
-              <a:t>DevOps</a:t>
-            </a:r>
-            <a:r>
-              <a:rPr lang="pt-BR" sz="2400" dirty="0">
-                <a:solidFill>
-                  <a:schemeClr val="bg2"/>
-                </a:solidFill>
-              </a:rPr>
-              <a:t> Professional</a:t>
-            </a:r>
-          </a:p>
-          <a:p>
-            <a:pPr marL="285750" indent="-285750">
-              <a:buFont typeface="Arial" panose="020B0604020202020204" pitchFamily="34" charset="0"/>
-              <a:buChar char="•"/>
-            </a:pPr>
-            <a:r>
-              <a:rPr lang="pt-BR" sz="2400" dirty="0">
-                <a:solidFill>
-                  <a:schemeClr val="bg2"/>
-                </a:solidFill>
-              </a:rPr>
-              <a:t>Certificado Scrum Foundation Professional</a:t>
+              <a:t>Scrum Foundation Professional</a:t>
             </a:r>
           </a:p>
           <a:p>
@@ -46301,10 +46958,10 @@
       </p:sp>
       <p:sp>
         <p:nvSpPr>
-          <p:cNvPr id="8" name="Retângulo 7">
-            <a:extLst>
-              <a:ext uri="{FF2B5EF4-FFF2-40B4-BE49-F238E27FC236}">
-                <a16:creationId xmlns:a16="http://schemas.microsoft.com/office/drawing/2014/main" id="{D411F18D-9841-4942-BCD7-EED14F2977A9}"/>
+          <p:cNvPr id="9" name="Retângulo 8">
+            <a:extLst>
+              <a:ext uri="{FF2B5EF4-FFF2-40B4-BE49-F238E27FC236}">
+                <a16:creationId xmlns:a16="http://schemas.microsoft.com/office/drawing/2014/main" id="{7AEF3348-04C8-41F6-86C6-663D3D1AA866}"/>
               </a:ext>
             </a:extLst>
           </p:cNvPr>
@@ -46321,9 +46978,7 @@
           </a:prstGeom>
           <a:noFill/>
           <a:ln w="9525" cap="flat" cmpd="sng" algn="ctr">
-            <a:solidFill>
-              <a:schemeClr val="accent4"/>
-            </a:solidFill>
+            <a:noFill/>
             <a:prstDash val="solid"/>
             <a:round/>
             <a:headEnd type="none" w="med" len="med"/>
@@ -46383,138 +47038,6 @@
   <p:clrMapOvr>
     <a:masterClrMapping/>
   </p:clrMapOvr>
-  <p:timing>
-    <p:tnLst>
-      <p:par>
-        <p:cTn id="1" dur="indefinite" restart="never" nodeType="tmRoot">
-          <p:childTnLst>
-            <p:seq concurrent="1" nextAc="seek">
-              <p:cTn id="2" dur="indefinite" nodeType="mainSeq">
-                <p:childTnLst>
-                  <p:par>
-                    <p:cTn id="3" fill="hold">
-                      <p:stCondLst>
-                        <p:cond delay="indefinite"/>
-                      </p:stCondLst>
-                      <p:childTnLst>
-                        <p:par>
-                          <p:cTn id="4" fill="hold">
-                            <p:stCondLst>
-                              <p:cond delay="0"/>
-                            </p:stCondLst>
-                            <p:childTnLst>
-                              <p:par>
-                                <p:cTn id="5" presetID="42" presetClass="entr" presetSubtype="0" fill="hold" grpId="0" nodeType="clickEffect">
-                                  <p:stCondLst>
-                                    <p:cond delay="0"/>
-                                  </p:stCondLst>
-                                  <p:childTnLst>
-                                    <p:set>
-                                      <p:cBhvr>
-                                        <p:cTn id="6" dur="1" fill="hold">
-                                          <p:stCondLst>
-                                            <p:cond delay="0"/>
-                                          </p:stCondLst>
-                                        </p:cTn>
-                                        <p:tgtEl>
-                                          <p:spTgt spid="8"/>
-                                        </p:tgtEl>
-                                        <p:attrNameLst>
-                                          <p:attrName>style.visibility</p:attrName>
-                                        </p:attrNameLst>
-                                      </p:cBhvr>
-                                      <p:to>
-                                        <p:strVal val="visible"/>
-                                      </p:to>
-                                    </p:set>
-                                    <p:animEffect transition="in" filter="fade">
-                                      <p:cBhvr>
-                                        <p:cTn id="7" dur="1000"/>
-                                        <p:tgtEl>
-                                          <p:spTgt spid="8"/>
-                                        </p:tgtEl>
-                                      </p:cBhvr>
-                                    </p:animEffect>
-                                    <p:anim calcmode="lin" valueType="num">
-                                      <p:cBhvr>
-                                        <p:cTn id="8" dur="1000" fill="hold"/>
-                                        <p:tgtEl>
-                                          <p:spTgt spid="8"/>
-                                        </p:tgtEl>
-                                        <p:attrNameLst>
-                                          <p:attrName>ppt_x</p:attrName>
-                                        </p:attrNameLst>
-                                      </p:cBhvr>
-                                      <p:tavLst>
-                                        <p:tav tm="0">
-                                          <p:val>
-                                            <p:strVal val="#ppt_x"/>
-                                          </p:val>
-                                        </p:tav>
-                                        <p:tav tm="100000">
-                                          <p:val>
-                                            <p:strVal val="#ppt_x"/>
-                                          </p:val>
-                                        </p:tav>
-                                      </p:tavLst>
-                                    </p:anim>
-                                    <p:anim calcmode="lin" valueType="num">
-                                      <p:cBhvr>
-                                        <p:cTn id="9" dur="1000" fill="hold"/>
-                                        <p:tgtEl>
-                                          <p:spTgt spid="8"/>
-                                        </p:tgtEl>
-                                        <p:attrNameLst>
-                                          <p:attrName>ppt_y</p:attrName>
-                                        </p:attrNameLst>
-                                      </p:cBhvr>
-                                      <p:tavLst>
-                                        <p:tav tm="0">
-                                          <p:val>
-                                            <p:strVal val="#ppt_y+.1"/>
-                                          </p:val>
-                                        </p:tav>
-                                        <p:tav tm="100000">
-                                          <p:val>
-                                            <p:strVal val="#ppt_y"/>
-                                          </p:val>
-                                        </p:tav>
-                                      </p:tavLst>
-                                    </p:anim>
-                                  </p:childTnLst>
-                                </p:cTn>
-                              </p:par>
-                            </p:childTnLst>
-                          </p:cTn>
-                        </p:par>
-                      </p:childTnLst>
-                    </p:cTn>
-                  </p:par>
-                </p:childTnLst>
-              </p:cTn>
-              <p:prevCondLst>
-                <p:cond evt="onPrev" delay="0">
-                  <p:tgtEl>
-                    <p:sldTgt/>
-                  </p:tgtEl>
-                </p:cond>
-              </p:prevCondLst>
-              <p:nextCondLst>
-                <p:cond evt="onNext" delay="0">
-                  <p:tgtEl>
-                    <p:sldTgt/>
-                  </p:tgtEl>
-                </p:cond>
-              </p:nextCondLst>
-            </p:seq>
-          </p:childTnLst>
-        </p:cTn>
-      </p:par>
-    </p:tnLst>
-    <p:bldLst>
-      <p:bldP spid="8" grpId="0" animBg="1"/>
-    </p:bldLst>
-  </p:timing>
 </p:sld>
 </file>
 
@@ -46705,7 +47228,7 @@
           <a:p>
             <a:r>
               <a:rPr lang="pt-BR" dirty="0"/>
-              <a:t>Mas o que é Teste Unitário?</a:t>
+              <a:t>O que posso usar para escrever meus testes?</a:t>
             </a:r>
           </a:p>
         </p:txBody>
@@ -46764,6 +47287,1012 @@
               <a:rPr lang="pt-BR" noProof="0" smtClean="0"/>
               <a:pPr rtl="0"/>
               <a:t>6</a:t>
+            </a:fld>
+            <a:endParaRPr lang="pt-BR" noProof="0" dirty="0"/>
+          </a:p>
+        </p:txBody>
+      </p:sp>
+      <p:pic>
+        <p:nvPicPr>
+          <p:cNvPr id="1028" name="Picture 4" descr="Imagem relacionada">
+            <a:extLst>
+              <a:ext uri="{FF2B5EF4-FFF2-40B4-BE49-F238E27FC236}">
+                <a16:creationId xmlns:a16="http://schemas.microsoft.com/office/drawing/2014/main" id="{60502B6B-5EBE-4A1A-A8CA-CC38128BE3FC}"/>
+              </a:ext>
+            </a:extLst>
+          </p:cNvPr>
+          <p:cNvPicPr>
+            <a:picLocks noChangeAspect="1" noChangeArrowheads="1"/>
+          </p:cNvPicPr>
+          <p:nvPr/>
+        </p:nvPicPr>
+        <p:blipFill>
+          <a:blip r:embed="rId2">
+            <a:extLst>
+              <a:ext uri="{28A0092B-C50C-407E-A947-70E740481C1C}">
+                <a14:useLocalDpi xmlns:a14="http://schemas.microsoft.com/office/drawing/2010/main" val="0"/>
+              </a:ext>
+            </a:extLst>
+          </a:blip>
+          <a:srcRect/>
+          <a:stretch>
+            <a:fillRect/>
+          </a:stretch>
+        </p:blipFill>
+        <p:spPr bwMode="auto">
+          <a:xfrm>
+            <a:off x="1169960" y="1171574"/>
+            <a:ext cx="3129804" cy="3583399"/>
+          </a:xfrm>
+          <a:prstGeom prst="rect">
+            <a:avLst/>
+          </a:prstGeom>
+          <a:noFill/>
+          <a:extLst>
+            <a:ext uri="{909E8E84-426E-40DD-AFC4-6F175D3DCCD1}">
+              <a14:hiddenFill xmlns:a14="http://schemas.microsoft.com/office/drawing/2010/main">
+                <a:solidFill>
+                  <a:srgbClr val="FFFFFF"/>
+                </a:solidFill>
+              </a14:hiddenFill>
+            </a:ext>
+          </a:extLst>
+        </p:spPr>
+      </p:pic>
+      <p:pic>
+        <p:nvPicPr>
+          <p:cNvPr id="1032" name="Picture 8" descr="Resultado de imagem para ferramentas de teste unitário">
+            <a:extLst>
+              <a:ext uri="{FF2B5EF4-FFF2-40B4-BE49-F238E27FC236}">
+                <a16:creationId xmlns:a16="http://schemas.microsoft.com/office/drawing/2014/main" id="{F376A083-22DF-4585-A11C-4C29D09F6E0B}"/>
+              </a:ext>
+            </a:extLst>
+          </p:cNvPr>
+          <p:cNvPicPr>
+            <a:picLocks noChangeAspect="1" noChangeArrowheads="1"/>
+          </p:cNvPicPr>
+          <p:nvPr/>
+        </p:nvPicPr>
+        <p:blipFill>
+          <a:blip r:embed="rId3">
+            <a:extLst>
+              <a:ext uri="{28A0092B-C50C-407E-A947-70E740481C1C}">
+                <a14:useLocalDpi xmlns:a14="http://schemas.microsoft.com/office/drawing/2010/main" val="0"/>
+              </a:ext>
+            </a:extLst>
+          </a:blip>
+          <a:srcRect/>
+          <a:stretch>
+            <a:fillRect/>
+          </a:stretch>
+        </p:blipFill>
+        <p:spPr bwMode="auto">
+          <a:xfrm>
+            <a:off x="5116039" y="2817573"/>
+            <a:ext cx="5980539" cy="3210547"/>
+          </a:xfrm>
+          <a:prstGeom prst="rect">
+            <a:avLst/>
+          </a:prstGeom>
+          <a:noFill/>
+          <a:extLst>
+            <a:ext uri="{909E8E84-426E-40DD-AFC4-6F175D3DCCD1}">
+              <a14:hiddenFill xmlns:a14="http://schemas.microsoft.com/office/drawing/2010/main">
+                <a:solidFill>
+                  <a:srgbClr val="FFFFFF"/>
+                </a:solidFill>
+              </a14:hiddenFill>
+            </a:ext>
+          </a:extLst>
+        </p:spPr>
+      </p:pic>
+      <p:sp>
+        <p:nvSpPr>
+          <p:cNvPr id="16" name="AutoShape 12" descr="Imagem relacionada">
+            <a:extLst>
+              <a:ext uri="{FF2B5EF4-FFF2-40B4-BE49-F238E27FC236}">
+                <a16:creationId xmlns:a16="http://schemas.microsoft.com/office/drawing/2014/main" id="{896F02C2-E357-4634-8428-E2C841465C91}"/>
+              </a:ext>
+            </a:extLst>
+          </p:cNvPr>
+          <p:cNvSpPr>
+            <a:spLocks noChangeAspect="1" noChangeArrowheads="1"/>
+          </p:cNvSpPr>
+          <p:nvPr/>
+        </p:nvSpPr>
+        <p:spPr bwMode="auto">
+          <a:xfrm>
+            <a:off x="6096000" y="3429000"/>
+            <a:ext cx="304800" cy="304800"/>
+          </a:xfrm>
+          <a:prstGeom prst="rect">
+            <a:avLst/>
+          </a:prstGeom>
+          <a:noFill/>
+          <a:extLst>
+            <a:ext uri="{909E8E84-426E-40DD-AFC4-6F175D3DCCD1}">
+              <a14:hiddenFill xmlns:a14="http://schemas.microsoft.com/office/drawing/2010/main">
+                <a:solidFill>
+                  <a:srgbClr val="FFFFFF"/>
+                </a:solidFill>
+              </a14:hiddenFill>
+            </a:ext>
+          </a:extLst>
+        </p:spPr>
+        <p:txBody>
+          <a:bodyPr vert="horz" wrap="square" lIns="91440" tIns="45720" rIns="91440" bIns="45720" numCol="1" anchor="t" anchorCtr="0" compatLnSpc="1">
+            <a:prstTxWarp prst="textNoShape">
+              <a:avLst/>
+            </a:prstTxWarp>
+          </a:bodyPr>
+          <a:lstStyle/>
+          <a:p>
+            <a:endParaRPr lang="pt-BR"/>
+          </a:p>
+        </p:txBody>
+      </p:sp>
+      <p:pic>
+        <p:nvPicPr>
+          <p:cNvPr id="1042" name="Picture 18" descr="Imagem relacionada">
+            <a:extLst>
+              <a:ext uri="{FF2B5EF4-FFF2-40B4-BE49-F238E27FC236}">
+                <a16:creationId xmlns:a16="http://schemas.microsoft.com/office/drawing/2014/main" id="{06F16A53-A450-40DA-AD02-913F9101A356}"/>
+              </a:ext>
+            </a:extLst>
+          </p:cNvPr>
+          <p:cNvPicPr>
+            <a:picLocks noChangeAspect="1" noChangeArrowheads="1"/>
+          </p:cNvPicPr>
+          <p:nvPr/>
+        </p:nvPicPr>
+        <p:blipFill>
+          <a:blip r:embed="rId4">
+            <a:extLst>
+              <a:ext uri="{28A0092B-C50C-407E-A947-70E740481C1C}">
+                <a14:useLocalDpi xmlns:a14="http://schemas.microsoft.com/office/drawing/2010/main" val="0"/>
+              </a:ext>
+            </a:extLst>
+          </a:blip>
+          <a:srcRect/>
+          <a:stretch>
+            <a:fillRect/>
+          </a:stretch>
+        </p:blipFill>
+        <p:spPr bwMode="auto">
+          <a:xfrm>
+            <a:off x="5116039" y="1171574"/>
+            <a:ext cx="2000250" cy="1333500"/>
+          </a:xfrm>
+          <a:prstGeom prst="rect">
+            <a:avLst/>
+          </a:prstGeom>
+          <a:noFill/>
+          <a:extLst>
+            <a:ext uri="{909E8E84-426E-40DD-AFC4-6F175D3DCCD1}">
+              <a14:hiddenFill xmlns:a14="http://schemas.microsoft.com/office/drawing/2010/main">
+                <a:solidFill>
+                  <a:srgbClr val="FFFFFF"/>
+                </a:solidFill>
+              </a14:hiddenFill>
+            </a:ext>
+          </a:extLst>
+        </p:spPr>
+      </p:pic>
+    </p:spTree>
+    <p:extLst>
+      <p:ext uri="{BB962C8B-B14F-4D97-AF65-F5344CB8AC3E}">
+        <p14:creationId xmlns:p14="http://schemas.microsoft.com/office/powerpoint/2010/main" val="2448608479"/>
+      </p:ext>
+    </p:extLst>
+  </p:cSld>
+  <p:clrMapOvr>
+    <a:masterClrMapping/>
+  </p:clrMapOvr>
+  <p:timing>
+    <p:tnLst>
+      <p:par>
+        <p:cTn id="1" dur="indefinite" restart="never" nodeType="tmRoot">
+          <p:childTnLst>
+            <p:seq concurrent="1" nextAc="seek">
+              <p:cTn id="2" dur="indefinite" nodeType="mainSeq">
+                <p:childTnLst>
+                  <p:par>
+                    <p:cTn id="3" fill="hold">
+                      <p:stCondLst>
+                        <p:cond delay="indefinite"/>
+                      </p:stCondLst>
+                      <p:childTnLst>
+                        <p:par>
+                          <p:cTn id="4" fill="hold">
+                            <p:stCondLst>
+                              <p:cond delay="0"/>
+                            </p:stCondLst>
+                            <p:childTnLst>
+                              <p:par>
+                                <p:cTn id="5" presetID="53" presetClass="entr" presetSubtype="16" fill="hold" nodeType="clickEffect">
+                                  <p:stCondLst>
+                                    <p:cond delay="0"/>
+                                  </p:stCondLst>
+                                  <p:childTnLst>
+                                    <p:set>
+                                      <p:cBhvr>
+                                        <p:cTn id="6" dur="1" fill="hold">
+                                          <p:stCondLst>
+                                            <p:cond delay="0"/>
+                                          </p:stCondLst>
+                                        </p:cTn>
+                                        <p:tgtEl>
+                                          <p:spTgt spid="1028"/>
+                                        </p:tgtEl>
+                                        <p:attrNameLst>
+                                          <p:attrName>style.visibility</p:attrName>
+                                        </p:attrNameLst>
+                                      </p:cBhvr>
+                                      <p:to>
+                                        <p:strVal val="visible"/>
+                                      </p:to>
+                                    </p:set>
+                                    <p:anim calcmode="lin" valueType="num">
+                                      <p:cBhvr>
+                                        <p:cTn id="7" dur="500" fill="hold"/>
+                                        <p:tgtEl>
+                                          <p:spTgt spid="1028"/>
+                                        </p:tgtEl>
+                                        <p:attrNameLst>
+                                          <p:attrName>ppt_w</p:attrName>
+                                        </p:attrNameLst>
+                                      </p:cBhvr>
+                                      <p:tavLst>
+                                        <p:tav tm="0">
+                                          <p:val>
+                                            <p:fltVal val="0"/>
+                                          </p:val>
+                                        </p:tav>
+                                        <p:tav tm="100000">
+                                          <p:val>
+                                            <p:strVal val="#ppt_w"/>
+                                          </p:val>
+                                        </p:tav>
+                                      </p:tavLst>
+                                    </p:anim>
+                                    <p:anim calcmode="lin" valueType="num">
+                                      <p:cBhvr>
+                                        <p:cTn id="8" dur="500" fill="hold"/>
+                                        <p:tgtEl>
+                                          <p:spTgt spid="1028"/>
+                                        </p:tgtEl>
+                                        <p:attrNameLst>
+                                          <p:attrName>ppt_h</p:attrName>
+                                        </p:attrNameLst>
+                                      </p:cBhvr>
+                                      <p:tavLst>
+                                        <p:tav tm="0">
+                                          <p:val>
+                                            <p:fltVal val="0"/>
+                                          </p:val>
+                                        </p:tav>
+                                        <p:tav tm="100000">
+                                          <p:val>
+                                            <p:strVal val="#ppt_h"/>
+                                          </p:val>
+                                        </p:tav>
+                                      </p:tavLst>
+                                    </p:anim>
+                                    <p:animEffect transition="in" filter="fade">
+                                      <p:cBhvr>
+                                        <p:cTn id="9" dur="500"/>
+                                        <p:tgtEl>
+                                          <p:spTgt spid="1028"/>
+                                        </p:tgtEl>
+                                      </p:cBhvr>
+                                    </p:animEffect>
+                                  </p:childTnLst>
+                                </p:cTn>
+                              </p:par>
+                            </p:childTnLst>
+                          </p:cTn>
+                        </p:par>
+                      </p:childTnLst>
+                    </p:cTn>
+                  </p:par>
+                  <p:par>
+                    <p:cTn id="10" fill="hold">
+                      <p:stCondLst>
+                        <p:cond delay="indefinite"/>
+                      </p:stCondLst>
+                      <p:childTnLst>
+                        <p:par>
+                          <p:cTn id="11" fill="hold">
+                            <p:stCondLst>
+                              <p:cond delay="0"/>
+                            </p:stCondLst>
+                            <p:childTnLst>
+                              <p:par>
+                                <p:cTn id="12" presetID="53" presetClass="entr" presetSubtype="16" fill="hold" nodeType="clickEffect">
+                                  <p:stCondLst>
+                                    <p:cond delay="0"/>
+                                  </p:stCondLst>
+                                  <p:childTnLst>
+                                    <p:set>
+                                      <p:cBhvr>
+                                        <p:cTn id="13" dur="1" fill="hold">
+                                          <p:stCondLst>
+                                            <p:cond delay="0"/>
+                                          </p:stCondLst>
+                                        </p:cTn>
+                                        <p:tgtEl>
+                                          <p:spTgt spid="1042"/>
+                                        </p:tgtEl>
+                                        <p:attrNameLst>
+                                          <p:attrName>style.visibility</p:attrName>
+                                        </p:attrNameLst>
+                                      </p:cBhvr>
+                                      <p:to>
+                                        <p:strVal val="visible"/>
+                                      </p:to>
+                                    </p:set>
+                                    <p:anim calcmode="lin" valueType="num">
+                                      <p:cBhvr>
+                                        <p:cTn id="14" dur="500" fill="hold"/>
+                                        <p:tgtEl>
+                                          <p:spTgt spid="1042"/>
+                                        </p:tgtEl>
+                                        <p:attrNameLst>
+                                          <p:attrName>ppt_w</p:attrName>
+                                        </p:attrNameLst>
+                                      </p:cBhvr>
+                                      <p:tavLst>
+                                        <p:tav tm="0">
+                                          <p:val>
+                                            <p:fltVal val="0"/>
+                                          </p:val>
+                                        </p:tav>
+                                        <p:tav tm="100000">
+                                          <p:val>
+                                            <p:strVal val="#ppt_w"/>
+                                          </p:val>
+                                        </p:tav>
+                                      </p:tavLst>
+                                    </p:anim>
+                                    <p:anim calcmode="lin" valueType="num">
+                                      <p:cBhvr>
+                                        <p:cTn id="15" dur="500" fill="hold"/>
+                                        <p:tgtEl>
+                                          <p:spTgt spid="1042"/>
+                                        </p:tgtEl>
+                                        <p:attrNameLst>
+                                          <p:attrName>ppt_h</p:attrName>
+                                        </p:attrNameLst>
+                                      </p:cBhvr>
+                                      <p:tavLst>
+                                        <p:tav tm="0">
+                                          <p:val>
+                                            <p:fltVal val="0"/>
+                                          </p:val>
+                                        </p:tav>
+                                        <p:tav tm="100000">
+                                          <p:val>
+                                            <p:strVal val="#ppt_h"/>
+                                          </p:val>
+                                        </p:tav>
+                                      </p:tavLst>
+                                    </p:anim>
+                                    <p:animEffect transition="in" filter="fade">
+                                      <p:cBhvr>
+                                        <p:cTn id="16" dur="500"/>
+                                        <p:tgtEl>
+                                          <p:spTgt spid="1042"/>
+                                        </p:tgtEl>
+                                      </p:cBhvr>
+                                    </p:animEffect>
+                                  </p:childTnLst>
+                                </p:cTn>
+                              </p:par>
+                            </p:childTnLst>
+                          </p:cTn>
+                        </p:par>
+                      </p:childTnLst>
+                    </p:cTn>
+                  </p:par>
+                  <p:par>
+                    <p:cTn id="17" fill="hold">
+                      <p:stCondLst>
+                        <p:cond delay="indefinite"/>
+                      </p:stCondLst>
+                      <p:childTnLst>
+                        <p:par>
+                          <p:cTn id="18" fill="hold">
+                            <p:stCondLst>
+                              <p:cond delay="0"/>
+                            </p:stCondLst>
+                            <p:childTnLst>
+                              <p:par>
+                                <p:cTn id="19" presetID="31" presetClass="entr" presetSubtype="0" fill="hold" nodeType="clickEffect">
+                                  <p:stCondLst>
+                                    <p:cond delay="0"/>
+                                  </p:stCondLst>
+                                  <p:childTnLst>
+                                    <p:set>
+                                      <p:cBhvr>
+                                        <p:cTn id="20" dur="1" fill="hold">
+                                          <p:stCondLst>
+                                            <p:cond delay="0"/>
+                                          </p:stCondLst>
+                                        </p:cTn>
+                                        <p:tgtEl>
+                                          <p:spTgt spid="1032"/>
+                                        </p:tgtEl>
+                                        <p:attrNameLst>
+                                          <p:attrName>style.visibility</p:attrName>
+                                        </p:attrNameLst>
+                                      </p:cBhvr>
+                                      <p:to>
+                                        <p:strVal val="visible"/>
+                                      </p:to>
+                                    </p:set>
+                                    <p:anim calcmode="lin" valueType="num">
+                                      <p:cBhvr>
+                                        <p:cTn id="21" dur="1000" fill="hold"/>
+                                        <p:tgtEl>
+                                          <p:spTgt spid="1032"/>
+                                        </p:tgtEl>
+                                        <p:attrNameLst>
+                                          <p:attrName>ppt_w</p:attrName>
+                                        </p:attrNameLst>
+                                      </p:cBhvr>
+                                      <p:tavLst>
+                                        <p:tav tm="0">
+                                          <p:val>
+                                            <p:fltVal val="0"/>
+                                          </p:val>
+                                        </p:tav>
+                                        <p:tav tm="100000">
+                                          <p:val>
+                                            <p:strVal val="#ppt_w"/>
+                                          </p:val>
+                                        </p:tav>
+                                      </p:tavLst>
+                                    </p:anim>
+                                    <p:anim calcmode="lin" valueType="num">
+                                      <p:cBhvr>
+                                        <p:cTn id="22" dur="1000" fill="hold"/>
+                                        <p:tgtEl>
+                                          <p:spTgt spid="1032"/>
+                                        </p:tgtEl>
+                                        <p:attrNameLst>
+                                          <p:attrName>ppt_h</p:attrName>
+                                        </p:attrNameLst>
+                                      </p:cBhvr>
+                                      <p:tavLst>
+                                        <p:tav tm="0">
+                                          <p:val>
+                                            <p:fltVal val="0"/>
+                                          </p:val>
+                                        </p:tav>
+                                        <p:tav tm="100000">
+                                          <p:val>
+                                            <p:strVal val="#ppt_h"/>
+                                          </p:val>
+                                        </p:tav>
+                                      </p:tavLst>
+                                    </p:anim>
+                                    <p:anim calcmode="lin" valueType="num">
+                                      <p:cBhvr>
+                                        <p:cTn id="23" dur="1000" fill="hold"/>
+                                        <p:tgtEl>
+                                          <p:spTgt spid="1032"/>
+                                        </p:tgtEl>
+                                        <p:attrNameLst>
+                                          <p:attrName>style.rotation</p:attrName>
+                                        </p:attrNameLst>
+                                      </p:cBhvr>
+                                      <p:tavLst>
+                                        <p:tav tm="0">
+                                          <p:val>
+                                            <p:fltVal val="90"/>
+                                          </p:val>
+                                        </p:tav>
+                                        <p:tav tm="100000">
+                                          <p:val>
+                                            <p:fltVal val="0"/>
+                                          </p:val>
+                                        </p:tav>
+                                      </p:tavLst>
+                                    </p:anim>
+                                    <p:animEffect transition="in" filter="fade">
+                                      <p:cBhvr>
+                                        <p:cTn id="24" dur="1000"/>
+                                        <p:tgtEl>
+                                          <p:spTgt spid="1032"/>
+                                        </p:tgtEl>
+                                      </p:cBhvr>
+                                    </p:animEffect>
+                                  </p:childTnLst>
+                                </p:cTn>
+                              </p:par>
+                            </p:childTnLst>
+                          </p:cTn>
+                        </p:par>
+                      </p:childTnLst>
+                    </p:cTn>
+                  </p:par>
+                </p:childTnLst>
+              </p:cTn>
+              <p:prevCondLst>
+                <p:cond evt="onPrev" delay="0">
+                  <p:tgtEl>
+                    <p:sldTgt/>
+                  </p:tgtEl>
+                </p:cond>
+              </p:prevCondLst>
+              <p:nextCondLst>
+                <p:cond evt="onNext" delay="0">
+                  <p:tgtEl>
+                    <p:sldTgt/>
+                  </p:tgtEl>
+                </p:cond>
+              </p:nextCondLst>
+            </p:seq>
+          </p:childTnLst>
+        </p:cTn>
+      </p:par>
+    </p:tnLst>
+  </p:timing>
+</p:sld>
+</file>
+
+<file path=ppt/slides/slide7.xml><?xml version="1.0" encoding="utf-8"?>
+<p:sld xmlns:a="http://schemas.openxmlformats.org/drawingml/2006/main" xmlns:r="http://schemas.openxmlformats.org/officeDocument/2006/relationships" xmlns:p="http://schemas.openxmlformats.org/presentationml/2006/main">
+  <p:cSld>
+    <p:spTree>
+      <p:nvGrpSpPr>
+        <p:cNvPr id="1" name=""/>
+        <p:cNvGrpSpPr/>
+        <p:nvPr/>
+      </p:nvGrpSpPr>
+      <p:grpSpPr>
+        <a:xfrm>
+          <a:off x="0" y="0"/>
+          <a:ext cx="0" cy="0"/>
+          <a:chOff x="0" y="0"/>
+          <a:chExt cx="0" cy="0"/>
+        </a:xfrm>
+      </p:grpSpPr>
+      <p:sp>
+        <p:nvSpPr>
+          <p:cNvPr id="2" name="Título 1">
+            <a:extLst>
+              <a:ext uri="{FF2B5EF4-FFF2-40B4-BE49-F238E27FC236}">
+                <a16:creationId xmlns:a16="http://schemas.microsoft.com/office/drawing/2014/main" id="{19230EE8-7593-4D66-BABE-A624F9107347}"/>
+              </a:ext>
+            </a:extLst>
+          </p:cNvPr>
+          <p:cNvSpPr>
+            <a:spLocks noGrp="1"/>
+          </p:cNvSpPr>
+          <p:nvPr>
+            <p:ph type="title"/>
+          </p:nvPr>
+        </p:nvSpPr>
+        <p:spPr/>
+        <p:txBody>
+          <a:bodyPr/>
+          <a:lstStyle/>
+          <a:p>
+            <a:r>
+              <a:rPr lang="pt-BR" dirty="0"/>
+              <a:t>Testando...</a:t>
+            </a:r>
+          </a:p>
+        </p:txBody>
+      </p:sp>
+      <p:sp>
+        <p:nvSpPr>
+          <p:cNvPr id="4" name="Espaço Reservado para Rodapé 3">
+            <a:extLst>
+              <a:ext uri="{FF2B5EF4-FFF2-40B4-BE49-F238E27FC236}">
+                <a16:creationId xmlns:a16="http://schemas.microsoft.com/office/drawing/2014/main" id="{106876FF-28E0-4A72-8C87-9EEB941DA9D3}"/>
+              </a:ext>
+            </a:extLst>
+          </p:cNvPr>
+          <p:cNvSpPr>
+            <a:spLocks noGrp="1"/>
+          </p:cNvSpPr>
+          <p:nvPr>
+            <p:ph type="ftr" sz="quarter" idx="11"/>
+          </p:nvPr>
+        </p:nvSpPr>
+        <p:spPr/>
+        <p:txBody>
+          <a:bodyPr/>
+          <a:lstStyle/>
+          <a:p>
+            <a:r>
+              <a:rPr lang="pt-BR" dirty="0"/>
+              <a:t>Testes Unitários</a:t>
+            </a:r>
+          </a:p>
+        </p:txBody>
+      </p:sp>
+      <p:sp>
+        <p:nvSpPr>
+          <p:cNvPr id="5" name="Espaço Reservado para Número de Slide 4">
+            <a:extLst>
+              <a:ext uri="{FF2B5EF4-FFF2-40B4-BE49-F238E27FC236}">
+                <a16:creationId xmlns:a16="http://schemas.microsoft.com/office/drawing/2014/main" id="{3B8D016B-C5B6-45DB-9D25-63814C34EA5E}"/>
+              </a:ext>
+            </a:extLst>
+          </p:cNvPr>
+          <p:cNvSpPr>
+            <a:spLocks noGrp="1"/>
+          </p:cNvSpPr>
+          <p:nvPr>
+            <p:ph type="sldNum" sz="quarter" idx="12"/>
+          </p:nvPr>
+        </p:nvSpPr>
+        <p:spPr/>
+        <p:txBody>
+          <a:bodyPr/>
+          <a:lstStyle/>
+          <a:p>
+            <a:pPr rtl="0"/>
+            <a:fld id="{8D581BC7-E183-40DB-AC97-C19EA4EB8894}" type="slidenum">
+              <a:rPr lang="pt-BR" noProof="0" smtClean="0"/>
+              <a:pPr rtl="0"/>
+              <a:t>7</a:t>
+            </a:fld>
+            <a:endParaRPr lang="pt-BR" noProof="0" dirty="0"/>
+          </a:p>
+        </p:txBody>
+      </p:sp>
+      <p:pic>
+        <p:nvPicPr>
+          <p:cNvPr id="6" name="Imagem 5" descr="Fundo preto com letras brancas&#10;&#10;Descrição gerada automaticamente">
+            <a:extLst>
+              <a:ext uri="{FF2B5EF4-FFF2-40B4-BE49-F238E27FC236}">
+                <a16:creationId xmlns:a16="http://schemas.microsoft.com/office/drawing/2014/main" id="{1A7D3E92-54EB-4CAA-9B8D-AA243EB69C3E}"/>
+              </a:ext>
+            </a:extLst>
+          </p:cNvPr>
+          <p:cNvPicPr>
+            <a:picLocks noChangeAspect="1"/>
+          </p:cNvPicPr>
+          <p:nvPr/>
+        </p:nvPicPr>
+        <p:blipFill>
+          <a:blip r:embed="rId2"/>
+          <a:stretch>
+            <a:fillRect/>
+          </a:stretch>
+        </p:blipFill>
+        <p:spPr>
+          <a:xfrm>
+            <a:off x="2077356" y="1179963"/>
+            <a:ext cx="8512969" cy="4540250"/>
+          </a:xfrm>
+          <a:prstGeom prst="rect">
+            <a:avLst/>
+          </a:prstGeom>
+        </p:spPr>
+      </p:pic>
+    </p:spTree>
+    <p:extLst>
+      <p:ext uri="{BB962C8B-B14F-4D97-AF65-F5344CB8AC3E}">
+        <p14:creationId xmlns:p14="http://schemas.microsoft.com/office/powerpoint/2010/main" val="2528669037"/>
+      </p:ext>
+    </p:extLst>
+  </p:cSld>
+  <p:clrMapOvr>
+    <a:masterClrMapping/>
+  </p:clrMapOvr>
+</p:sld>
+</file>
+
+<file path=ppt/slides/slide8.xml><?xml version="1.0" encoding="utf-8"?>
+<p:sld xmlns:a="http://schemas.openxmlformats.org/drawingml/2006/main" xmlns:r="http://schemas.openxmlformats.org/officeDocument/2006/relationships" xmlns:p="http://schemas.openxmlformats.org/presentationml/2006/main">
+  <p:cSld>
+    <p:spTree>
+      <p:nvGrpSpPr>
+        <p:cNvPr id="1" name=""/>
+        <p:cNvGrpSpPr/>
+        <p:nvPr/>
+      </p:nvGrpSpPr>
+      <p:grpSpPr>
+        <a:xfrm>
+          <a:off x="0" y="0"/>
+          <a:ext cx="0" cy="0"/>
+          <a:chOff x="0" y="0"/>
+          <a:chExt cx="0" cy="0"/>
+        </a:xfrm>
+      </p:grpSpPr>
+      <p:sp>
+        <p:nvSpPr>
+          <p:cNvPr id="8" name="Retângulo 7">
+            <a:extLst>
+              <a:ext uri="{FF2B5EF4-FFF2-40B4-BE49-F238E27FC236}">
+                <a16:creationId xmlns:a16="http://schemas.microsoft.com/office/drawing/2014/main" id="{1A0C204F-3EDB-4CFB-88C4-F2FD65BD31FD}"/>
+              </a:ext>
+            </a:extLst>
+          </p:cNvPr>
+          <p:cNvSpPr/>
+          <p:nvPr/>
+        </p:nvSpPr>
+        <p:spPr>
+          <a:xfrm>
+            <a:off x="1444487" y="1165408"/>
+            <a:ext cx="9303026" cy="4674497"/>
+          </a:xfrm>
+          <a:prstGeom prst="rect">
+            <a:avLst/>
+          </a:prstGeom>
+          <a:solidFill>
+            <a:schemeClr val="bg2"/>
+          </a:solidFill>
+          <a:ln>
+            <a:solidFill>
+              <a:srgbClr val="FFC000"/>
+            </a:solidFill>
+          </a:ln>
+        </p:spPr>
+        <p:style>
+          <a:lnRef idx="2">
+            <a:schemeClr val="accent1">
+              <a:shade val="50000"/>
+            </a:schemeClr>
+          </a:lnRef>
+          <a:fillRef idx="1">
+            <a:schemeClr val="accent1"/>
+          </a:fillRef>
+          <a:effectRef idx="0">
+            <a:schemeClr val="accent1"/>
+          </a:effectRef>
+          <a:fontRef idx="minor">
+            <a:schemeClr val="lt1"/>
+          </a:fontRef>
+        </p:style>
+        <p:txBody>
+          <a:bodyPr rot="0" spcFirstLastPara="0" vertOverflow="overflow" horzOverflow="overflow" vert="horz" wrap="square" lIns="91440" tIns="45720" rIns="91440" bIns="45720" numCol="1" spcCol="0" rtlCol="0" fromWordArt="0" anchor="ctr" anchorCtr="0" forceAA="0" compatLnSpc="1">
+            <a:prstTxWarp prst="textNoShape">
+              <a:avLst/>
+            </a:prstTxWarp>
+            <a:noAutofit/>
+          </a:bodyPr>
+          <a:lstStyle/>
+          <a:p>
+            <a:pPr algn="ctr"/>
+            <a:endParaRPr lang="pt-BR"/>
+          </a:p>
+        </p:txBody>
+      </p:sp>
+      <p:sp>
+        <p:nvSpPr>
+          <p:cNvPr id="2" name="Título 1">
+            <a:extLst>
+              <a:ext uri="{FF2B5EF4-FFF2-40B4-BE49-F238E27FC236}">
+                <a16:creationId xmlns:a16="http://schemas.microsoft.com/office/drawing/2014/main" id="{19230EE8-7593-4D66-BABE-A624F9107347}"/>
+              </a:ext>
+            </a:extLst>
+          </p:cNvPr>
+          <p:cNvSpPr>
+            <a:spLocks noGrp="1"/>
+          </p:cNvSpPr>
+          <p:nvPr>
+            <p:ph type="title"/>
+          </p:nvPr>
+        </p:nvSpPr>
+        <p:spPr/>
+        <p:txBody>
+          <a:bodyPr/>
+          <a:lstStyle/>
+          <a:p>
+            <a:r>
+              <a:rPr lang="pt-BR" dirty="0"/>
+              <a:t>Por que escrever testes unitários?</a:t>
+            </a:r>
+          </a:p>
+        </p:txBody>
+      </p:sp>
+      <p:sp>
+        <p:nvSpPr>
+          <p:cNvPr id="4" name="Espaço Reservado para Rodapé 3">
+            <a:extLst>
+              <a:ext uri="{FF2B5EF4-FFF2-40B4-BE49-F238E27FC236}">
+                <a16:creationId xmlns:a16="http://schemas.microsoft.com/office/drawing/2014/main" id="{106876FF-28E0-4A72-8C87-9EEB941DA9D3}"/>
+              </a:ext>
+            </a:extLst>
+          </p:cNvPr>
+          <p:cNvSpPr>
+            <a:spLocks noGrp="1"/>
+          </p:cNvSpPr>
+          <p:nvPr>
+            <p:ph type="ftr" sz="quarter" idx="11"/>
+          </p:nvPr>
+        </p:nvSpPr>
+        <p:spPr/>
+        <p:txBody>
+          <a:bodyPr/>
+          <a:lstStyle/>
+          <a:p>
+            <a:r>
+              <a:rPr lang="pt-BR" dirty="0"/>
+              <a:t>Testes Unitários</a:t>
+            </a:r>
+          </a:p>
+        </p:txBody>
+      </p:sp>
+      <p:sp>
+        <p:nvSpPr>
+          <p:cNvPr id="5" name="Espaço Reservado para Número de Slide 4">
+            <a:extLst>
+              <a:ext uri="{FF2B5EF4-FFF2-40B4-BE49-F238E27FC236}">
+                <a16:creationId xmlns:a16="http://schemas.microsoft.com/office/drawing/2014/main" id="{3B8D016B-C5B6-45DB-9D25-63814C34EA5E}"/>
+              </a:ext>
+            </a:extLst>
+          </p:cNvPr>
+          <p:cNvSpPr>
+            <a:spLocks noGrp="1"/>
+          </p:cNvSpPr>
+          <p:nvPr>
+            <p:ph type="sldNum" sz="quarter" idx="12"/>
+          </p:nvPr>
+        </p:nvSpPr>
+        <p:spPr/>
+        <p:txBody>
+          <a:bodyPr/>
+          <a:lstStyle/>
+          <a:p>
+            <a:pPr rtl="0"/>
+            <a:fld id="{8D581BC7-E183-40DB-AC97-C19EA4EB8894}" type="slidenum">
+              <a:rPr lang="pt-BR" noProof="0" smtClean="0"/>
+              <a:pPr rtl="0"/>
+              <a:t>8</a:t>
+            </a:fld>
+            <a:endParaRPr lang="pt-BR" noProof="0" dirty="0"/>
+          </a:p>
+        </p:txBody>
+      </p:sp>
+      <p:pic>
+        <p:nvPicPr>
+          <p:cNvPr id="7" name="Imagem 6" descr="Uma imagem contendo texto&#10;&#10;Descrição gerada automaticamente">
+            <a:extLst>
+              <a:ext uri="{FF2B5EF4-FFF2-40B4-BE49-F238E27FC236}">
+                <a16:creationId xmlns:a16="http://schemas.microsoft.com/office/drawing/2014/main" id="{700EF012-5F7D-4A28-B598-2CD64FD85BFE}"/>
+              </a:ext>
+            </a:extLst>
+          </p:cNvPr>
+          <p:cNvPicPr>
+            <a:picLocks noChangeAspect="1"/>
+          </p:cNvPicPr>
+          <p:nvPr/>
+        </p:nvPicPr>
+        <p:blipFill>
+          <a:blip r:embed="rId2"/>
+          <a:stretch>
+            <a:fillRect/>
+          </a:stretch>
+        </p:blipFill>
+        <p:spPr>
+          <a:xfrm>
+            <a:off x="2025464" y="1165409"/>
+            <a:ext cx="8141071" cy="4527182"/>
+          </a:xfrm>
+          <a:prstGeom prst="rect">
+            <a:avLst/>
+          </a:prstGeom>
+        </p:spPr>
+      </p:pic>
+    </p:spTree>
+    <p:extLst>
+      <p:ext uri="{BB962C8B-B14F-4D97-AF65-F5344CB8AC3E}">
+        <p14:creationId xmlns:p14="http://schemas.microsoft.com/office/powerpoint/2010/main" val="2332277559"/>
+      </p:ext>
+    </p:extLst>
+  </p:cSld>
+  <p:clrMapOvr>
+    <a:masterClrMapping/>
+  </p:clrMapOvr>
+</p:sld>
+</file>
+
+<file path=ppt/slides/slide9.xml><?xml version="1.0" encoding="utf-8"?>
+<p:sld xmlns:a="http://schemas.openxmlformats.org/drawingml/2006/main" xmlns:r="http://schemas.openxmlformats.org/officeDocument/2006/relationships" xmlns:p="http://schemas.openxmlformats.org/presentationml/2006/main">
+  <p:cSld>
+    <p:spTree>
+      <p:nvGrpSpPr>
+        <p:cNvPr id="1" name=""/>
+        <p:cNvGrpSpPr/>
+        <p:nvPr/>
+      </p:nvGrpSpPr>
+      <p:grpSpPr>
+        <a:xfrm>
+          <a:off x="0" y="0"/>
+          <a:ext cx="0" cy="0"/>
+          <a:chOff x="0" y="0"/>
+          <a:chExt cx="0" cy="0"/>
+        </a:xfrm>
+      </p:grpSpPr>
+      <p:sp>
+        <p:nvSpPr>
+          <p:cNvPr id="2" name="Título 1">
+            <a:extLst>
+              <a:ext uri="{FF2B5EF4-FFF2-40B4-BE49-F238E27FC236}">
+                <a16:creationId xmlns:a16="http://schemas.microsoft.com/office/drawing/2014/main" id="{19230EE8-7593-4D66-BABE-A624F9107347}"/>
+              </a:ext>
+            </a:extLst>
+          </p:cNvPr>
+          <p:cNvSpPr>
+            <a:spLocks noGrp="1"/>
+          </p:cNvSpPr>
+          <p:nvPr>
+            <p:ph type="title"/>
+          </p:nvPr>
+        </p:nvSpPr>
+        <p:spPr/>
+        <p:txBody>
+          <a:bodyPr/>
+          <a:lstStyle/>
+          <a:p>
+            <a:r>
+              <a:rPr lang="pt-BR" dirty="0"/>
+              <a:t>Mas, afinal, o que são testes unitários?</a:t>
+            </a:r>
+          </a:p>
+        </p:txBody>
+      </p:sp>
+      <p:sp>
+        <p:nvSpPr>
+          <p:cNvPr id="4" name="Espaço Reservado para Rodapé 3">
+            <a:extLst>
+              <a:ext uri="{FF2B5EF4-FFF2-40B4-BE49-F238E27FC236}">
+                <a16:creationId xmlns:a16="http://schemas.microsoft.com/office/drawing/2014/main" id="{106876FF-28E0-4A72-8C87-9EEB941DA9D3}"/>
+              </a:ext>
+            </a:extLst>
+          </p:cNvPr>
+          <p:cNvSpPr>
+            <a:spLocks noGrp="1"/>
+          </p:cNvSpPr>
+          <p:nvPr>
+            <p:ph type="ftr" sz="quarter" idx="11"/>
+          </p:nvPr>
+        </p:nvSpPr>
+        <p:spPr/>
+        <p:txBody>
+          <a:bodyPr/>
+          <a:lstStyle/>
+          <a:p>
+            <a:r>
+              <a:rPr lang="pt-BR" dirty="0"/>
+              <a:t>Testes Unitários</a:t>
+            </a:r>
+          </a:p>
+        </p:txBody>
+      </p:sp>
+      <p:sp>
+        <p:nvSpPr>
+          <p:cNvPr id="5" name="Espaço Reservado para Número de Slide 4">
+            <a:extLst>
+              <a:ext uri="{FF2B5EF4-FFF2-40B4-BE49-F238E27FC236}">
+                <a16:creationId xmlns:a16="http://schemas.microsoft.com/office/drawing/2014/main" id="{3B8D016B-C5B6-45DB-9D25-63814C34EA5E}"/>
+              </a:ext>
+            </a:extLst>
+          </p:cNvPr>
+          <p:cNvSpPr>
+            <a:spLocks noGrp="1"/>
+          </p:cNvSpPr>
+          <p:nvPr>
+            <p:ph type="sldNum" sz="quarter" idx="12"/>
+          </p:nvPr>
+        </p:nvSpPr>
+        <p:spPr/>
+        <p:txBody>
+          <a:bodyPr/>
+          <a:lstStyle/>
+          <a:p>
+            <a:pPr rtl="0"/>
+            <a:fld id="{8D581BC7-E183-40DB-AC97-C19EA4EB8894}" type="slidenum">
+              <a:rPr lang="pt-BR" noProof="0" smtClean="0"/>
+              <a:pPr rtl="0"/>
+              <a:t>9</a:t>
             </a:fld>
             <a:endParaRPr lang="pt-BR" noProof="0" dirty="0"/>
           </a:p>
@@ -46864,6 +48393,9 @@
           <a:prstGeom prst="rect">
             <a:avLst/>
           </a:prstGeom>
+          <a:solidFill>
+            <a:srgbClr val="7030A0"/>
+          </a:solidFill>
         </p:spPr>
         <p:style>
           <a:lnRef idx="0">
@@ -46915,6 +48447,9 @@
           <a:prstGeom prst="rightArrow">
             <a:avLst/>
           </a:prstGeom>
+          <a:solidFill>
+            <a:srgbClr val="7030A0"/>
+          </a:solidFill>
         </p:spPr>
         <p:style>
           <a:lnRef idx="0">
@@ -46963,6 +48498,9 @@
           <a:prstGeom prst="rect">
             <a:avLst/>
           </a:prstGeom>
+          <a:solidFill>
+            <a:srgbClr val="7030A0"/>
+          </a:solidFill>
         </p:spPr>
         <p:style>
           <a:lnRef idx="0">
@@ -47014,6 +48552,9 @@
           <a:prstGeom prst="rightArrow">
             <a:avLst/>
           </a:prstGeom>
+          <a:solidFill>
+            <a:srgbClr val="7030A0"/>
+          </a:solidFill>
         </p:spPr>
         <p:style>
           <a:lnRef idx="0">
@@ -47062,6 +48603,9 @@
           <a:prstGeom prst="rect">
             <a:avLst/>
           </a:prstGeom>
+          <a:solidFill>
+            <a:srgbClr val="7030A0"/>
+          </a:solidFill>
         </p:spPr>
         <p:style>
           <a:lnRef idx="0">
@@ -47856,1012 +49400,6 @@
       <p:bldP spid="14" grpId="0" animBg="1"/>
       <p:bldP spid="15" grpId="0" animBg="1"/>
     </p:bldLst>
-  </p:timing>
-</p:sld>
-</file>
-
-<file path=ppt/slides/slide7.xml><?xml version="1.0" encoding="utf-8"?>
-<p:sld xmlns:a="http://schemas.openxmlformats.org/drawingml/2006/main" xmlns:r="http://schemas.openxmlformats.org/officeDocument/2006/relationships" xmlns:p="http://schemas.openxmlformats.org/presentationml/2006/main">
-  <p:cSld>
-    <p:spTree>
-      <p:nvGrpSpPr>
-        <p:cNvPr id="1" name=""/>
-        <p:cNvGrpSpPr/>
-        <p:nvPr/>
-      </p:nvGrpSpPr>
-      <p:grpSpPr>
-        <a:xfrm>
-          <a:off x="0" y="0"/>
-          <a:ext cx="0" cy="0"/>
-          <a:chOff x="0" y="0"/>
-          <a:chExt cx="0" cy="0"/>
-        </a:xfrm>
-      </p:grpSpPr>
-      <p:sp>
-        <p:nvSpPr>
-          <p:cNvPr id="2" name="Título 1">
-            <a:extLst>
-              <a:ext uri="{FF2B5EF4-FFF2-40B4-BE49-F238E27FC236}">
-                <a16:creationId xmlns:a16="http://schemas.microsoft.com/office/drawing/2014/main" id="{19230EE8-7593-4D66-BABE-A624F9107347}"/>
-              </a:ext>
-            </a:extLst>
-          </p:cNvPr>
-          <p:cNvSpPr>
-            <a:spLocks noGrp="1"/>
-          </p:cNvSpPr>
-          <p:nvPr>
-            <p:ph type="title"/>
-          </p:nvPr>
-        </p:nvSpPr>
-        <p:spPr/>
-        <p:txBody>
-          <a:bodyPr/>
-          <a:lstStyle/>
-          <a:p>
-            <a:r>
-              <a:rPr lang="pt-BR" dirty="0"/>
-              <a:t>Testando...</a:t>
-            </a:r>
-          </a:p>
-        </p:txBody>
-      </p:sp>
-      <p:sp>
-        <p:nvSpPr>
-          <p:cNvPr id="4" name="Espaço Reservado para Rodapé 3">
-            <a:extLst>
-              <a:ext uri="{FF2B5EF4-FFF2-40B4-BE49-F238E27FC236}">
-                <a16:creationId xmlns:a16="http://schemas.microsoft.com/office/drawing/2014/main" id="{106876FF-28E0-4A72-8C87-9EEB941DA9D3}"/>
-              </a:ext>
-            </a:extLst>
-          </p:cNvPr>
-          <p:cNvSpPr>
-            <a:spLocks noGrp="1"/>
-          </p:cNvSpPr>
-          <p:nvPr>
-            <p:ph type="ftr" sz="quarter" idx="11"/>
-          </p:nvPr>
-        </p:nvSpPr>
-        <p:spPr/>
-        <p:txBody>
-          <a:bodyPr/>
-          <a:lstStyle/>
-          <a:p>
-            <a:r>
-              <a:rPr lang="pt-BR" dirty="0"/>
-              <a:t>Testes Unitários</a:t>
-            </a:r>
-          </a:p>
-        </p:txBody>
-      </p:sp>
-      <p:sp>
-        <p:nvSpPr>
-          <p:cNvPr id="5" name="Espaço Reservado para Número de Slide 4">
-            <a:extLst>
-              <a:ext uri="{FF2B5EF4-FFF2-40B4-BE49-F238E27FC236}">
-                <a16:creationId xmlns:a16="http://schemas.microsoft.com/office/drawing/2014/main" id="{3B8D016B-C5B6-45DB-9D25-63814C34EA5E}"/>
-              </a:ext>
-            </a:extLst>
-          </p:cNvPr>
-          <p:cNvSpPr>
-            <a:spLocks noGrp="1"/>
-          </p:cNvSpPr>
-          <p:nvPr>
-            <p:ph type="sldNum" sz="quarter" idx="12"/>
-          </p:nvPr>
-        </p:nvSpPr>
-        <p:spPr/>
-        <p:txBody>
-          <a:bodyPr/>
-          <a:lstStyle/>
-          <a:p>
-            <a:pPr rtl="0"/>
-            <a:fld id="{8D581BC7-E183-40DB-AC97-C19EA4EB8894}" type="slidenum">
-              <a:rPr lang="pt-BR" noProof="0" smtClean="0"/>
-              <a:pPr rtl="0"/>
-              <a:t>7</a:t>
-            </a:fld>
-            <a:endParaRPr lang="pt-BR" noProof="0" dirty="0"/>
-          </a:p>
-        </p:txBody>
-      </p:sp>
-      <p:pic>
-        <p:nvPicPr>
-          <p:cNvPr id="6" name="Imagem 5" descr="Fundo preto com letras brancas&#10;&#10;Descrição gerada automaticamente">
-            <a:extLst>
-              <a:ext uri="{FF2B5EF4-FFF2-40B4-BE49-F238E27FC236}">
-                <a16:creationId xmlns:a16="http://schemas.microsoft.com/office/drawing/2014/main" id="{1A7D3E92-54EB-4CAA-9B8D-AA243EB69C3E}"/>
-              </a:ext>
-            </a:extLst>
-          </p:cNvPr>
-          <p:cNvPicPr>
-            <a:picLocks noChangeAspect="1"/>
-          </p:cNvPicPr>
-          <p:nvPr/>
-        </p:nvPicPr>
-        <p:blipFill>
-          <a:blip r:embed="rId2"/>
-          <a:stretch>
-            <a:fillRect/>
-          </a:stretch>
-        </p:blipFill>
-        <p:spPr>
-          <a:xfrm>
-            <a:off x="2077356" y="1179963"/>
-            <a:ext cx="8512969" cy="4540250"/>
-          </a:xfrm>
-          <a:prstGeom prst="rect">
-            <a:avLst/>
-          </a:prstGeom>
-        </p:spPr>
-      </p:pic>
-    </p:spTree>
-    <p:extLst>
-      <p:ext uri="{BB962C8B-B14F-4D97-AF65-F5344CB8AC3E}">
-        <p14:creationId xmlns:p14="http://schemas.microsoft.com/office/powerpoint/2010/main" val="2528669037"/>
-      </p:ext>
-    </p:extLst>
-  </p:cSld>
-  <p:clrMapOvr>
-    <a:masterClrMapping/>
-  </p:clrMapOvr>
-</p:sld>
-</file>
-
-<file path=ppt/slides/slide8.xml><?xml version="1.0" encoding="utf-8"?>
-<p:sld xmlns:a="http://schemas.openxmlformats.org/drawingml/2006/main" xmlns:r="http://schemas.openxmlformats.org/officeDocument/2006/relationships" xmlns:p="http://schemas.openxmlformats.org/presentationml/2006/main">
-  <p:cSld>
-    <p:spTree>
-      <p:nvGrpSpPr>
-        <p:cNvPr id="1" name=""/>
-        <p:cNvGrpSpPr/>
-        <p:nvPr/>
-      </p:nvGrpSpPr>
-      <p:grpSpPr>
-        <a:xfrm>
-          <a:off x="0" y="0"/>
-          <a:ext cx="0" cy="0"/>
-          <a:chOff x="0" y="0"/>
-          <a:chExt cx="0" cy="0"/>
-        </a:xfrm>
-      </p:grpSpPr>
-      <p:sp>
-        <p:nvSpPr>
-          <p:cNvPr id="8" name="Retângulo 7">
-            <a:extLst>
-              <a:ext uri="{FF2B5EF4-FFF2-40B4-BE49-F238E27FC236}">
-                <a16:creationId xmlns:a16="http://schemas.microsoft.com/office/drawing/2014/main" id="{1A0C204F-3EDB-4CFB-88C4-F2FD65BD31FD}"/>
-              </a:ext>
-            </a:extLst>
-          </p:cNvPr>
-          <p:cNvSpPr/>
-          <p:nvPr/>
-        </p:nvSpPr>
-        <p:spPr>
-          <a:xfrm>
-            <a:off x="1444487" y="1165408"/>
-            <a:ext cx="9303026" cy="4674497"/>
-          </a:xfrm>
-          <a:prstGeom prst="rect">
-            <a:avLst/>
-          </a:prstGeom>
-          <a:solidFill>
-            <a:schemeClr val="bg2"/>
-          </a:solidFill>
-          <a:ln>
-            <a:solidFill>
-              <a:srgbClr val="FFC000"/>
-            </a:solidFill>
-          </a:ln>
-        </p:spPr>
-        <p:style>
-          <a:lnRef idx="2">
-            <a:schemeClr val="accent1">
-              <a:shade val="50000"/>
-            </a:schemeClr>
-          </a:lnRef>
-          <a:fillRef idx="1">
-            <a:schemeClr val="accent1"/>
-          </a:fillRef>
-          <a:effectRef idx="0">
-            <a:schemeClr val="accent1"/>
-          </a:effectRef>
-          <a:fontRef idx="minor">
-            <a:schemeClr val="lt1"/>
-          </a:fontRef>
-        </p:style>
-        <p:txBody>
-          <a:bodyPr rot="0" spcFirstLastPara="0" vertOverflow="overflow" horzOverflow="overflow" vert="horz" wrap="square" lIns="91440" tIns="45720" rIns="91440" bIns="45720" numCol="1" spcCol="0" rtlCol="0" fromWordArt="0" anchor="ctr" anchorCtr="0" forceAA="0" compatLnSpc="1">
-            <a:prstTxWarp prst="textNoShape">
-              <a:avLst/>
-            </a:prstTxWarp>
-            <a:noAutofit/>
-          </a:bodyPr>
-          <a:lstStyle/>
-          <a:p>
-            <a:pPr algn="ctr"/>
-            <a:endParaRPr lang="pt-BR"/>
-          </a:p>
-        </p:txBody>
-      </p:sp>
-      <p:sp>
-        <p:nvSpPr>
-          <p:cNvPr id="2" name="Título 1">
-            <a:extLst>
-              <a:ext uri="{FF2B5EF4-FFF2-40B4-BE49-F238E27FC236}">
-                <a16:creationId xmlns:a16="http://schemas.microsoft.com/office/drawing/2014/main" id="{19230EE8-7593-4D66-BABE-A624F9107347}"/>
-              </a:ext>
-            </a:extLst>
-          </p:cNvPr>
-          <p:cNvSpPr>
-            <a:spLocks noGrp="1"/>
-          </p:cNvSpPr>
-          <p:nvPr>
-            <p:ph type="title"/>
-          </p:nvPr>
-        </p:nvSpPr>
-        <p:spPr/>
-        <p:txBody>
-          <a:bodyPr/>
-          <a:lstStyle/>
-          <a:p>
-            <a:r>
-              <a:rPr lang="pt-BR" dirty="0"/>
-              <a:t>Por que escrever testes unitários?</a:t>
-            </a:r>
-          </a:p>
-        </p:txBody>
-      </p:sp>
-      <p:sp>
-        <p:nvSpPr>
-          <p:cNvPr id="4" name="Espaço Reservado para Rodapé 3">
-            <a:extLst>
-              <a:ext uri="{FF2B5EF4-FFF2-40B4-BE49-F238E27FC236}">
-                <a16:creationId xmlns:a16="http://schemas.microsoft.com/office/drawing/2014/main" id="{106876FF-28E0-4A72-8C87-9EEB941DA9D3}"/>
-              </a:ext>
-            </a:extLst>
-          </p:cNvPr>
-          <p:cNvSpPr>
-            <a:spLocks noGrp="1"/>
-          </p:cNvSpPr>
-          <p:nvPr>
-            <p:ph type="ftr" sz="quarter" idx="11"/>
-          </p:nvPr>
-        </p:nvSpPr>
-        <p:spPr/>
-        <p:txBody>
-          <a:bodyPr/>
-          <a:lstStyle/>
-          <a:p>
-            <a:r>
-              <a:rPr lang="pt-BR" dirty="0"/>
-              <a:t>Testes Unitários</a:t>
-            </a:r>
-          </a:p>
-        </p:txBody>
-      </p:sp>
-      <p:sp>
-        <p:nvSpPr>
-          <p:cNvPr id="5" name="Espaço Reservado para Número de Slide 4">
-            <a:extLst>
-              <a:ext uri="{FF2B5EF4-FFF2-40B4-BE49-F238E27FC236}">
-                <a16:creationId xmlns:a16="http://schemas.microsoft.com/office/drawing/2014/main" id="{3B8D016B-C5B6-45DB-9D25-63814C34EA5E}"/>
-              </a:ext>
-            </a:extLst>
-          </p:cNvPr>
-          <p:cNvSpPr>
-            <a:spLocks noGrp="1"/>
-          </p:cNvSpPr>
-          <p:nvPr>
-            <p:ph type="sldNum" sz="quarter" idx="12"/>
-          </p:nvPr>
-        </p:nvSpPr>
-        <p:spPr/>
-        <p:txBody>
-          <a:bodyPr/>
-          <a:lstStyle/>
-          <a:p>
-            <a:pPr rtl="0"/>
-            <a:fld id="{8D581BC7-E183-40DB-AC97-C19EA4EB8894}" type="slidenum">
-              <a:rPr lang="pt-BR" noProof="0" smtClean="0"/>
-              <a:pPr rtl="0"/>
-              <a:t>8</a:t>
-            </a:fld>
-            <a:endParaRPr lang="pt-BR" noProof="0" dirty="0"/>
-          </a:p>
-        </p:txBody>
-      </p:sp>
-      <p:pic>
-        <p:nvPicPr>
-          <p:cNvPr id="7" name="Imagem 6" descr="Uma imagem contendo texto&#10;&#10;Descrição gerada automaticamente">
-            <a:extLst>
-              <a:ext uri="{FF2B5EF4-FFF2-40B4-BE49-F238E27FC236}">
-                <a16:creationId xmlns:a16="http://schemas.microsoft.com/office/drawing/2014/main" id="{700EF012-5F7D-4A28-B598-2CD64FD85BFE}"/>
-              </a:ext>
-            </a:extLst>
-          </p:cNvPr>
-          <p:cNvPicPr>
-            <a:picLocks noChangeAspect="1"/>
-          </p:cNvPicPr>
-          <p:nvPr/>
-        </p:nvPicPr>
-        <p:blipFill>
-          <a:blip r:embed="rId2"/>
-          <a:stretch>
-            <a:fillRect/>
-          </a:stretch>
-        </p:blipFill>
-        <p:spPr>
-          <a:xfrm>
-            <a:off x="2025464" y="1165409"/>
-            <a:ext cx="8141071" cy="4527182"/>
-          </a:xfrm>
-          <a:prstGeom prst="rect">
-            <a:avLst/>
-          </a:prstGeom>
-        </p:spPr>
-      </p:pic>
-    </p:spTree>
-    <p:extLst>
-      <p:ext uri="{BB962C8B-B14F-4D97-AF65-F5344CB8AC3E}">
-        <p14:creationId xmlns:p14="http://schemas.microsoft.com/office/powerpoint/2010/main" val="2332277559"/>
-      </p:ext>
-    </p:extLst>
-  </p:cSld>
-  <p:clrMapOvr>
-    <a:masterClrMapping/>
-  </p:clrMapOvr>
-</p:sld>
-</file>
-
-<file path=ppt/slides/slide9.xml><?xml version="1.0" encoding="utf-8"?>
-<p:sld xmlns:a="http://schemas.openxmlformats.org/drawingml/2006/main" xmlns:r="http://schemas.openxmlformats.org/officeDocument/2006/relationships" xmlns:p="http://schemas.openxmlformats.org/presentationml/2006/main">
-  <p:cSld>
-    <p:spTree>
-      <p:nvGrpSpPr>
-        <p:cNvPr id="1" name=""/>
-        <p:cNvGrpSpPr/>
-        <p:nvPr/>
-      </p:nvGrpSpPr>
-      <p:grpSpPr>
-        <a:xfrm>
-          <a:off x="0" y="0"/>
-          <a:ext cx="0" cy="0"/>
-          <a:chOff x="0" y="0"/>
-          <a:chExt cx="0" cy="0"/>
-        </a:xfrm>
-      </p:grpSpPr>
-      <p:sp>
-        <p:nvSpPr>
-          <p:cNvPr id="2" name="Título 1">
-            <a:extLst>
-              <a:ext uri="{FF2B5EF4-FFF2-40B4-BE49-F238E27FC236}">
-                <a16:creationId xmlns:a16="http://schemas.microsoft.com/office/drawing/2014/main" id="{19230EE8-7593-4D66-BABE-A624F9107347}"/>
-              </a:ext>
-            </a:extLst>
-          </p:cNvPr>
-          <p:cNvSpPr>
-            <a:spLocks noGrp="1"/>
-          </p:cNvSpPr>
-          <p:nvPr>
-            <p:ph type="title"/>
-          </p:nvPr>
-        </p:nvSpPr>
-        <p:spPr/>
-        <p:txBody>
-          <a:bodyPr/>
-          <a:lstStyle/>
-          <a:p>
-            <a:r>
-              <a:rPr lang="pt-BR" dirty="0"/>
-              <a:t>O que posso usar para escrever meus testes?</a:t>
-            </a:r>
-          </a:p>
-        </p:txBody>
-      </p:sp>
-      <p:sp>
-        <p:nvSpPr>
-          <p:cNvPr id="4" name="Espaço Reservado para Rodapé 3">
-            <a:extLst>
-              <a:ext uri="{FF2B5EF4-FFF2-40B4-BE49-F238E27FC236}">
-                <a16:creationId xmlns:a16="http://schemas.microsoft.com/office/drawing/2014/main" id="{106876FF-28E0-4A72-8C87-9EEB941DA9D3}"/>
-              </a:ext>
-            </a:extLst>
-          </p:cNvPr>
-          <p:cNvSpPr>
-            <a:spLocks noGrp="1"/>
-          </p:cNvSpPr>
-          <p:nvPr>
-            <p:ph type="ftr" sz="quarter" idx="11"/>
-          </p:nvPr>
-        </p:nvSpPr>
-        <p:spPr/>
-        <p:txBody>
-          <a:bodyPr/>
-          <a:lstStyle/>
-          <a:p>
-            <a:r>
-              <a:rPr lang="pt-BR" dirty="0"/>
-              <a:t>Testes Unitários</a:t>
-            </a:r>
-          </a:p>
-        </p:txBody>
-      </p:sp>
-      <p:sp>
-        <p:nvSpPr>
-          <p:cNvPr id="5" name="Espaço Reservado para Número de Slide 4">
-            <a:extLst>
-              <a:ext uri="{FF2B5EF4-FFF2-40B4-BE49-F238E27FC236}">
-                <a16:creationId xmlns:a16="http://schemas.microsoft.com/office/drawing/2014/main" id="{3B8D016B-C5B6-45DB-9D25-63814C34EA5E}"/>
-              </a:ext>
-            </a:extLst>
-          </p:cNvPr>
-          <p:cNvSpPr>
-            <a:spLocks noGrp="1"/>
-          </p:cNvSpPr>
-          <p:nvPr>
-            <p:ph type="sldNum" sz="quarter" idx="12"/>
-          </p:nvPr>
-        </p:nvSpPr>
-        <p:spPr/>
-        <p:txBody>
-          <a:bodyPr/>
-          <a:lstStyle/>
-          <a:p>
-            <a:pPr rtl="0"/>
-            <a:fld id="{8D581BC7-E183-40DB-AC97-C19EA4EB8894}" type="slidenum">
-              <a:rPr lang="pt-BR" noProof="0" smtClean="0"/>
-              <a:pPr rtl="0"/>
-              <a:t>9</a:t>
-            </a:fld>
-            <a:endParaRPr lang="pt-BR" noProof="0" dirty="0"/>
-          </a:p>
-        </p:txBody>
-      </p:sp>
-      <p:pic>
-        <p:nvPicPr>
-          <p:cNvPr id="1028" name="Picture 4" descr="Imagem relacionada">
-            <a:extLst>
-              <a:ext uri="{FF2B5EF4-FFF2-40B4-BE49-F238E27FC236}">
-                <a16:creationId xmlns:a16="http://schemas.microsoft.com/office/drawing/2014/main" id="{60502B6B-5EBE-4A1A-A8CA-CC38128BE3FC}"/>
-              </a:ext>
-            </a:extLst>
-          </p:cNvPr>
-          <p:cNvPicPr>
-            <a:picLocks noChangeAspect="1" noChangeArrowheads="1"/>
-          </p:cNvPicPr>
-          <p:nvPr/>
-        </p:nvPicPr>
-        <p:blipFill>
-          <a:blip r:embed="rId2">
-            <a:extLst>
-              <a:ext uri="{28A0092B-C50C-407E-A947-70E740481C1C}">
-                <a14:useLocalDpi xmlns:a14="http://schemas.microsoft.com/office/drawing/2010/main" val="0"/>
-              </a:ext>
-            </a:extLst>
-          </a:blip>
-          <a:srcRect/>
-          <a:stretch>
-            <a:fillRect/>
-          </a:stretch>
-        </p:blipFill>
-        <p:spPr bwMode="auto">
-          <a:xfrm>
-            <a:off x="1169960" y="1171574"/>
-            <a:ext cx="3129804" cy="3583399"/>
-          </a:xfrm>
-          <a:prstGeom prst="rect">
-            <a:avLst/>
-          </a:prstGeom>
-          <a:noFill/>
-          <a:extLst>
-            <a:ext uri="{909E8E84-426E-40DD-AFC4-6F175D3DCCD1}">
-              <a14:hiddenFill xmlns:a14="http://schemas.microsoft.com/office/drawing/2010/main">
-                <a:solidFill>
-                  <a:srgbClr val="FFFFFF"/>
-                </a:solidFill>
-              </a14:hiddenFill>
-            </a:ext>
-          </a:extLst>
-        </p:spPr>
-      </p:pic>
-      <p:pic>
-        <p:nvPicPr>
-          <p:cNvPr id="1032" name="Picture 8" descr="Resultado de imagem para ferramentas de teste unitário">
-            <a:extLst>
-              <a:ext uri="{FF2B5EF4-FFF2-40B4-BE49-F238E27FC236}">
-                <a16:creationId xmlns:a16="http://schemas.microsoft.com/office/drawing/2014/main" id="{F376A083-22DF-4585-A11C-4C29D09F6E0B}"/>
-              </a:ext>
-            </a:extLst>
-          </p:cNvPr>
-          <p:cNvPicPr>
-            <a:picLocks noChangeAspect="1" noChangeArrowheads="1"/>
-          </p:cNvPicPr>
-          <p:nvPr/>
-        </p:nvPicPr>
-        <p:blipFill>
-          <a:blip r:embed="rId3">
-            <a:extLst>
-              <a:ext uri="{28A0092B-C50C-407E-A947-70E740481C1C}">
-                <a14:useLocalDpi xmlns:a14="http://schemas.microsoft.com/office/drawing/2010/main" val="0"/>
-              </a:ext>
-            </a:extLst>
-          </a:blip>
-          <a:srcRect/>
-          <a:stretch>
-            <a:fillRect/>
-          </a:stretch>
-        </p:blipFill>
-        <p:spPr bwMode="auto">
-          <a:xfrm>
-            <a:off x="5116039" y="2817573"/>
-            <a:ext cx="5980539" cy="3210547"/>
-          </a:xfrm>
-          <a:prstGeom prst="rect">
-            <a:avLst/>
-          </a:prstGeom>
-          <a:noFill/>
-          <a:extLst>
-            <a:ext uri="{909E8E84-426E-40DD-AFC4-6F175D3DCCD1}">
-              <a14:hiddenFill xmlns:a14="http://schemas.microsoft.com/office/drawing/2010/main">
-                <a:solidFill>
-                  <a:srgbClr val="FFFFFF"/>
-                </a:solidFill>
-              </a14:hiddenFill>
-            </a:ext>
-          </a:extLst>
-        </p:spPr>
-      </p:pic>
-      <p:sp>
-        <p:nvSpPr>
-          <p:cNvPr id="16" name="AutoShape 12" descr="Imagem relacionada">
-            <a:extLst>
-              <a:ext uri="{FF2B5EF4-FFF2-40B4-BE49-F238E27FC236}">
-                <a16:creationId xmlns:a16="http://schemas.microsoft.com/office/drawing/2014/main" id="{896F02C2-E357-4634-8428-E2C841465C91}"/>
-              </a:ext>
-            </a:extLst>
-          </p:cNvPr>
-          <p:cNvSpPr>
-            <a:spLocks noChangeAspect="1" noChangeArrowheads="1"/>
-          </p:cNvSpPr>
-          <p:nvPr/>
-        </p:nvSpPr>
-        <p:spPr bwMode="auto">
-          <a:xfrm>
-            <a:off x="6096000" y="3429000"/>
-            <a:ext cx="304800" cy="304800"/>
-          </a:xfrm>
-          <a:prstGeom prst="rect">
-            <a:avLst/>
-          </a:prstGeom>
-          <a:noFill/>
-          <a:extLst>
-            <a:ext uri="{909E8E84-426E-40DD-AFC4-6F175D3DCCD1}">
-              <a14:hiddenFill xmlns:a14="http://schemas.microsoft.com/office/drawing/2010/main">
-                <a:solidFill>
-                  <a:srgbClr val="FFFFFF"/>
-                </a:solidFill>
-              </a14:hiddenFill>
-            </a:ext>
-          </a:extLst>
-        </p:spPr>
-        <p:txBody>
-          <a:bodyPr vert="horz" wrap="square" lIns="91440" tIns="45720" rIns="91440" bIns="45720" numCol="1" anchor="t" anchorCtr="0" compatLnSpc="1">
-            <a:prstTxWarp prst="textNoShape">
-              <a:avLst/>
-            </a:prstTxWarp>
-          </a:bodyPr>
-          <a:lstStyle/>
-          <a:p>
-            <a:endParaRPr lang="pt-BR"/>
-          </a:p>
-        </p:txBody>
-      </p:sp>
-      <p:pic>
-        <p:nvPicPr>
-          <p:cNvPr id="1042" name="Picture 18" descr="Imagem relacionada">
-            <a:extLst>
-              <a:ext uri="{FF2B5EF4-FFF2-40B4-BE49-F238E27FC236}">
-                <a16:creationId xmlns:a16="http://schemas.microsoft.com/office/drawing/2014/main" id="{06F16A53-A450-40DA-AD02-913F9101A356}"/>
-              </a:ext>
-            </a:extLst>
-          </p:cNvPr>
-          <p:cNvPicPr>
-            <a:picLocks noChangeAspect="1" noChangeArrowheads="1"/>
-          </p:cNvPicPr>
-          <p:nvPr/>
-        </p:nvPicPr>
-        <p:blipFill>
-          <a:blip r:embed="rId4">
-            <a:extLst>
-              <a:ext uri="{28A0092B-C50C-407E-A947-70E740481C1C}">
-                <a14:useLocalDpi xmlns:a14="http://schemas.microsoft.com/office/drawing/2010/main" val="0"/>
-              </a:ext>
-            </a:extLst>
-          </a:blip>
-          <a:srcRect/>
-          <a:stretch>
-            <a:fillRect/>
-          </a:stretch>
-        </p:blipFill>
-        <p:spPr bwMode="auto">
-          <a:xfrm>
-            <a:off x="5116039" y="1171574"/>
-            <a:ext cx="2000250" cy="1333500"/>
-          </a:xfrm>
-          <a:prstGeom prst="rect">
-            <a:avLst/>
-          </a:prstGeom>
-          <a:noFill/>
-          <a:extLst>
-            <a:ext uri="{909E8E84-426E-40DD-AFC4-6F175D3DCCD1}">
-              <a14:hiddenFill xmlns:a14="http://schemas.microsoft.com/office/drawing/2010/main">
-                <a:solidFill>
-                  <a:srgbClr val="FFFFFF"/>
-                </a:solidFill>
-              </a14:hiddenFill>
-            </a:ext>
-          </a:extLst>
-        </p:spPr>
-      </p:pic>
-    </p:spTree>
-    <p:extLst>
-      <p:ext uri="{BB962C8B-B14F-4D97-AF65-F5344CB8AC3E}">
-        <p14:creationId xmlns:p14="http://schemas.microsoft.com/office/powerpoint/2010/main" val="2448608479"/>
-      </p:ext>
-    </p:extLst>
-  </p:cSld>
-  <p:clrMapOvr>
-    <a:masterClrMapping/>
-  </p:clrMapOvr>
-  <p:timing>
-    <p:tnLst>
-      <p:par>
-        <p:cTn id="1" dur="indefinite" restart="never" nodeType="tmRoot">
-          <p:childTnLst>
-            <p:seq concurrent="1" nextAc="seek">
-              <p:cTn id="2" dur="indefinite" nodeType="mainSeq">
-                <p:childTnLst>
-                  <p:par>
-                    <p:cTn id="3" fill="hold">
-                      <p:stCondLst>
-                        <p:cond delay="indefinite"/>
-                      </p:stCondLst>
-                      <p:childTnLst>
-                        <p:par>
-                          <p:cTn id="4" fill="hold">
-                            <p:stCondLst>
-                              <p:cond delay="0"/>
-                            </p:stCondLst>
-                            <p:childTnLst>
-                              <p:par>
-                                <p:cTn id="5" presetID="53" presetClass="entr" presetSubtype="16" fill="hold" nodeType="clickEffect">
-                                  <p:stCondLst>
-                                    <p:cond delay="0"/>
-                                  </p:stCondLst>
-                                  <p:childTnLst>
-                                    <p:set>
-                                      <p:cBhvr>
-                                        <p:cTn id="6" dur="1" fill="hold">
-                                          <p:stCondLst>
-                                            <p:cond delay="0"/>
-                                          </p:stCondLst>
-                                        </p:cTn>
-                                        <p:tgtEl>
-                                          <p:spTgt spid="1028"/>
-                                        </p:tgtEl>
-                                        <p:attrNameLst>
-                                          <p:attrName>style.visibility</p:attrName>
-                                        </p:attrNameLst>
-                                      </p:cBhvr>
-                                      <p:to>
-                                        <p:strVal val="visible"/>
-                                      </p:to>
-                                    </p:set>
-                                    <p:anim calcmode="lin" valueType="num">
-                                      <p:cBhvr>
-                                        <p:cTn id="7" dur="500" fill="hold"/>
-                                        <p:tgtEl>
-                                          <p:spTgt spid="1028"/>
-                                        </p:tgtEl>
-                                        <p:attrNameLst>
-                                          <p:attrName>ppt_w</p:attrName>
-                                        </p:attrNameLst>
-                                      </p:cBhvr>
-                                      <p:tavLst>
-                                        <p:tav tm="0">
-                                          <p:val>
-                                            <p:fltVal val="0"/>
-                                          </p:val>
-                                        </p:tav>
-                                        <p:tav tm="100000">
-                                          <p:val>
-                                            <p:strVal val="#ppt_w"/>
-                                          </p:val>
-                                        </p:tav>
-                                      </p:tavLst>
-                                    </p:anim>
-                                    <p:anim calcmode="lin" valueType="num">
-                                      <p:cBhvr>
-                                        <p:cTn id="8" dur="500" fill="hold"/>
-                                        <p:tgtEl>
-                                          <p:spTgt spid="1028"/>
-                                        </p:tgtEl>
-                                        <p:attrNameLst>
-                                          <p:attrName>ppt_h</p:attrName>
-                                        </p:attrNameLst>
-                                      </p:cBhvr>
-                                      <p:tavLst>
-                                        <p:tav tm="0">
-                                          <p:val>
-                                            <p:fltVal val="0"/>
-                                          </p:val>
-                                        </p:tav>
-                                        <p:tav tm="100000">
-                                          <p:val>
-                                            <p:strVal val="#ppt_h"/>
-                                          </p:val>
-                                        </p:tav>
-                                      </p:tavLst>
-                                    </p:anim>
-                                    <p:animEffect transition="in" filter="fade">
-                                      <p:cBhvr>
-                                        <p:cTn id="9" dur="500"/>
-                                        <p:tgtEl>
-                                          <p:spTgt spid="1028"/>
-                                        </p:tgtEl>
-                                      </p:cBhvr>
-                                    </p:animEffect>
-                                  </p:childTnLst>
-                                </p:cTn>
-                              </p:par>
-                            </p:childTnLst>
-                          </p:cTn>
-                        </p:par>
-                      </p:childTnLst>
-                    </p:cTn>
-                  </p:par>
-                  <p:par>
-                    <p:cTn id="10" fill="hold">
-                      <p:stCondLst>
-                        <p:cond delay="indefinite"/>
-                      </p:stCondLst>
-                      <p:childTnLst>
-                        <p:par>
-                          <p:cTn id="11" fill="hold">
-                            <p:stCondLst>
-                              <p:cond delay="0"/>
-                            </p:stCondLst>
-                            <p:childTnLst>
-                              <p:par>
-                                <p:cTn id="12" presetID="53" presetClass="entr" presetSubtype="16" fill="hold" nodeType="clickEffect">
-                                  <p:stCondLst>
-                                    <p:cond delay="0"/>
-                                  </p:stCondLst>
-                                  <p:childTnLst>
-                                    <p:set>
-                                      <p:cBhvr>
-                                        <p:cTn id="13" dur="1" fill="hold">
-                                          <p:stCondLst>
-                                            <p:cond delay="0"/>
-                                          </p:stCondLst>
-                                        </p:cTn>
-                                        <p:tgtEl>
-                                          <p:spTgt spid="1042"/>
-                                        </p:tgtEl>
-                                        <p:attrNameLst>
-                                          <p:attrName>style.visibility</p:attrName>
-                                        </p:attrNameLst>
-                                      </p:cBhvr>
-                                      <p:to>
-                                        <p:strVal val="visible"/>
-                                      </p:to>
-                                    </p:set>
-                                    <p:anim calcmode="lin" valueType="num">
-                                      <p:cBhvr>
-                                        <p:cTn id="14" dur="500" fill="hold"/>
-                                        <p:tgtEl>
-                                          <p:spTgt spid="1042"/>
-                                        </p:tgtEl>
-                                        <p:attrNameLst>
-                                          <p:attrName>ppt_w</p:attrName>
-                                        </p:attrNameLst>
-                                      </p:cBhvr>
-                                      <p:tavLst>
-                                        <p:tav tm="0">
-                                          <p:val>
-                                            <p:fltVal val="0"/>
-                                          </p:val>
-                                        </p:tav>
-                                        <p:tav tm="100000">
-                                          <p:val>
-                                            <p:strVal val="#ppt_w"/>
-                                          </p:val>
-                                        </p:tav>
-                                      </p:tavLst>
-                                    </p:anim>
-                                    <p:anim calcmode="lin" valueType="num">
-                                      <p:cBhvr>
-                                        <p:cTn id="15" dur="500" fill="hold"/>
-                                        <p:tgtEl>
-                                          <p:spTgt spid="1042"/>
-                                        </p:tgtEl>
-                                        <p:attrNameLst>
-                                          <p:attrName>ppt_h</p:attrName>
-                                        </p:attrNameLst>
-                                      </p:cBhvr>
-                                      <p:tavLst>
-                                        <p:tav tm="0">
-                                          <p:val>
-                                            <p:fltVal val="0"/>
-                                          </p:val>
-                                        </p:tav>
-                                        <p:tav tm="100000">
-                                          <p:val>
-                                            <p:strVal val="#ppt_h"/>
-                                          </p:val>
-                                        </p:tav>
-                                      </p:tavLst>
-                                    </p:anim>
-                                    <p:animEffect transition="in" filter="fade">
-                                      <p:cBhvr>
-                                        <p:cTn id="16" dur="500"/>
-                                        <p:tgtEl>
-                                          <p:spTgt spid="1042"/>
-                                        </p:tgtEl>
-                                      </p:cBhvr>
-                                    </p:animEffect>
-                                  </p:childTnLst>
-                                </p:cTn>
-                              </p:par>
-                            </p:childTnLst>
-                          </p:cTn>
-                        </p:par>
-                      </p:childTnLst>
-                    </p:cTn>
-                  </p:par>
-                  <p:par>
-                    <p:cTn id="17" fill="hold">
-                      <p:stCondLst>
-                        <p:cond delay="indefinite"/>
-                      </p:stCondLst>
-                      <p:childTnLst>
-                        <p:par>
-                          <p:cTn id="18" fill="hold">
-                            <p:stCondLst>
-                              <p:cond delay="0"/>
-                            </p:stCondLst>
-                            <p:childTnLst>
-                              <p:par>
-                                <p:cTn id="19" presetID="31" presetClass="entr" presetSubtype="0" fill="hold" nodeType="clickEffect">
-                                  <p:stCondLst>
-                                    <p:cond delay="0"/>
-                                  </p:stCondLst>
-                                  <p:childTnLst>
-                                    <p:set>
-                                      <p:cBhvr>
-                                        <p:cTn id="20" dur="1" fill="hold">
-                                          <p:stCondLst>
-                                            <p:cond delay="0"/>
-                                          </p:stCondLst>
-                                        </p:cTn>
-                                        <p:tgtEl>
-                                          <p:spTgt spid="1032"/>
-                                        </p:tgtEl>
-                                        <p:attrNameLst>
-                                          <p:attrName>style.visibility</p:attrName>
-                                        </p:attrNameLst>
-                                      </p:cBhvr>
-                                      <p:to>
-                                        <p:strVal val="visible"/>
-                                      </p:to>
-                                    </p:set>
-                                    <p:anim calcmode="lin" valueType="num">
-                                      <p:cBhvr>
-                                        <p:cTn id="21" dur="1000" fill="hold"/>
-                                        <p:tgtEl>
-                                          <p:spTgt spid="1032"/>
-                                        </p:tgtEl>
-                                        <p:attrNameLst>
-                                          <p:attrName>ppt_w</p:attrName>
-                                        </p:attrNameLst>
-                                      </p:cBhvr>
-                                      <p:tavLst>
-                                        <p:tav tm="0">
-                                          <p:val>
-                                            <p:fltVal val="0"/>
-                                          </p:val>
-                                        </p:tav>
-                                        <p:tav tm="100000">
-                                          <p:val>
-                                            <p:strVal val="#ppt_w"/>
-                                          </p:val>
-                                        </p:tav>
-                                      </p:tavLst>
-                                    </p:anim>
-                                    <p:anim calcmode="lin" valueType="num">
-                                      <p:cBhvr>
-                                        <p:cTn id="22" dur="1000" fill="hold"/>
-                                        <p:tgtEl>
-                                          <p:spTgt spid="1032"/>
-                                        </p:tgtEl>
-                                        <p:attrNameLst>
-                                          <p:attrName>ppt_h</p:attrName>
-                                        </p:attrNameLst>
-                                      </p:cBhvr>
-                                      <p:tavLst>
-                                        <p:tav tm="0">
-                                          <p:val>
-                                            <p:fltVal val="0"/>
-                                          </p:val>
-                                        </p:tav>
-                                        <p:tav tm="100000">
-                                          <p:val>
-                                            <p:strVal val="#ppt_h"/>
-                                          </p:val>
-                                        </p:tav>
-                                      </p:tavLst>
-                                    </p:anim>
-                                    <p:anim calcmode="lin" valueType="num">
-                                      <p:cBhvr>
-                                        <p:cTn id="23" dur="1000" fill="hold"/>
-                                        <p:tgtEl>
-                                          <p:spTgt spid="1032"/>
-                                        </p:tgtEl>
-                                        <p:attrNameLst>
-                                          <p:attrName>style.rotation</p:attrName>
-                                        </p:attrNameLst>
-                                      </p:cBhvr>
-                                      <p:tavLst>
-                                        <p:tav tm="0">
-                                          <p:val>
-                                            <p:fltVal val="90"/>
-                                          </p:val>
-                                        </p:tav>
-                                        <p:tav tm="100000">
-                                          <p:val>
-                                            <p:fltVal val="0"/>
-                                          </p:val>
-                                        </p:tav>
-                                      </p:tavLst>
-                                    </p:anim>
-                                    <p:animEffect transition="in" filter="fade">
-                                      <p:cBhvr>
-                                        <p:cTn id="24" dur="1000"/>
-                                        <p:tgtEl>
-                                          <p:spTgt spid="1032"/>
-                                        </p:tgtEl>
-                                      </p:cBhvr>
-                                    </p:animEffect>
-                                  </p:childTnLst>
-                                </p:cTn>
-                              </p:par>
-                            </p:childTnLst>
-                          </p:cTn>
-                        </p:par>
-                      </p:childTnLst>
-                    </p:cTn>
-                  </p:par>
-                </p:childTnLst>
-              </p:cTn>
-              <p:prevCondLst>
-                <p:cond evt="onPrev" delay="0">
-                  <p:tgtEl>
-                    <p:sldTgt/>
-                  </p:tgtEl>
-                </p:cond>
-              </p:prevCondLst>
-              <p:nextCondLst>
-                <p:cond evt="onNext" delay="0">
-                  <p:tgtEl>
-                    <p:sldTgt/>
-                  </p:tgtEl>
-                </p:cond>
-              </p:nextCondLst>
-            </p:seq>
-          </p:childTnLst>
-        </p:cTn>
-      </p:par>
-    </p:tnLst>
   </p:timing>
 </p:sld>
 </file>

</xml_diff>